<commit_message>
ajout de commentaires et un detail sur le ppt
</commit_message>
<xml_diff>
--- a/doc/Presentation_Uno.pptx
+++ b/doc/Presentation_Uno.pptx
@@ -1,16 +1,16 @@
 
 <file path=ppt/presentation.xml><?xml version="1.0" encoding="utf-8"?>
-<p:presentation xmlns:p="http://schemas.openxmlformats.org/presentationml/2006/main" xmlns:p14="http://schemas.microsoft.com/office/powerpoint/2010/main" xmlns:r="http://schemas.openxmlformats.org/officeDocument/2006/relationships" xmlns:a="http://schemas.openxmlformats.org/drawingml/2006/main">
+<p:presentation xmlns:a="http://schemas.openxmlformats.org/drawingml/2006/main" xmlns:r="http://schemas.openxmlformats.org/officeDocument/2006/relationships" xmlns:p="http://schemas.openxmlformats.org/presentationml/2006/main">
   <p:sldMasterIdLst>
-    <p:sldMasterId id="2147483648" r:id="rId5"/>
+    <p:sldMasterId id="2147483648" r:id="rId1"/>
   </p:sldMasterIdLst>
   <p:sldIdLst>
-    <p:sldId id="256" r:id="rId6"/>
-    <p:sldId id="257" r:id="rId7"/>
-    <p:sldId id="258" r:id="rId8"/>
-    <p:sldId id="259" r:id="rId9"/>
-    <p:sldId id="260" r:id="rId10"/>
-    <p:sldId id="261" r:id="rId11"/>
+    <p:sldId id="256" r:id="rId3"/>
+    <p:sldId id="257" r:id="rId4"/>
+    <p:sldId id="258" r:id="rId5"/>
+    <p:sldId id="259" r:id="rId6"/>
+    <p:sldId id="260" r:id="rId7"/>
+    <p:sldId id="261" r:id="rId8"/>
   </p:sldIdLst>
   <p:sldSz cx="9144000" cy="6858000"/>
   <p:notesSz cx="6858000" cy="9144000"/>
@@ -26,7 +26,6 @@
         <a:spcPts val="0"/>
       </a:spcAft>
       <a:buNone/>
-      <a:tabLst/>
       <a:defRPr sz="1800" b="0" i="0" u="none" strike="noStrike" kern="1" spc="0" baseline="0">
         <a:solidFill>
           <a:schemeClr val="tx1"/>
@@ -48,7 +47,6 @@
         <a:spcPts val="0"/>
       </a:spcAft>
       <a:buNone/>
-      <a:tabLst/>
       <a:defRPr sz="1800" b="0" i="0" u="none" strike="noStrike" kern="1" spc="0" baseline="0">
         <a:solidFill>
           <a:schemeClr val="tx1"/>
@@ -70,7 +68,6 @@
         <a:spcPts val="0"/>
       </a:spcAft>
       <a:buNone/>
-      <a:tabLst/>
       <a:defRPr sz="1800" b="0" i="0" u="none" strike="noStrike" kern="1" spc="0" baseline="0">
         <a:solidFill>
           <a:schemeClr val="tx1"/>
@@ -92,7 +89,6 @@
         <a:spcPts val="0"/>
       </a:spcAft>
       <a:buNone/>
-      <a:tabLst/>
       <a:defRPr sz="1800" b="0" i="0" u="none" strike="noStrike" kern="1" spc="0" baseline="0">
         <a:solidFill>
           <a:schemeClr val="tx1"/>
@@ -114,7 +110,6 @@
         <a:spcPts val="0"/>
       </a:spcAft>
       <a:buNone/>
-      <a:tabLst/>
       <a:defRPr sz="1800" b="0" i="0" u="none" strike="noStrike" kern="1" spc="0" baseline="0">
         <a:solidFill>
           <a:schemeClr val="tx1"/>
@@ -136,7 +131,6 @@
         <a:spcPts val="0"/>
       </a:spcAft>
       <a:buNone/>
-      <a:tabLst/>
       <a:defRPr sz="1800" b="0" i="0" u="none" strike="noStrike" kern="1" spc="0" baseline="0">
         <a:solidFill>
           <a:schemeClr val="tx1"/>
@@ -158,7 +152,6 @@
         <a:spcPts val="0"/>
       </a:spcAft>
       <a:buNone/>
-      <a:tabLst/>
       <a:defRPr sz="1800" b="0" i="0" u="none" strike="noStrike" kern="1" spc="0" baseline="0">
         <a:solidFill>
           <a:schemeClr val="tx1"/>
@@ -180,7 +173,6 @@
         <a:spcPts val="0"/>
       </a:spcAft>
       <a:buNone/>
-      <a:tabLst/>
       <a:defRPr sz="1800" b="0" i="0" u="none" strike="noStrike" kern="1" spc="0" baseline="0">
         <a:solidFill>
           <a:schemeClr val="tx1"/>
@@ -202,7 +194,6 @@
         <a:spcPts val="0"/>
       </a:spcAft>
       <a:buNone/>
-      <a:tabLst/>
       <a:defRPr sz="1800" b="0" i="0" u="none" strike="noStrike" kern="1" spc="0" baseline="0">
         <a:solidFill>
           <a:schemeClr val="tx1"/>
@@ -218,7 +209,7 @@
 </file>
 
 <file path=ppt/slideLayouts/slideLayout1.xml><?xml version="1.0" encoding="utf-8"?>
-<p:sldLayout xmlns:p="http://schemas.openxmlformats.org/presentationml/2006/main" xmlns:p14="http://schemas.microsoft.com/office/powerpoint/2010/main" xmlns:r="http://schemas.openxmlformats.org/officeDocument/2006/relationships" xmlns:a="http://schemas.openxmlformats.org/drawingml/2006/main" type="title">
+<p:sldLayout xmlns:a="http://schemas.openxmlformats.org/drawingml/2006/main" xmlns:r="http://schemas.openxmlformats.org/officeDocument/2006/relationships" xmlns:p="http://schemas.openxmlformats.org/presentationml/2006/main" type="title">
   <p:cSld name="Diapositive-titre">
     <p:spTree>
       <p:nvGrpSpPr>
@@ -239,14 +230,9 @@
           <p:cNvPr id="2" name="TitreDiapositive1"/>
           <p:cNvSpPr>
             <a:spLocks noGrp="1" noChangeArrowheads="1"/>
-            <a:extLst>
-              <a:ext uri="smNativeData">
-                <pr:smNativeData xmlns:pr="smNativeData" val="SMDATA_13_fWmYYBMAAAAlAAAAZAAAAA8BAAAAkAAAAEgAAACQAAAASAAAAAAAAAABAAAAAAAAAAEAAABQAAAAAAAAAAAA4D8AAAAAAADgPwAAAAAAAOA/AAAAAAAA4D8AAAAAAADgPwAAAAAAAOA/AAAAAAAA4D8AAAAAAADgPwAAAAAAAOA/AAAAAAAA4D8CAAAAjAAAAAAAAAAAAAAA///3DP//2QgAAAAAAAAAAAAAAAAAAAAAAAAAAAAAAAAAAAAAZAAAAAEAAABAAAAAAAAAAAAAAAAAAAAAAAAAAAAAAAAAAAAAAAAAAAAAAAAAAAAAAAAAAAAAAAAAAAAAAAAAAAAAAAAAAAAAAAAAAAAAAAAAAAAAAAAAAAAAAAAAAAAAFAAAADwAAAAAAAAAAAAAAAAAAAkUAAAAAQAAABQAAAAUAAAAFAAAAAEAAAAAAAAAZAAAAGQAAAAAAAAAZAAAAGQAAAAVAAAAYAAAAAAAAAAAAAAADwAAACADAAAAAAAAAAAAAAEAAACgMgAAVgcAAKr4//8BAAAAf39/AAEAAABkAAAAAAAAABQAAABAHwAAAAAAACYAAAAAAAAAwOD//wAAAAAmAAAAZAAAABYAAABMAAAAAAAAAAAAAAAEAAAAAAAAAAEAAAB3d3cKAAAAACgAAAAoAAAAZAAAAGQAAAAAAAAAzMzMAAAAAABQAAAAUAAAAGQAAABkAAAAAAAAABcAAAAUAAAAAAAAAAAAAAD/fwAA/38AAAAAAAAJAAAABAAAAAAAAAAMAAAAEAAAAAAAAAAAAAAAAAAAAAAAAAAeAAAAaAAAAAAAAAAAAAAAAAAAAAAAAAAAAAAAECcAABAnAAAAAAAAAAAAAAAAAAAAAAAAAAAAAAAAAAAAAAAAAAAAABQAAAAAAAAAwMD/AAAAAABkAAAAMgAAAAAAAABkAAAAAAAAAH9/fwAKAAAAHwAAAFQAAAAAAAAFAAAAAQAAAAAAAAAAAAAAAAAAAAAAAAAAAAAAAAAAAAAAAAAAAAAAAn9/fwAAAAADzMzMAMDA/wB/f38AAAAAAAAAAAAAAAAAAAAAAAAAAAAhAAAAGAAAABQAAAA4BAAAGg0AAAg0AAAmFgAAAAAAACYAAAAIAAAAAYAAAAAAAAA="/>
-              </a:ext>
-            </a:extLst>
-          </p:cNvSpPr>
-          <p:nvPr>
-            <p:ph type="ctrTitle"/>
+          </p:cNvSpPr>
+          <p:nvPr>
+            <p:ph type="ctrTitle" hasCustomPrompt="1"/>
           </p:nvPr>
         </p:nvSpPr>
         <p:spPr>
@@ -259,7 +245,6 @@
           <a:bodyPr/>
           <a:lstStyle/>
           <a:p>
-            <a:pPr/>
             <a:r>
               <a:t>Cliquez pour modifier le style du masque de titre</a:t>
             </a:r>
@@ -271,14 +256,9 @@
           <p:cNvPr id="3" name="SousTitreDiapositive1"/>
           <p:cNvSpPr>
             <a:spLocks noGrp="1" noChangeArrowheads="1"/>
-            <a:extLst>
-              <a:ext uri="smNativeData">
-                <pr:smNativeData xmlns:pr="smNativeData" val="SMDATA_13_fWmYYBMAAAAlAAAAZAAAAA8BAAAAkAAAAEgAAACQAAAASAAAAAAAAAAAAAAAAAAAAAEAAABQAAAAAAAAAAAA4D8AAAAAAADgPwAAAAAAAOA/AAAAAAAA4D8AAAAAAADgPwAAAAAAAOA/AAAAAAAA4D8AAAAAAADgPwAAAAAAAOA/AAAAAAAA4D8CAAAAjAAAAAAAAAAAAAAA///3DP//2QgAAAAAAAAAAAAAAAAAAAAAAAAAAAAAAAAAAAAAZAAAAAEAAABAAAAAAAAAAAAAAAAAAAAAAAAAAAAAAAAAAAAAAAAAAAAAAAAAAAAAAAAAAAAAAAAAAAAAAAAAAAAAAAAAAAAAAAAAAAAAAAAAAAAAAAAAAAAAAAAAAAAAFAAAADwAAAAAAAAAAAAAAAAAAAkUAAAAAQAAABQAAAAUAAAAFAAAAAEAAAAAAAAAZAAAAGQAAAAAAAAAZAAAAGQAAAAVAAAAYAAAAAAAAAAAAAAADwAAACADAAAAAAAAAAAAAAEAAACgMgAAVgcAAKr4//8BAAAAf39/AAEAAABkAAAAAAAAABQAAABAHwAAAAAAACYAAAAAAAAAwOD//wAAAAAmAAAAZAAAABYAAABMAAAAAAAAAAAAAAAEAAAAAAAAAAEAAAB3d3cKAAAAACgAAAAoAAAAZAAAAGQAAAAAAAAAzMzMAAAAAABQAAAAUAAAAGQAAABkAAAAAAAAABcAAAAUAAAAAAAAAAAAAAD/fwAA/38AAAAAAAAJAAAABAAAAAAAAAAMAAAAEAAAAAAAAAAAAAAAAAAAAAAAAAAeAAAAaAAAAAAAAAAAAAAAAAAAAAAAAAAAAAAAECcAABAnAAAAAAAAAAAAAAAAAAAAAAAAAAAAAAAAAAAAAAAAAAAAABQAAAAAAAAAwMD/AAAAAABkAAAAMgAAAAAAAABkAAAAAAAAAH9/fwAKAAAAHwAAAFQAAAAAAAAFAAAAAQAAAAAAAAAAAAAAAAAAAAAAAAAAAAAAAAAAAAAAAAAAAAAAAn9/fwAAAAADzMzMAMDA/wB/f38AAAAAAAAAAAAAAAAAAAAAAAAAAAAhAAAAGAAAABQAAABwCAAA6BcAANAvAACwIgAAAAAAACYAAAAIAAAAAYAAAAAAAAA="/>
-              </a:ext>
-            </a:extLst>
-          </p:cNvSpPr>
-          <p:nvPr>
-            <p:ph type="subTitle" idx="1"/>
+          </p:cNvSpPr>
+          <p:nvPr>
+            <p:ph type="subTitle" idx="1" hasCustomPrompt="1"/>
           </p:nvPr>
         </p:nvSpPr>
         <p:spPr>
@@ -319,7 +299,6 @@
             </a:lvl9pPr>
           </a:lstStyle>
           <a:p>
-            <a:pPr/>
             <a:r>
               <a:t>Cliquez pour modifier le style du masque de sous-titre</a:t>
             </a:r>
@@ -331,11 +310,6 @@
           <p:cNvPr id="4" name="ZoneEstampille1"/>
           <p:cNvSpPr>
             <a:spLocks noGrp="1" noChangeArrowheads="1"/>
-            <a:extLst>
-              <a:ext uri="smNativeData">
-                <pr:smNativeData xmlns:pr="smNativeData" val="SMDATA_13_fWmYYBMAAAAlAAAAZAAAAA8BAAAAkAAAAEgAAACQAAAASAAAAAAAAAABAAAAAAAAAAEAAABQAAAAAAAAAAAA4D8AAAAAAADgPwAAAAAAAOA/AAAAAAAA4D8AAAAAAADgPwAAAAAAAOA/AAAAAAAA4D8AAAAAAADgPwAAAAAAAOA/AAAAAAAA4D8CAAAAjAAAAAAAAAAAAAAA///3DP//2QgAAAAAAAAAAAAAAAAAAAAAAAAAAAAAAAAAAAAAZAAAAAEAAABAAAAAAAAAAAAAAAAAAAAAAAAAAAAAAAAAAAAAAAAAAAAAAAAAAAAAAAAAAAAAAAAAAAAAAAAAAAAAAAAAAAAAAAAAAAAAAAAAAAAAAAAAAAAAAAAAAAAAFAAAADwAAAAAAAAAAAAAAAAAAAkUAAAAAQAAABQAAAAUAAAAFAAAAAEAAAAAAAAAZAAAAGQAAAAAAAAAZAAAAGQAAAAVAAAAYAAAAAAAAAAAAAAADwAAACADAAAAAAAAAAAAAAEAAACgMgAAVgcAAKr4//8BAAAAf39/AAEAAABkAAAAAAAAABQAAABAHwAAAAAAACYAAAAAAAAAwOD//wAAAAAmAAAAZAAAABYAAABMAAAAAAAAAAAAAAAEAAAAAAAAAAEAAAB3d3cKAAAAACgAAAAoAAAAZAAAAGQAAAAAAAAAzMzMAAAAAABQAAAAUAAAAGQAAABkAAAAAAAAABcAAAAUAAAAAAAAAAAAAAD/fwAA/38AAAAAAAAJAAAABAAAACAAbwAMAAAAEAAAAAAAAAAAAAAAAAAAAAAAAAAeAAAAaAAAAAAAAAAAAAAAAAAAAAAAAAAAAAAAECcAABAnAAAAAAAAAAAAAAAAAAAAAAAAAAAAAAAAAAAAAAAAAAAAABQAAAAAAAAAwMD/AAAAAABkAAAAMgAAAAAAAABkAAAAAAAAAH9/fwAKAAAAHwAAAFQAAAAAAAAFAAAAAQAAAAAAAAAAAAAAAAAAAAAAAAAAAAAAAAAAAAAAAAAAAAAAAn9/fwAAAAADzMzMAMDA/wB/f38AAAAAAAAAAAAAAAAAAAAAAAAAAAAhAAAAGAAAABQAAADQAgAAGycAAPAPAABZKQAAAAAAACYAAAAIAAAAAAAAAAAAAAA="/>
-              </a:ext>
-            </a:extLst>
           </p:cNvSpPr>
           <p:nvPr>
             <p:ph type="dt" sz="quarter" idx="10"/>
@@ -346,10 +320,10 @@
           <a:bodyPr/>
           <a:lstStyle/>
           <a:p>
-            <a:pPr/>
             <a:fld id="{14F3FC0A-44F9-A60A-B74B-B25FB20541E7}" type="datetime1">
-              <a:t/>
+              <a:rPr/>
             </a:fld>
+            <a:endParaRPr/>
           </a:p>
         </p:txBody>
       </p:sp>
@@ -358,11 +332,6 @@
           <p:cNvPr id="5" name="ZonePiedDePage1"/>
           <p:cNvSpPr>
             <a:spLocks noGrp="1" noChangeArrowheads="1"/>
-            <a:extLst>
-              <a:ext uri="smNativeData">
-                <pr:smNativeData xmlns:pr="smNativeData" val="SMDATA_13_fWmYYBMAAAAlAAAAZAAAAA8BAAAAkAAAAEgAAACQAAAASAAAAAAAAAABAAAAAAAAAAEAAABQAAAAAAAAAAAA4D8AAAAAAADgPwAAAAAAAOA/AAAAAAAA4D8AAAAAAADgPwAAAAAAAOA/AAAAAAAA4D8AAAAAAADgPwAAAAAAAOA/AAAAAAAA4D8CAAAAjAAAAAAAAAAAAAAA///3DP//2QgAAAAAAAAAAAAAAAAAAAAAAAAAAAAAAAAAAAAAZAAAAAEAAABAAAAAAAAAAAAAAAAAAAAAAAAAAAAAAAAAAAAAAAAAAAAAAAAAAAAAAAAAAAAAAAAAAAAAAAAAAAAAAAAAAAAAAAAAAAAAAAAAAAAAAAAAAAAAAAAAAAAAFAAAADwAAAAAAAAAAAAAAAAAAAkUAAAAAQAAABQAAAAUAAAAFAAAAAEAAAAAAAAAZAAAAGQAAAAAAAAAZAAAAGQAAAAVAAAAYAAAAAAAAAAAAAAADwAAACADAAAAAAAAAAAAAAEAAACgMgAAVgcAAKr4//8BAAAAf39/AAEAAABkAAAAAAAAABQAAABAHwAAAAAAACYAAAAAAAAAwOD//wAAAAAmAAAAZAAAABYAAABMAAAAAAAAAAAAAAAEAAAAAAAAAAEAAAB3d3cKAAAAACgAAAAoAAAAZAAAAGQAAAAAAAAAzMzMAAAAAABQAAAAUAAAAGQAAABkAAAAAAAAABcAAAAUAAAAAAAAAAAAAAD/fwAA/38AAAAAAAAJAAAABAAAAAAAAAAMAAAAEAAAAAAAAAAAAAAAAAAAAAAAAAAeAAAAaAAAAAAAAAAAAAAAAAAAAAAAAAAAAAAAECcAABAnAAAAAAAAAAAAAAAAAAAAAAAAAAAAAAAAAAAAAAAAAAAAABQAAAAAAAAAwMD/AAAAAABkAAAAMgAAAAAAAABkAAAAAAAAAH9/fwAKAAAAHwAAAFQAAAAAAAAFAAAAAQAAAAAAAAAAAAAAAAAAAAAAAAAAAAAAAAAAAAAAAAAAAAAAAn9/fwAAAAADzMzMAMDA/wB/f38AAAAAAAAAAAAAAAAAAAAAAAAAAAAhAAAAGAAAABQAAAA4EwAAGycAAAglAABZKQAAAAAAACYAAAAIAAAAAAAAAAAAAAA="/>
-              </a:ext>
-            </a:extLst>
           </p:cNvSpPr>
           <p:nvPr>
             <p:ph type="ftr" sz="quarter" idx="11"/>
@@ -372,12 +341,7 @@
         <p:txBody>
           <a:bodyPr/>
           <a:lstStyle/>
-          <a:p>
-            <a:pPr/>
-            <a:r>
-              <a:t/>
-            </a:r>
-          </a:p>
+          <a:p/>
         </p:txBody>
       </p:sp>
       <p:sp>
@@ -385,11 +349,6 @@
           <p:cNvPr id="6" name="ZoneNuméroDiapositive1"/>
           <p:cNvSpPr>
             <a:spLocks noGrp="1" noChangeArrowheads="1"/>
-            <a:extLst>
-              <a:ext uri="smNativeData">
-                <pr:smNativeData xmlns:pr="smNativeData" val="SMDATA_13_fWmYYBMAAAAlAAAAZAAAAA8BAAAAkAAAAEgAAACQAAAASAAAAAAAAAABAAAAAAAAAAEAAABQAAAAAAAAAAAA4D8AAAAAAADgPwAAAAAAAOA/AAAAAAAA4D8AAAAAAADgPwAAAAAAAOA/AAAAAAAA4D8AAAAAAADgPwAAAAAAAOA/AAAAAAAA4D8CAAAAjAAAAAAAAAAAAAAA///3DP//2QgAAAAAAAAAAAAAAAAAAAAAAAAAAAAAAAAAAAAAZAAAAAEAAABAAAAAAAAAAAAAAAAAAAAAAAAAAAAAAAAAAAAAAAAAAAAAAAAAAAAAAAAAAAAAAAAAAAAAAAAAAAAAAAAAAAAAAAAAAAAAAAAAAAAAAAAAAAAAAAAAAAAAFAAAADwAAAAAAAAAAAAAAAAAAAkUAAAAAQAAABQAAAAUAAAAFAAAAAEAAAAAAAAAZAAAAGQAAAAAAAAAZAAAAGQAAAAVAAAAYAAAAAAAAAAAAAAADwAAACADAAAAAAAAAAAAAAEAAACgMgAAVgcAAKr4//8BAAAAf39/AAEAAABkAAAAAAAAABQAAABAHwAAAAAAACYAAAAAAAAAwOD//wAAAAAmAAAAZAAAABYAAABMAAAAAAAAAAAAAAAEAAAAAAAAAAEAAAB3d3cKAAAAACgAAAAoAAAAZAAAAGQAAAAAAAAAzMzMAAAAAABQAAAAUAAAAGQAAABkAAAAAAAAABcAAAAUAAAAAAAAAAAAAAD/fwAA/38AAAAAAAAJAAAABAAAAAAAAAAMAAAAEAAAAAAAAAAAAAAAAAAAAAAAAAAeAAAAaAAAAAAAAAAAAAAAAAAAAAAAAAAAAAAAECcAABAnAAAAAAAAAAAAAAAAAAAAAAAAAAAAAAAAAAAAAAAAAAAAABQAAAAAAAAAwMD/AAAAAABkAAAAMgAAAAAAAABkAAAAAAAAAH9/fwAKAAAAHwAAAFQAAAAAAAAFAAAAAQAAAAAAAAAAAAAAAAAAAAAAAAAAAAAAAAAAAAAAAAAAAAAAAn9/fwAAAAADzMzMAMDA/wB/f38AAAAAAAAAAAAAAAAAAAAAAAAAAAAhAAAAGAAAABQAAABQKAAAGycAAHA1AABZKQAAAAAAACYAAAAIAAAAAAAAAAAAAAA="/>
-              </a:ext>
-            </a:extLst>
           </p:cNvSpPr>
           <p:nvPr>
             <p:ph type="sldNum" sz="quarter" idx="12"/>
@@ -400,10 +359,10 @@
           <a:bodyPr/>
           <a:lstStyle/>
           <a:p>
-            <a:pPr/>
             <a:fld id="{495361D0-9EA4-0697-EAEB-68C22FA51C3D}" type="slidenum">
-              <a:t/>
+              <a:rPr/>
             </a:fld>
+            <a:endParaRPr/>
           </a:p>
         </p:txBody>
       </p:sp>
@@ -416,7 +375,7 @@
 </file>
 
 <file path=ppt/slideLayouts/slideLayout10.xml><?xml version="1.0" encoding="utf-8"?>
-<p:sldLayout xmlns:p="http://schemas.openxmlformats.org/presentationml/2006/main" xmlns:p14="http://schemas.microsoft.com/office/powerpoint/2010/main" xmlns:r="http://schemas.openxmlformats.org/officeDocument/2006/relationships" xmlns:a="http://schemas.openxmlformats.org/drawingml/2006/main" type="vertTx">
+<p:sldLayout xmlns:a="http://schemas.openxmlformats.org/drawingml/2006/main" xmlns:r="http://schemas.openxmlformats.org/officeDocument/2006/relationships" xmlns:p="http://schemas.openxmlformats.org/presentationml/2006/main" type="vertTx">
   <p:cSld name="Titre et texte vertical">
     <p:spTree>
       <p:nvGrpSpPr>
@@ -437,14 +396,9 @@
           <p:cNvPr id="2" name="TitreDiapositive1"/>
           <p:cNvSpPr>
             <a:spLocks noGrp="1" noChangeArrowheads="1"/>
-            <a:extLst>
-              <a:ext uri="smNativeData">
-                <pr:smNativeData xmlns:pr="smNativeData" val="SMDATA_13_fWmYYBMAAAAlAAAAZAAAAA8BAAAAkAAAAEgAAACQAAAASAAAAAAAAAABAAAAAAAAAAEAAABQAAAAAAAAAAAA4D8AAAAAAADgPwAAAAAAAOA/AAAAAAAA4D8AAAAAAADgPwAAAAAAAOA/AAAAAAAA4D8AAAAAAADgPwAAAAAAAOA/AAAAAAAA4D8CAAAAjAAAAAAAAAAAAAAA///3DP//2QgAAAAAAAAAAAAAAAAAAAAAAAAAAAAAAAAAAAAAZAAAAAEAAABAAAAAAAAAAAAAAAAAAAAAAAAAAAAAAAAAAAAAAAAAAAAAAAAAAAAAAAAAAAAAAAAAAAAAAAAAAAAAAAAAAAAAAAAAAAAAAAAAAAAAAAAAAAAAAAAAAAAAFAAAADwAAAAAAAAAAAAAAAAAAAkUAAAAAQAAABQAAAAUAAAAFAAAAAEAAAAAAAAAZAAAAGQAAAAAAAAAZAAAAGQAAAAVAAAAYAAAAAAAAAAAAAAADwAAACADAAAAAAAAAAAAAAEAAACgMgAAVgcAAKr4//8BAAAAf39/AAEAAABkAAAAAAAAABQAAABAHwAAAAAAACYAAAAAAAAAwOD//wAAAAAmAAAAZAAAABYAAABMAAAAAAAAAAAAAAAEAAAAAAAAAAEAAAB3d3cKAAAAACgAAAAoAAAAZAAAAGQAAAAAAAAAzMzMAAAAAABQAAAAUAAAAGQAAABkAAAAAAAAABcAAAAUAAAAAAAAAAAAAAD/fwAA/38AAAAAAAAJAAAABAAAAGEyVTAMAAAAEAAAAAAAAAAAAAAAAAAAAAAAAAAeAAAAaAAAAAAAAAAAAAAAAAAAAAAAAAAAAAAAECcAABAnAAAAAAAAAAAAAAAAAAAAAAAAAAAAAAAAAAAAAAAAAAAAABQAAAAAAAAAwMD/AAAAAABkAAAAMgAAAAAAAABkAAAAAAAAAH9/fwAKAAAAHwAAAFQAAAAAAAAFAAAAAQAAAAAAAAAAAAAAAAAAAAAAAAAAAAAAAAAAAAAAAAAAAAAAAn9/fwAAAAADzMzMAMDA/wB/f38AAAAAAAAAAAAAAAAAAAAAAAAAAAAhAAAAGAAAABQAAADQAgAAsAEAAHA1AAC4CAAAAAAAACYAAAAIAAAAAAAAAAAAAAA="/>
-              </a:ext>
-            </a:extLst>
-          </p:cNvSpPr>
-          <p:nvPr>
-            <p:ph type="title"/>
+          </p:cNvSpPr>
+          <p:nvPr>
+            <p:ph type="title" hasCustomPrompt="1"/>
           </p:nvPr>
         </p:nvSpPr>
         <p:spPr/>
@@ -452,7 +406,6 @@
           <a:bodyPr/>
           <a:lstStyle/>
           <a:p>
-            <a:pPr/>
             <a:r>
               <a:t>Cliquez pour modifier le style du masque de titre</a:t>
             </a:r>
@@ -464,26 +417,16 @@
           <p:cNvPr id="3" name="TexteDiapositive1"/>
           <p:cNvSpPr>
             <a:spLocks noGrp="1" noChangeArrowheads="1"/>
-            <a:extLst>
-              <a:ext uri="smNativeData">
-                <pr:smNativeData xmlns:pr="smNativeData" val="SMDATA_13_fWmYYBMAAAAlAAAAZAAAAA8BAAAAkAAAAEgAAACQAAAASAAAAAAAAAAAAAAAAQAAAAEAAABQAAAAAAAAAAAA4D8AAAAAAADgPwAAAAAAAOA/AAAAAAAA4D8AAAAAAADgPwAAAAAAAOA/AAAAAAAA4D8AAAAAAADgPwAAAAAAAOA/AAAAAAAA4D8CAAAAjAAAAAAAAAAAAAAA///3DP//2QgAAAAAAAAAAAAAAAAAAAAAAAAAAAAAAAAAAAAAZAAAAAEAAABAAAAAAAAAAAAAAAAAAAAAAAAAAAAAAAAAAAAAAAAAAAAAAAAAAAAAAAAAAAAAAAAAAAAAAAAAAAAAAAAAAAAAAAAAAAAAAAAAAAAAAAAAAAAAAAAAAAAAFAAAADwAAAAAAAAAAAAAAAAAAAkUAAAAAQAAABQAAAAUAAAAFAAAAAEAAAAAAAAAZAAAAGQAAAAAAAAAZAAAAGQAAAAVAAAAYAAAAAAAAAAAAAAADwAAACADAAAAAAAAAAAAAAEAAACgMgAAVgcAAKr4//8BAAAAf39/AAEAAABkAAAAAAAAABQAAABAHwAAAAAAACYAAAAAAAAAwOD//wAAAAAmAAAAZAAAABYAAABMAAAAAAAAAAAAAAAEAAAAAAAAAAEAAAB3d3cKAAAAACgAAAAoAAAAZAAAAGQAAAAAAAAAzMzMAAAAAABQAAAAUAAAAGQAAABkAAAAAAAAABcAAAAUAAAAAAAAAAAAAAD/fwAA/38AAAAAAAAJAAAABAAAAAAAAAAMAAAAEAAAAAAAAAAAAAAAAAAAAAAAAAAeAAAAaAAAAAAAAAAAAAAAAAAAAAAAAAAAAAAAECcAABAnAAAAAAAAAAAAAAAAAAAAAAAAAAAAAAAAAAAAAAAAAAAAABQAAAAAAAAAwMD/AAAAAABkAAAAMgAAAAAAAABkAAAAAAAAAH9/fwAKAAAAHwAAAFQAAAAAAAAFAAAAAQAAAAAAAAAAAAAAAAAAAAAAAAAAAAAAAAAAAAAAAAAAAAAAAn9/fwAAAAADzMzMAMDA/wB/f38AAAAAAAAAAAAAAAAAAAAAAAAAAAAhAAAAGAAAABQAAADQAgAA2AkAAHA1AACwJQAAAAAAACYAAAAIAAAAAgAAAAAAAAA="/>
-              </a:ext>
-            </a:extLst>
-          </p:cNvSpPr>
-          <p:nvPr>
-            <p:ph idx="1"/>
+          </p:cNvSpPr>
+          <p:nvPr>
+            <p:ph idx="1" hasCustomPrompt="1"/>
           </p:nvPr>
         </p:nvSpPr>
         <p:spPr/>
         <p:txBody>
-          <a:bodyPr vert="vert" wrap="square" numCol="1" spcCol="215900" anchor="t">
-            <a:prstTxWarp prst="textNoShape">
-              <a:avLst/>
-            </a:prstTxWarp>
-          </a:bodyPr>
-          <a:lstStyle/>
-          <a:p>
-            <a:pPr/>
+          <a:bodyPr vert="vert" wrap="square" numCol="1" spcCol="215900" anchor="t"/>
+          <a:lstStyle/>
+          <a:p>
             <a:r>
               <a:t>Cliquez pour modifier les styles du masque de texte</a:t>
             </a:r>
@@ -519,11 +462,6 @@
           <p:cNvPr id="4" name="ZoneEstampille1"/>
           <p:cNvSpPr>
             <a:spLocks noGrp="1" noChangeArrowheads="1"/>
-            <a:extLst>
-              <a:ext uri="smNativeData">
-                <pr:smNativeData xmlns:pr="smNativeData" val="SMDATA_13_fWmYYBMAAAAlAAAAZAAAAA8BAAAAkAAAAEgAAACQAAAASAAAAAAAAAABAAAAAAAAAAEAAABQAAAAAAAAAAAA4D8AAAAAAADgPwAAAAAAAOA/AAAAAAAA4D8AAAAAAADgPwAAAAAAAOA/AAAAAAAA4D8AAAAAAADgPwAAAAAAAOA/AAAAAAAA4D8CAAAAjAAAAAAAAAAAAAAA///3DP//2QgAAAAAAAAAAAAAAAAAAAAAAAAAAAAAAAAAAAAAZAAAAAEAAABAAAAAAAAAAAAAAAAAAAAAAAAAAAAAAAAAAAAAAAAAAAAAAAAAAAAAAAAAAAAAAAAAAAAAAAAAAAAAAAAAAAAAAAAAAAAAAAAAAAAAAAAAAAAAAAAAAAAAFAAAADwAAAAAAAAAAAAAAAAAAAkUAAAAAQAAABQAAAAUAAAAFAAAAAEAAAAAAAAAZAAAAGQAAAAAAAAAZAAAAGQAAAAVAAAAYAAAAAAAAAAAAAAADwAAACADAAAAAAAAAAAAAAEAAACgMgAAVgcAAKr4//8BAAAAf39/AAEAAABkAAAAAAAAABQAAABAHwAAAAAAACYAAAAAAAAAwOD//wAAAAAmAAAAZAAAABYAAABMAAAAAAAAAAAAAAAEAAAAAAAAAAEAAAB3d3cKAAAAACgAAAAoAAAAZAAAAGQAAAAAAAAAzMzMAAAAAABQAAAAUAAAAGQAAABkAAAAAAAAABcAAAAUAAAAAAAAAAAAAAD/fwAA/38AAAAAAAAJAAAABAAAAAAAAAAMAAAAEAAAAAAAAAAAAAAAAAAAAAAAAAAeAAAAaAAAAAAAAAAAAAAAAAAAAAAAAAAAAAAAECcAABAnAAAAAAAAAAAAAAAAAAAAAAAAAAAAAAAAAAAAAAAAAAAAABQAAAAAAAAAwMD/AAAAAABkAAAAMgAAAAAAAABkAAAAAAAAAH9/fwAKAAAAHwAAAFQAAAAAAAAFAAAAAQAAAAAAAAAAAAAAAAAAAAAAAAAAAAAAAAAAAAAAAAAAAAAAAn9/fwAAAAADzMzMAMDA/wB/f38AAAAAAAAAAAAAAAAAAAAAAAAAAAAhAAAAGAAAABQAAADQAgAAGycAAPAPAABZKQAAAAAAACYAAAAIAAAAAAAAAAAAAAA="/>
-              </a:ext>
-            </a:extLst>
           </p:cNvSpPr>
           <p:nvPr>
             <p:ph type="dt" sz="quarter" idx="10"/>
@@ -534,10 +472,10 @@
           <a:bodyPr/>
           <a:lstStyle/>
           <a:p>
-            <a:pPr/>
             <a:fld id="{119DC7E1-AFFC-C831-B225-5964896B440C}" type="datetime1">
-              <a:t/>
+              <a:rPr/>
             </a:fld>
+            <a:endParaRPr/>
           </a:p>
         </p:txBody>
       </p:sp>
@@ -546,11 +484,6 @@
           <p:cNvPr id="5" name="ZonePiedDePage1"/>
           <p:cNvSpPr>
             <a:spLocks noGrp="1" noChangeArrowheads="1"/>
-            <a:extLst>
-              <a:ext uri="smNativeData">
-                <pr:smNativeData xmlns:pr="smNativeData" val="SMDATA_13_fWmYYBMAAAAlAAAAZAAAAA8BAAAAkAAAAEgAAACQAAAASAAAAAAAAAABAAAAAAAAAAEAAABQAAAAAAAAAAAA4D8AAAAAAADgPwAAAAAAAOA/AAAAAAAA4D8AAAAAAADgPwAAAAAAAOA/AAAAAAAA4D8AAAAAAADgPwAAAAAAAOA/AAAAAAAA4D8CAAAAjAAAAAAAAAAAAAAA///3DP//2QgAAAAAAAAAAAAAAAAAAAAAAAAAAAAAAAAAAAAAZAAAAAEAAABAAAAAAAAAAAAAAAAAAAAAAAAAAAAAAAAAAAAAAAAAAAAAAAAAAAAAAAAAAAAAAAAAAAAAAAAAAAAAAAAAAAAAAAAAAAAAAAAAAAAAAAAAAAAAAAAAAAAAFAAAADwAAAAAAAAAAAAAAAAAAAkUAAAAAQAAABQAAAAUAAAAFAAAAAEAAAAAAAAAZAAAAGQAAAAAAAAAZAAAAGQAAAAVAAAAYAAAAAAAAAAAAAAADwAAACADAAAAAAAAAAAAAAEAAACgMgAAVgcAAKr4//8BAAAAf39/AAEAAABkAAAAAAAAABQAAABAHwAAAAAAACYAAAAAAAAAwOD//wAAAAAmAAAAZAAAABYAAABMAAAAAAAAAAAAAAAEAAAAAAAAAAEAAAB3d3cKAAAAACgAAAAoAAAAZAAAAGQAAAAAAAAAzMzMAAAAAABQAAAAUAAAAGQAAABkAAAAAAAAABcAAAAUAAAAAAAAAAAAAAD/fwAA/38AAAAAAAAJAAAABAAAAAAAAAAMAAAAEAAAAAAAAAAAAAAAAAAAAAAAAAAeAAAAaAAAAAAAAAAAAAAAAAAAAAAAAAAAAAAAECcAABAnAAAAAAAAAAAAAAAAAAAAAAAAAAAAAAAAAAAAAAAAAAAAABQAAAAAAAAAwMD/AAAAAABkAAAAMgAAAAAAAABkAAAAAAAAAH9/fwAKAAAAHwAAAFQAAAAAAAAFAAAAAQAAAAAAAAAAAAAAAAAAAAAAAAAAAAAAAAAAAAAAAAAAAAAAAn9/fwAAAAADzMzMAMDA/wB/f38AAAAAAAAAAAAAAAAAAAAAAAAAAAAhAAAAGAAAABQAAAA4EwAAGycAAAglAABZKQAAAAAAACYAAAAIAAAAAAAAAAAAAAA="/>
-              </a:ext>
-            </a:extLst>
           </p:cNvSpPr>
           <p:nvPr>
             <p:ph type="ftr" sz="quarter" idx="11"/>
@@ -560,12 +493,7 @@
         <p:txBody>
           <a:bodyPr/>
           <a:lstStyle/>
-          <a:p>
-            <a:pPr/>
-            <a:r>
-              <a:t/>
-            </a:r>
-          </a:p>
+          <a:p/>
         </p:txBody>
       </p:sp>
       <p:sp>
@@ -573,11 +501,6 @@
           <p:cNvPr id="6" name="ZoneNuméroDiapositive1"/>
           <p:cNvSpPr>
             <a:spLocks noGrp="1" noChangeArrowheads="1"/>
-            <a:extLst>
-              <a:ext uri="smNativeData">
-                <pr:smNativeData xmlns:pr="smNativeData" val="SMDATA_13_fWmYYBMAAAAlAAAAZAAAAA8BAAAAkAAAAEgAAACQAAAASAAAAAAAAAABAAAAAAAAAAEAAABQAAAAAAAAAAAA4D8AAAAAAADgPwAAAAAAAOA/AAAAAAAA4D8AAAAAAADgPwAAAAAAAOA/AAAAAAAA4D8AAAAAAADgPwAAAAAAAOA/AAAAAAAA4D8CAAAAjAAAAAAAAAAAAAAA///3DP//2QgAAAAAAAAAAAAAAAAAAAAAAAAAAAAAAAAAAAAAZAAAAAEAAABAAAAAAAAAAAAAAAAAAAAAAAAAAAAAAAAAAAAAAAAAAAAAAAAAAAAAAAAAAAAAAAAAAAAAAAAAAAAAAAAAAAAAAAAAAAAAAAAAAAAAAAAAAAAAAAAAAAAAFAAAADwAAAAAAAAAAAAAAAAAAAkUAAAAAQAAABQAAAAUAAAAFAAAAAEAAAAAAAAAZAAAAGQAAAAAAAAAZAAAAGQAAAAVAAAAYAAAAAAAAAAAAAAADwAAACADAAAAAAAAAAAAAAEAAACgMgAAVgcAAKr4//8BAAAAf39/AAEAAABkAAAAAAAAABQAAABAHwAAAAAAACYAAAAAAAAAwOD//wAAAAAmAAAAZAAAABYAAABMAAAAAAAAAAAAAAAEAAAAAAAAAAEAAAB3d3cKAAAAACgAAAAoAAAAZAAAAGQAAAAAAAAAzMzMAAAAAABQAAAAUAAAAGQAAABkAAAAAAAAABcAAAAUAAAAAAAAAAAAAAD/fwAA/38AAAAAAAAJAAAABAAAAAAAAAAMAAAAEAAAAAAAAAAAAAAAAAAAAAAAAAAeAAAAaAAAAAAAAAAAAAAAAAAAAAAAAAAAAAAAECcAABAnAAAAAAAAAAAAAAAAAAAAAAAAAAAAAAAAAAAAAAAAAAAAABQAAAAAAAAAwMD/AAAAAABkAAAAMgAAAAAAAABkAAAAAAAAAH9/fwAKAAAAHwAAAFQAAAAAAAAFAAAAAQAAAAAAAAAAAAAAAAAAAAAAAAAAAAAAAAAAAAAAAAAAAAAAAn9/fwAAAAADzMzMAMDA/wB/f38AAAAAAAAAAAAAAAAAAAAAAAAAAAAhAAAAGAAAABQAAABQKAAAGycAAHA1AABZKQAAAAAAACYAAAAIAAAAAAAAAAAAAAA="/>
-              </a:ext>
-            </a:extLst>
           </p:cNvSpPr>
           <p:nvPr>
             <p:ph type="sldNum" sz="quarter" idx="12"/>
@@ -588,10 +511,10 @@
           <a:bodyPr/>
           <a:lstStyle/>
           <a:p>
-            <a:pPr/>
             <a:fld id="{2E7247D6-98C3-27B1-8DCA-6EE409847B3B}" type="slidenum">
-              <a:t/>
+              <a:rPr/>
             </a:fld>
+            <a:endParaRPr/>
           </a:p>
         </p:txBody>
       </p:sp>
@@ -604,7 +527,7 @@
 </file>
 
 <file path=ppt/slideLayouts/slideLayout11.xml><?xml version="1.0" encoding="utf-8"?>
-<p:sldLayout xmlns:p="http://schemas.openxmlformats.org/presentationml/2006/main" xmlns:p14="http://schemas.microsoft.com/office/powerpoint/2010/main" xmlns:r="http://schemas.openxmlformats.org/officeDocument/2006/relationships" xmlns:a="http://schemas.openxmlformats.org/drawingml/2006/main" type="vertTitleAndTx">
+<p:sldLayout xmlns:a="http://schemas.openxmlformats.org/drawingml/2006/main" xmlns:r="http://schemas.openxmlformats.org/officeDocument/2006/relationships" xmlns:p="http://schemas.openxmlformats.org/presentationml/2006/main" type="vertTitleAndTx">
   <p:cSld name="Titre vertical et texte">
     <p:spTree>
       <p:nvGrpSpPr>
@@ -625,14 +548,9 @@
           <p:cNvPr id="2" name="TitreDiapositive1"/>
           <p:cNvSpPr>
             <a:spLocks noGrp="1" noChangeArrowheads="1"/>
-            <a:extLst>
-              <a:ext uri="smNativeData">
-                <pr:smNativeData xmlns:pr="smNativeData" val="SMDATA_13_fWmYYBMAAAAlAAAAZAAAAA8BAAAAkAAAAEgAAACQAAAASAAAAAAAAAACAAAAAQAAAAEAAABQAAAAAAAAAAAA4D8AAAAAAADgPwAAAAAAAOA/AAAAAAAA4D8AAAAAAADgPwAAAAAAAOA/AAAAAAAA4D8AAAAAAADgPwAAAAAAAOA/AAAAAAAA4D8CAAAAjAAAAAAAAAAAAAAA///3DP//2QgAAAAAAAAAAAAAAAAAAAAAAAAAAAAAAAAAAAAAZAAAAAEAAABAAAAAAAAAAAAAAAAAAAAAAAAAAAAAAAAAAAAAAAAAAAAAAAAAAAAAAAAAAAAAAAAAAAAAAAAAAAAAAAAAAAAAAAAAAAAAAAAAAAAAAAAAAAAAAAAAAAAAFAAAADwAAAAAAAAAAAAAAAAAAAkUAAAAAQAAABQAAAAUAAAAFAAAAAEAAAAAAAAAZAAAAGQAAAAAAAAAZAAAAGQAAAAVAAAAYAAAAAAAAAAAAAAADwAAACADAAAAAAAAAAAAAAEAAACgMgAAVgcAAKr4//8BAAAAf39/AAEAAABkAAAAAAAAABQAAABAHwAAAAAAACYAAAAAAAAAwOD//wAAAAAmAAAAZAAAABYAAABMAAAAAAAAAAAAAAAEAAAAAAAAAAEAAAB3d3cKAAAAACgAAAAoAAAAZAAAAGQAAAAAAAAAzMzMAAAAAABQAAAAUAAAAGQAAABkAAAAAAAAABcAAAAUAAAAAAAAAAAAAAD/fwAA/38AAAAAAAAJAAAABAAAAAAAAAAMAAAAEAAAAAAAAAAAAAAAAAAAAAAAAAAeAAAAaAAAAAAAAAAAAAAAAAAAAAAAAAAAAAAAECcAABAnAAAAAAAAAAAAAAAAAAAAAAAAAAAAAAAAAAAAAAAAAAAAABQAAAAAAAAAwMD/AAAAAABkAAAAMgAAAAAAAABkAAAAAAAAAH9/fwAKAAAAHwAAAFQAAAAAAAAFAAAAAQAAAAAAAAAAAAAAAAAAAAAAAAAAAAAAAAAAAAAAAAAAAAAAAn9/fwAAAAADzMzMAMDA/wB/f38AAAAAAAAAAAAAAAAAAAAAAAAAAAAhAAAAGAAAABQAAADIKAAAsAEAAHA1AACwJQAAAAAAACYAAAAIAAAAgwAAAAAAAAA="/>
-              </a:ext>
-            </a:extLst>
-          </p:cNvSpPr>
-          <p:nvPr>
-            <p:ph type="title"/>
+          </p:cNvSpPr>
+          <p:nvPr>
+            <p:ph type="title" hasCustomPrompt="1"/>
           </p:nvPr>
         </p:nvSpPr>
         <p:spPr>
@@ -642,14 +560,9 @@
           </a:xfrm>
         </p:spPr>
         <p:txBody>
-          <a:bodyPr vert="vert" wrap="square" numCol="1" spcCol="215900" anchor="b">
-            <a:prstTxWarp prst="textNoShape">
-              <a:avLst/>
-            </a:prstTxWarp>
-          </a:bodyPr>
-          <a:lstStyle/>
-          <a:p>
-            <a:pPr/>
+          <a:bodyPr vert="vert" wrap="square" numCol="1" spcCol="215900" anchor="b"/>
+          <a:lstStyle/>
+          <a:p>
             <a:r>
               <a:t>Cliquez pour modifier le style du masque de titre</a:t>
             </a:r>
@@ -661,14 +574,9 @@
           <p:cNvPr id="3" name="TexteDiapositive1"/>
           <p:cNvSpPr>
             <a:spLocks noGrp="1" noChangeArrowheads="1"/>
-            <a:extLst>
-              <a:ext uri="smNativeData">
-                <pr:smNativeData xmlns:pr="smNativeData" val="SMDATA_13_fWmYYBMAAAAlAAAAZAAAAA8BAAAAkAAAAEgAAACQAAAASAAAAAAAAAAAAAAAAQAAAAEAAABQAAAAAAAAAAAA4D8AAAAAAADgPwAAAAAAAOA/AAAAAAAA4D8AAAAAAADgPwAAAAAAAOA/AAAAAAAA4D8AAAAAAADgPwAAAAAAAOA/AAAAAAAA4D8CAAAAjAAAAAAAAAAAAAAA///3DP//2QgAAAAAAAAAAAAAAAAAAAAAAAAAAAAAAAAAAAAAZAAAAAEAAABAAAAAAAAAAAAAAAAAAAAAAAAAAAAAAAAAAAAAAAAAAAAAAAAAAAAAAAAAAAAAAAAAAAAAAAAAAAAAAAAAAAAAAAAAAAAAAAAAAAAAAAAAAAAAAAAAAAAAFAAAADwAAAAAAAAAAAAAAAAAAAkUAAAAAQAAABQAAAAUAAAAFAAAAAEAAAAAAAAAZAAAAGQAAAAAAAAAZAAAAGQAAAAVAAAAYAAAAAAAAAAAAAAADwAAACADAAAAAAAAAAAAAAEAAACgMgAAVgcAAKr4//8BAAAAf39/AAEAAABkAAAAAAAAABQAAABAHwAAAAAAACYAAAAAAAAAwOD//wAAAAAmAAAAZAAAABYAAABMAAAAAAAAAAAAAAAEAAAAAAAAAAEAAAB3d3cKAAAAACgAAAAoAAAAZAAAAGQAAAAAAAAAzMzMAAAAAABQAAAAUAAAAGQAAABkAAAAAAAAABcAAAAUAAAAAAAAAAAAAAD/fwAA/38AAAAAAAAJAAAABAAAAAAAAAAMAAAAEAAAAAAAAAAAAAAAAAAAAAAAAAAeAAAAaAAAAAAAAAAAAAAAAAAAAAAAAAAAAAAAECcAABAnAAAAAAAAAAAAAAAAAAAAAAAAAAAAAAAAAAAAAAAAAAAAABQAAAAAAAAAwMD/AAAAAABkAAAAMgAAAAAAAABkAAAAAAAAAH9/fwAKAAAAHwAAAFQAAAAAAAAFAAAAAQAAAAAAAAAAAAAAAAAAAAAAAAAAAAAAAAAAAAAAAAAAAAAAAn9/fwAAAAADzMzMAMDA/wB/f38AAAAAAAAAAAAAAAAAAAAAAAAAAAAhAAAAGAAAABQAAADQAgAAsAEAANgnAACwJQAAAAAAACYAAAAIAAAAAwAAAAAAAAA="/>
-              </a:ext>
-            </a:extLst>
-          </p:cNvSpPr>
-          <p:nvPr>
-            <p:ph idx="1"/>
+          </p:cNvSpPr>
+          <p:nvPr>
+            <p:ph idx="1" hasCustomPrompt="1"/>
           </p:nvPr>
         </p:nvSpPr>
         <p:spPr>
@@ -678,14 +586,9 @@
           </a:xfrm>
         </p:spPr>
         <p:txBody>
-          <a:bodyPr vert="vert" wrap="square" numCol="1" spcCol="215900" anchor="t">
-            <a:prstTxWarp prst="textNoShape">
-              <a:avLst/>
-            </a:prstTxWarp>
-          </a:bodyPr>
-          <a:lstStyle/>
-          <a:p>
-            <a:pPr/>
+          <a:bodyPr vert="vert" wrap="square" numCol="1" spcCol="215900" anchor="t"/>
+          <a:lstStyle/>
+          <a:p>
             <a:r>
               <a:t>Cliquez pour modifier les styles du masque de texte</a:t>
             </a:r>
@@ -721,11 +624,6 @@
           <p:cNvPr id="4" name="ZoneEstampille1"/>
           <p:cNvSpPr>
             <a:spLocks noGrp="1" noChangeArrowheads="1"/>
-            <a:extLst>
-              <a:ext uri="smNativeData">
-                <pr:smNativeData xmlns:pr="smNativeData" val="SMDATA_13_fWmYYBMAAAAlAAAAZAAAAA8BAAAAkAAAAEgAAACQAAAASAAAAAAAAAABAAAAAAAAAAEAAABQAAAAAAAAAAAA4D8AAAAAAADgPwAAAAAAAOA/AAAAAAAA4D8AAAAAAADgPwAAAAAAAOA/AAAAAAAA4D8AAAAAAADgPwAAAAAAAOA/AAAAAAAA4D8CAAAAjAAAAAAAAAAAAAAA///3DP//2QgAAAAAAAAAAAAAAAAAAAAAAAAAAAAAAAAAAAAAZAAAAAEAAABAAAAAAAAAAAAAAAAAAAAAAAAAAAAAAAAAAAAAAAAAAAAAAAAAAAAAAAAAAAAAAAAAAAAAAAAAAAAAAAAAAAAAAAAAAAAAAAAAAAAAAAAAAAAAAAAAAAAAFAAAADwAAAAAAAAAAAAAAAAAAAkUAAAAAQAAABQAAAAUAAAAFAAAAAEAAAAAAAAAZAAAAGQAAAAAAAAAZAAAAGQAAAAVAAAAYAAAAAAAAAAAAAAADwAAACADAAAAAAAAAAAAAAEAAACgMgAAVgcAAKr4//8BAAAAf39/AAEAAABkAAAAAAAAABQAAABAHwAAAAAAACYAAAAAAAAAwOD//wAAAAAmAAAAZAAAABYAAABMAAAAAAAAAAAAAAAEAAAAAAAAAAEAAAB3d3cKAAAAACgAAAAoAAAAZAAAAGQAAAAAAAAAzMzMAAAAAABQAAAAUAAAAGQAAABkAAAAAAAAABcAAAAUAAAAAAAAAAAAAAD/fwAA/38AAAAAAAAJAAAABAAAAAAAAAAMAAAAEAAAAAAAAAAAAAAAAAAAAAAAAAAeAAAAaAAAAAAAAAAAAAAAAAAAAAAAAAAAAAAAECcAABAnAAAAAAAAAAAAAAAAAAAAAAAAAAAAAAAAAAAAAAAAAAAAABQAAAAAAAAAwMD/AAAAAABkAAAAMgAAAAAAAABkAAAAAAAAAH9/fwAKAAAAHwAAAFQAAAAAAAAFAAAAAQAAAAAAAAAAAAAAAAAAAAAAAAAAAAAAAAAAAAAAAAAAAAAAAn9/fwAAAAADzMzMAMDA/wB/f38AAAAAAAAAAAAAAAAAAAAAAAAAAAAhAAAAGAAAABQAAADQAgAAGycAAPAPAABZKQAAAAAAACYAAAAIAAAAAAAAAAAAAAA="/>
-              </a:ext>
-            </a:extLst>
           </p:cNvSpPr>
           <p:nvPr>
             <p:ph type="dt" sz="quarter" idx="10"/>
@@ -736,10 +634,10 @@
           <a:bodyPr/>
           <a:lstStyle/>
           <a:p>
-            <a:pPr/>
             <a:fld id="{4DD2FFBD-F3A0-8709-EE6A-055CB1241850}" type="datetime1">
-              <a:t/>
+              <a:rPr/>
             </a:fld>
+            <a:endParaRPr/>
           </a:p>
         </p:txBody>
       </p:sp>
@@ -748,11 +646,6 @@
           <p:cNvPr id="5" name="ZonePiedDePage1"/>
           <p:cNvSpPr>
             <a:spLocks noGrp="1" noChangeArrowheads="1"/>
-            <a:extLst>
-              <a:ext uri="smNativeData">
-                <pr:smNativeData xmlns:pr="smNativeData" val="SMDATA_13_fWmYYBMAAAAlAAAAZAAAAA8BAAAAkAAAAEgAAACQAAAASAAAAAAAAAABAAAAAAAAAAEAAABQAAAAAAAAAAAA4D8AAAAAAADgPwAAAAAAAOA/AAAAAAAA4D8AAAAAAADgPwAAAAAAAOA/AAAAAAAA4D8AAAAAAADgPwAAAAAAAOA/AAAAAAAA4D8CAAAAjAAAAAAAAAAAAAAA///3DP//2QgAAAAAAAAAAAAAAAAAAAAAAAAAAAAAAAAAAAAAZAAAAAEAAABAAAAAAAAAAAAAAAAAAAAAAAAAAAAAAAAAAAAAAAAAAAAAAAAAAAAAAAAAAAAAAAAAAAAAAAAAAAAAAAAAAAAAAAAAAAAAAAAAAAAAAAAAAAAAAAAAAAAAFAAAADwAAAAAAAAAAAAAAAAAAAkUAAAAAQAAABQAAAAUAAAAFAAAAAEAAAAAAAAAZAAAAGQAAAAAAAAAZAAAAGQAAAAVAAAAYAAAAAAAAAAAAAAADwAAACADAAAAAAAAAAAAAAEAAACgMgAAVgcAAKr4//8BAAAAf39/AAEAAABkAAAAAAAAABQAAABAHwAAAAAAACYAAAAAAAAAwOD//wAAAAAmAAAAZAAAABYAAABMAAAAAAAAAAAAAAAEAAAAAAAAAAEAAAB3d3cKAAAAACgAAAAoAAAAZAAAAGQAAAAAAAAAzMzMAAAAAABQAAAAUAAAAGQAAABkAAAAAAAAABcAAAAUAAAAAAAAAAAAAAD/fwAA/38AAAAAAAAJAAAABAAAAAAAAAAMAAAAEAAAAAAAAAAAAAAAAAAAAAAAAAAeAAAAaAAAAAAAAAAAAAAAAAAAAAAAAAAAAAAAECcAABAnAAAAAAAAAAAAAAAAAAAAAAAAAAAAAAAAAAAAAAAAAAAAABQAAAAAAAAAwMD/AAAAAABkAAAAMgAAAAAAAABkAAAAAAAAAH9/fwAKAAAAHwAAAFQAAAAAAAAFAAAAAQAAAAAAAAAAAAAAAAAAAAAAAAAAAAAAAAAAAAAAAAAAAAAAAn9/fwAAAAADzMzMAMDA/wB/f38AAAAAAAAAAAAAAAAAAAAAAAAAAAAhAAAAGAAAABQAAAA4EwAAGycAAAglAABZKQAAAAAAACYAAAAIAAAAAAAAAAAAAAA="/>
-              </a:ext>
-            </a:extLst>
           </p:cNvSpPr>
           <p:nvPr>
             <p:ph type="ftr" sz="quarter" idx="11"/>
@@ -762,12 +655,7 @@
         <p:txBody>
           <a:bodyPr/>
           <a:lstStyle/>
-          <a:p>
-            <a:pPr/>
-            <a:r>
-              <a:t/>
-            </a:r>
-          </a:p>
+          <a:p/>
         </p:txBody>
       </p:sp>
       <p:sp>
@@ -775,11 +663,6 @@
           <p:cNvPr id="6" name="ZoneNuméroDiapositive1"/>
           <p:cNvSpPr>
             <a:spLocks noGrp="1" noChangeArrowheads="1"/>
-            <a:extLst>
-              <a:ext uri="smNativeData">
-                <pr:smNativeData xmlns:pr="smNativeData" val="SMDATA_13_fWmYYBMAAAAlAAAAZAAAAA8BAAAAkAAAAEgAAACQAAAASAAAAAAAAAABAAAAAAAAAAEAAABQAAAAAAAAAAAA4D8AAAAAAADgPwAAAAAAAOA/AAAAAAAA4D8AAAAAAADgPwAAAAAAAOA/AAAAAAAA4D8AAAAAAADgPwAAAAAAAOA/AAAAAAAA4D8CAAAAjAAAAAAAAAAAAAAA///3DP//2QgAAAAAAAAAAAAAAAAAAAAAAAAAAAAAAAAAAAAAZAAAAAEAAABAAAAAAAAAAAAAAAAAAAAAAAAAAAAAAAAAAAAAAAAAAAAAAAAAAAAAAAAAAAAAAAAAAAAAAAAAAAAAAAAAAAAAAAAAAAAAAAAAAAAAAAAAAAAAAAAAAAAAFAAAADwAAAAAAAAAAAAAAAAAAAkUAAAAAQAAABQAAAAUAAAAFAAAAAEAAAAAAAAAZAAAAGQAAAAAAAAAZAAAAGQAAAAVAAAAYAAAAAAAAAAAAAAADwAAACADAAAAAAAAAAAAAAEAAACgMgAAVgcAAKr4//8BAAAAf39/AAEAAABkAAAAAAAAABQAAABAHwAAAAAAACYAAAAAAAAAwOD//wAAAAAmAAAAZAAAABYAAABMAAAAAAAAAAAAAAAEAAAAAAAAAAEAAAB3d3cKAAAAACgAAAAoAAAAZAAAAGQAAAAAAAAAzMzMAAAAAABQAAAAUAAAAGQAAABkAAAAAAAAABcAAAAUAAAAAAAAAAAAAAD/fwAA/38AAAAAAAAJAAAABAAAAAAAAAAMAAAAEAAAAAAAAAAAAAAAAAAAAAAAAAAeAAAAaAAAAAAAAAAAAAAAAAAAAAAAAAAAAAAAECcAABAnAAAAAAAAAAAAAAAAAAAAAAAAAAAAAAAAAAAAAAAAAAAAABQAAAAAAAAAwMD/AAAAAABkAAAAMgAAAAAAAABkAAAAAAAAAH9/fwAKAAAAHwAAAFQAAAAAAAAFAAAAAQAAAAAAAAAAAAAAAAAAAAAAAAAAAAAAAAAAAAAAAAAAAAAAAn9/fwAAAAADzMzMAMDA/wB/f38AAAAAAAAAAAAAAAAAAAAAAAAAAAAhAAAAGAAAABQAAABQKAAAGycAAHA1AABZKQAAAAAAACYAAAAIAAAAAAAAAAAAAAA="/>
-              </a:ext>
-            </a:extLst>
           </p:cNvSpPr>
           <p:nvPr>
             <p:ph type="sldNum" sz="quarter" idx="12"/>
@@ -790,10 +673,10 @@
           <a:bodyPr/>
           <a:lstStyle/>
           <a:p>
-            <a:pPr/>
             <a:fld id="{332C0D30-7EDE-79FB-9094-88AE43DA66DD}" type="slidenum">
-              <a:t/>
+              <a:rPr/>
             </a:fld>
+            <a:endParaRPr/>
           </a:p>
         </p:txBody>
       </p:sp>
@@ -806,7 +689,7 @@
 </file>
 
 <file path=ppt/slideLayouts/slideLayout2.xml><?xml version="1.0" encoding="utf-8"?>
-<p:sldLayout xmlns:p="http://schemas.openxmlformats.org/presentationml/2006/main" xmlns:p14="http://schemas.microsoft.com/office/powerpoint/2010/main" xmlns:r="http://schemas.openxmlformats.org/officeDocument/2006/relationships" xmlns:a="http://schemas.openxmlformats.org/drawingml/2006/main" type="tx">
+<p:sldLayout xmlns:a="http://schemas.openxmlformats.org/drawingml/2006/main" xmlns:r="http://schemas.openxmlformats.org/officeDocument/2006/relationships" xmlns:p="http://schemas.openxmlformats.org/presentationml/2006/main" type="tx">
   <p:cSld name="Titre et contenu">
     <p:spTree>
       <p:nvGrpSpPr>
@@ -827,14 +710,9 @@
           <p:cNvPr id="2" name="TitreDiapositive1"/>
           <p:cNvSpPr>
             <a:spLocks noGrp="1" noChangeArrowheads="1"/>
-            <a:extLst>
-              <a:ext uri="smNativeData">
-                <pr:smNativeData xmlns:pr="smNativeData" val="SMDATA_13_fWmYYBMAAAAlAAAAZAAAAA8BAAAAkAAAAEgAAACQAAAASAAAAAAAAAABAAAAAAAAAAEAAABQAAAAAAAAAAAA4D8AAAAAAADgPwAAAAAAAOA/AAAAAAAA4D8AAAAAAADgPwAAAAAAAOA/AAAAAAAA4D8AAAAAAADgPwAAAAAAAOA/AAAAAAAA4D8CAAAAjAAAAAAAAAAAAAAA///3DP//2QgAAAAAAAAAAAAAAAAAAAAAAAAAAAAAAAAAAAAAZAAAAAEAAABAAAAAAAAAAAAAAAAAAAAAAAAAAAAAAAAAAAAAAAAAAAAAAAAAAAAAAAAAAAAAAAAAAAAAAAAAAAAAAAAAAAAAAAAAAAAAAAAAAAAAAAAAAAAAAAAAAAAAFAAAADwAAAAAAAAAAAAAAAAAAAkUAAAAAQAAABQAAAAUAAAAFAAAAAEAAAAAAAAAZAAAAGQAAAAAAAAAZAAAAGQAAAAVAAAAYAAAAAAAAAAAAAAADwAAACADAAAAAAAAAAAAAAEAAACgMgAAVgcAAKr4//8BAAAAf39/AAEAAABkAAAAAAAAABQAAABAHwAAAAAAACYAAAAAAAAAwOD//wAAAAAmAAAAZAAAABYAAABMAAAAAAAAAAAAAAAEAAAAAAAAAAEAAAB3d3cKAAAAACgAAAAoAAAAZAAAAGQAAAAAAAAAzMzMAAAAAABQAAAAUAAAAGQAAABkAAAAAAAAABcAAAAUAAAAAAAAAAAAAAD/fwAA/38AAAAAAAAJAAAABAAAAAAAAAAMAAAAEAAAAAAAAAAAAAAAAAAAAAAAAAAeAAAAaAAAAAAAAAAAAAAAAAAAAAAAAAAAAAAAECcAABAnAAAAAAAAAAAAAAAAAAAAAAAAAAAAAAAAAAAAAAAAAAAAABQAAAAAAAAAwMD/AAAAAABkAAAAMgAAAAAAAABkAAAAAAAAAH9/fwAKAAAAHwAAAFQAAAAAAAAFAAAAAQAAAAAAAAAAAAAAAAAAAAAAAAAAAAAAAAAAAAAAAAAAAAAAAn9/fwAAAAADzMzMAMDA/wB/f38AAAAAAAAAAAAAAAAAAAAAAAAAAAAhAAAAGAAAABQAAADQAgAAsAEAAHA1AAC4CAAAAAAAACYAAAAIAAAAAAAAAAAAAAA="/>
-              </a:ext>
-            </a:extLst>
-          </p:cNvSpPr>
-          <p:nvPr>
-            <p:ph type="title"/>
+          </p:cNvSpPr>
+          <p:nvPr>
+            <p:ph type="title" hasCustomPrompt="1"/>
           </p:nvPr>
         </p:nvSpPr>
         <p:spPr/>
@@ -842,7 +720,6 @@
           <a:bodyPr/>
           <a:lstStyle/>
           <a:p>
-            <a:pPr/>
             <a:r>
               <a:t>Cliquez pour modifier le style du masque de titre</a:t>
             </a:r>
@@ -854,14 +731,9 @@
           <p:cNvPr id="3" name="TexteDiapositive1"/>
           <p:cNvSpPr>
             <a:spLocks noGrp="1" noChangeArrowheads="1"/>
-            <a:extLst>
-              <a:ext uri="smNativeData">
-                <pr:smNativeData xmlns:pr="smNativeData" val="SMDATA_13_fWmYYBMAAAAlAAAAZAAAAA8BAAAAkAAAAEgAAACQAAAASAAAAAAAAAAAAAAAAAAAAAEAAABQAAAAAAAAAAAA4D8AAAAAAADgPwAAAAAAAOA/AAAAAAAA4D8AAAAAAADgPwAAAAAAAOA/AAAAAAAA4D8AAAAAAADgPwAAAAAAAOA/AAAAAAAA4D8CAAAAjAAAAAAAAAAAAAAA///3DP//2QgAAAAAAAAAAAAAAAAAAAAAAAAAAAAAAAAAAAAAZAAAAAEAAABAAAAAAAAAAAAAAAAAAAAAAAAAAAAAAAAAAAAAAAAAAAAAAAAAAAAAAAAAAAAAAAAAAAAAAAAAAAAAAAAAAAAAAAAAAAAAAAAAAAAAAAAAAAAAAAAAAAAAFAAAADwAAAAAAAAAAAAAAAAAAAkUAAAAAQAAABQAAAAUAAAAFAAAAAEAAAAAAAAAZAAAAGQAAAAAAAAAZAAAAGQAAAAVAAAAYAAAAAAAAAAAAAAADwAAACADAAAAAAAAAAAAAAEAAACgMgAAVgcAAKr4//8BAAAAf39/AAEAAABkAAAAAAAAABQAAABAHwAAAAAAACYAAAAAAAAAwOD//wAAAAAmAAAAZAAAABYAAABMAAAAAAAAAAAAAAAEAAAAAAAAAAEAAAB3d3cKAAAAACgAAAAoAAAAZAAAAGQAAAAAAAAAzMzMAAAAAABQAAAAUAAAAGQAAABkAAAAAAAAABcAAAAUAAAAAAAAAAAAAAD/fwAA/38AAAAAAAAJAAAABAAAAKAMOS0MAAAAEAAAAAAAAAAAAAAAAAAAAAAAAAAeAAAAaAAAAAAAAAAAAAAAAAAAAAAAAAAAAAAAECcAABAnAAAAAAAAAAAAAAAAAAAAAAAAAAAAAAAAAAAAAAAAAAAAABQAAAAAAAAAwMD/AAAAAABkAAAAMgAAAAAAAABkAAAAAAAAAH9/fwAKAAAAHwAAAFQAAAAAAAAFAAAAAQAAAAAAAAAAAAAAAAAAAAAAAAAAAAAAAAAAAAAAAAAAAAAAAn9/fwAAAAADzMzMAMDA/wB/f38AAAAAAAAAAAAAAAAAAAAAAAAAAAAhAAAAGAAAABQAAADQAgAA2AkAAHA1AACwJQAAAAAAACYAAAAIAAAAAAAAAAAAAAA="/>
-              </a:ext>
-            </a:extLst>
-          </p:cNvSpPr>
-          <p:nvPr>
-            <p:ph idx="1"/>
+          </p:cNvSpPr>
+          <p:nvPr>
+            <p:ph idx="1" hasCustomPrompt="1"/>
           </p:nvPr>
         </p:nvSpPr>
         <p:spPr/>
@@ -869,7 +741,6 @@
           <a:bodyPr/>
           <a:lstStyle/>
           <a:p>
-            <a:pPr/>
             <a:r>
               <a:t>Cliquez pour modifier les styles du masque de texte</a:t>
             </a:r>
@@ -905,11 +776,6 @@
           <p:cNvPr id="4" name="ZoneEstampille1"/>
           <p:cNvSpPr>
             <a:spLocks noGrp="1" noChangeArrowheads="1"/>
-            <a:extLst>
-              <a:ext uri="smNativeData">
-                <pr:smNativeData xmlns:pr="smNativeData" val="SMDATA_13_fWmYYBMAAAAlAAAAZAAAAA8BAAAAkAAAAEgAAACQAAAASAAAAAAAAAABAAAAAAAAAAEAAABQAAAAAAAAAAAA4D8AAAAAAADgPwAAAAAAAOA/AAAAAAAA4D8AAAAAAADgPwAAAAAAAOA/AAAAAAAA4D8AAAAAAADgPwAAAAAAAOA/AAAAAAAA4D8CAAAAjAAAAAAAAAAAAAAA///3DP//2QgAAAAAAAAAAAAAAAAAAAAAAAAAAAAAAAAAAAAAZAAAAAEAAABAAAAAAAAAAAAAAAAAAAAAAAAAAAAAAAAAAAAAAAAAAAAAAAAAAAAAAAAAAAAAAAAAAAAAAAAAAAAAAAAAAAAAAAAAAAAAAAAAAAAAAAAAAAAAAAAAAAAAFAAAADwAAAAAAAAAAAAAAAAAAAkUAAAAAQAAABQAAAAUAAAAFAAAAAEAAAAAAAAAZAAAAGQAAAAAAAAAZAAAAGQAAAAVAAAAYAAAAAAAAAAAAAAADwAAACADAAAAAAAAAAAAAAEAAACgMgAAVgcAAKr4//8BAAAAf39/AAEAAABkAAAAAAAAABQAAABAHwAAAAAAACYAAAAAAAAAwOD//wAAAAAmAAAAZAAAABYAAABMAAAAAAAAAAAAAAAEAAAAAAAAAAEAAAB3d3cKAAAAACgAAAAoAAAAZAAAAGQAAAAAAAAAzMzMAAAAAABQAAAAUAAAAGQAAABkAAAAAAAAABcAAAAUAAAAAAAAAAAAAAD/fwAA/38AAAAAAAAJAAAABAAAAAAAAAAMAAAAEAAAAAAAAAAAAAAAAAAAAAAAAAAeAAAAaAAAAAAAAAAAAAAAAAAAAAAAAAAAAAAAECcAABAnAAAAAAAAAAAAAAAAAAAAAAAAAAAAAAAAAAAAAAAAAAAAABQAAAAAAAAAwMD/AAAAAABkAAAAMgAAAAAAAABkAAAAAAAAAH9/fwAKAAAAHwAAAFQAAAAAAAAFAAAAAQAAAAAAAAAAAAAAAAAAAAAAAAAAAAAAAAAAAAAAAAAAAAAAAn9/fwAAAAADzMzMAMDA/wB/f38AAAAAAAAAAAAAAAAAAAAAAAAAAAAhAAAAGAAAABQAAADQAgAAGycAAPAPAABZKQAAAAAAACYAAAAIAAAAAAAAAAAAAAA="/>
-              </a:ext>
-            </a:extLst>
           </p:cNvSpPr>
           <p:nvPr>
             <p:ph type="dt" sz="quarter" idx="10"/>
@@ -920,10 +786,10 @@
           <a:bodyPr/>
           <a:lstStyle/>
           <a:p>
-            <a:pPr/>
             <a:fld id="{2BEDDB14-5AC6-B82D-8855-AC78951B7EF9}" type="datetime1">
-              <a:t/>
+              <a:rPr/>
             </a:fld>
+            <a:endParaRPr/>
           </a:p>
         </p:txBody>
       </p:sp>
@@ -932,11 +798,6 @@
           <p:cNvPr id="5" name="ZonePiedDePage1"/>
           <p:cNvSpPr>
             <a:spLocks noGrp="1" noChangeArrowheads="1"/>
-            <a:extLst>
-              <a:ext uri="smNativeData">
-                <pr:smNativeData xmlns:pr="smNativeData" val="SMDATA_13_fWmYYBMAAAAlAAAAZAAAAA8BAAAAkAAAAEgAAACQAAAASAAAAAAAAAABAAAAAAAAAAEAAABQAAAAAAAAAAAA4D8AAAAAAADgPwAAAAAAAOA/AAAAAAAA4D8AAAAAAADgPwAAAAAAAOA/AAAAAAAA4D8AAAAAAADgPwAAAAAAAOA/AAAAAAAA4D8CAAAAjAAAAAAAAAAAAAAA///3DP//2QgAAAAAAAAAAAAAAAAAAAAAAAAAAAAAAAAAAAAAZAAAAAEAAABAAAAAAAAAAAAAAAAAAAAAAAAAAAAAAAAAAAAAAAAAAAAAAAAAAAAAAAAAAAAAAAAAAAAAAAAAAAAAAAAAAAAAAAAAAAAAAAAAAAAAAAAAAAAAAAAAAAAAFAAAADwAAAAAAAAAAAAAAAAAAAkUAAAAAQAAABQAAAAUAAAAFAAAAAEAAAAAAAAAZAAAAGQAAAAAAAAAZAAAAGQAAAAVAAAAYAAAAAAAAAAAAAAADwAAACADAAAAAAAAAAAAAAEAAACgMgAAVgcAAKr4//8BAAAAf39/AAEAAABkAAAAAAAAABQAAABAHwAAAAAAACYAAAAAAAAAwOD//wAAAAAmAAAAZAAAABYAAABMAAAAAAAAAAAAAAAEAAAAAAAAAAEAAAB3d3cKAAAAACgAAAAoAAAAZAAAAGQAAAAAAAAAzMzMAAAAAABQAAAAUAAAAGQAAABkAAAAAAAAABcAAAAUAAAAAAAAAAAAAAD/fwAA/38AAAAAAAAJAAAABAAAAARAKgQMAAAAEAAAAAAAAAAAAAAAAAAAAAAAAAAeAAAAaAAAAAAAAAAAAAAAAAAAAAAAAAAAAAAAECcAABAnAAAAAAAAAAAAAAAAAAAAAAAAAAAAAAAAAAAAAAAAAAAAABQAAAAAAAAAwMD/AAAAAABkAAAAMgAAAAAAAABkAAAAAAAAAH9/fwAKAAAAHwAAAFQAAAAAAAAFAAAAAQAAAAAAAAAAAAAAAAAAAAAAAAAAAAAAAAAAAAAAAAAAAAAAAn9/fwAAAAADzMzMAMDA/wB/f38AAAAAAAAAAAAAAAAAAAAAAAAAAAAhAAAAGAAAABQAAAA4EwAAGycAAAglAABZKQAAAAAAACYAAAAIAAAAAAAAAAAAAAA="/>
-              </a:ext>
-            </a:extLst>
           </p:cNvSpPr>
           <p:nvPr>
             <p:ph type="ftr" sz="quarter" idx="11"/>
@@ -946,12 +807,7 @@
         <p:txBody>
           <a:bodyPr/>
           <a:lstStyle/>
-          <a:p>
-            <a:pPr/>
-            <a:r>
-              <a:t/>
-            </a:r>
-          </a:p>
+          <a:p/>
         </p:txBody>
       </p:sp>
       <p:sp>
@@ -959,11 +815,6 @@
           <p:cNvPr id="6" name="ZoneNuméroDiapositive1"/>
           <p:cNvSpPr>
             <a:spLocks noGrp="1" noChangeArrowheads="1"/>
-            <a:extLst>
-              <a:ext uri="smNativeData">
-                <pr:smNativeData xmlns:pr="smNativeData" val="SMDATA_13_fWmYYBMAAAAlAAAAZAAAAA8BAAAAkAAAAEgAAACQAAAASAAAAAAAAAABAAAAAAAAAAEAAABQAAAAAAAAAAAA4D8AAAAAAADgPwAAAAAAAOA/AAAAAAAA4D8AAAAAAADgPwAAAAAAAOA/AAAAAAAA4D8AAAAAAADgPwAAAAAAAOA/AAAAAAAA4D8CAAAAjAAAAAAAAAAAAAAA///3DP//2QgAAAAAAAAAAAAAAAAAAAAAAAAAAAAAAAAAAAAAZAAAAAEAAABAAAAAAAAAAAAAAAAAAAAAAAAAAAAAAAAAAAAAAAAAAAAAAAAAAAAAAAAAAAAAAAAAAAAAAAAAAAAAAAAAAAAAAAAAAAAAAAAAAAAAAAAAAAAAAAAAAAAAFAAAADwAAAAAAAAAAAAAAAAAAAkUAAAAAQAAABQAAAAUAAAAFAAAAAEAAAAAAAAAZAAAAGQAAAAAAAAAZAAAAGQAAAAVAAAAYAAAAAAAAAAAAAAADwAAACADAAAAAAAAAAAAAAEAAACgMgAAVgcAAKr4//8BAAAAf39/AAEAAABkAAAAAAAAABQAAABAHwAAAAAAACYAAAAAAAAAwOD//wAAAAAmAAAAZAAAABYAAABMAAAAAAAAAAAAAAAEAAAAAAAAAAEAAAB3d3cKAAAAACgAAAAoAAAAZAAAAGQAAAAAAAAAzMzMAAAAAABQAAAAUAAAAGQAAABkAAAAAAAAABcAAAAUAAAAAAAAAAAAAAD/fwAA/38AAAAAAAAJAAAABAAAAJpGKREMAAAAEAAAAAAAAAAAAAAAAAAAAAAAAAAeAAAAaAAAAAAAAAAAAAAAAAAAAAAAAAAAAAAAECcAABAnAAAAAAAAAAAAAAAAAAAAAAAAAAAAAAAAAAAAAAAAAAAAABQAAAAAAAAAwMD/AAAAAABkAAAAMgAAAAAAAABkAAAAAAAAAH9/fwAKAAAAHwAAAFQAAAAAAAAFAAAAAQAAAAAAAAAAAAAAAAAAAAAAAAAAAAAAAAAAAAAAAAAAAAAAAn9/fwAAAAADzMzMAMDA/wB/f38AAAAAAAAAAAAAAAAAAAAAAAAAAAAhAAAAGAAAABQAAABQKAAAGycAAHA1AABZKQAAAAAAACYAAAAIAAAAAAAAAAAAAAA="/>
-              </a:ext>
-            </a:extLst>
           </p:cNvSpPr>
           <p:nvPr>
             <p:ph type="sldNum" sz="quarter" idx="12"/>
@@ -974,10 +825,10 @@
           <a:bodyPr/>
           <a:lstStyle/>
           <a:p>
-            <a:pPr/>
             <a:fld id="{2B97F791-DFC6-C201-882F-2954B9617E7C}" type="slidenum">
-              <a:t/>
+              <a:rPr/>
             </a:fld>
+            <a:endParaRPr/>
           </a:p>
         </p:txBody>
       </p:sp>
@@ -990,7 +841,7 @@
 </file>
 
 <file path=ppt/slideLayouts/slideLayout3.xml><?xml version="1.0" encoding="utf-8"?>
-<p:sldLayout xmlns:p="http://schemas.openxmlformats.org/presentationml/2006/main" xmlns:p14="http://schemas.microsoft.com/office/powerpoint/2010/main" xmlns:r="http://schemas.openxmlformats.org/officeDocument/2006/relationships" xmlns:a="http://schemas.openxmlformats.org/drawingml/2006/main" type="secHead">
+<p:sldLayout xmlns:a="http://schemas.openxmlformats.org/drawingml/2006/main" xmlns:r="http://schemas.openxmlformats.org/officeDocument/2006/relationships" xmlns:p="http://schemas.openxmlformats.org/presentationml/2006/main" type="secHead">
   <p:cSld name="En-tête de section">
     <p:spTree>
       <p:nvGrpSpPr>
@@ -1011,14 +862,9 @@
           <p:cNvPr id="2" name="TitreDiapositive1"/>
           <p:cNvSpPr>
             <a:spLocks noGrp="1" noChangeArrowheads="1"/>
-            <a:extLst>
-              <a:ext uri="smNativeData">
-                <pr:smNativeData xmlns:pr="smNativeData" val="SMDATA_13_fWmYYBMAAAAlAAAAZAAAAA8BAAAAkAAAAEgAAACQAAAASAAAAAAAAAAAAAAAAAAAAAEAAABQAAAAAAAAAAAA4D8AAAAAAADgPwAAAAAAAOA/AAAAAAAA4D8AAAAAAADgPwAAAAAAAOA/AAAAAAAA4D8AAAAAAADgPwAAAAAAAOA/AAAAAAAA4D8CAAAAjAAAAAAAAAAAAAAA///3DP//2QgAAAAAAAAAAAAAAAAAAAAAAAAAAAAAAAAAAAAAZAAAAAEAAABAAAAAAAAAAAAAAAAAAAAAAAAAAAAAAAAAAAAAAAAAAAAAAAAAAAAAAAAAAAAAAAAAAAAAAAAAAAAAAAAAAAAAAAAAAAAAAAAAAAAAAAAAAAAAAAAAAAAAFAAAADwAAAAAAAAAAAAAAAAAAAkUAAAAAQAAABQAAAAUAAAAFAAAAAEAAAAAAAAAZAAAAGQAAAAAAAAAZAAAAGQAAAAVAAAAYAAAAAAAAAAAAAAADwAAACADAAAAAAAAAAAAAAEAAACgMgAAVgcAAKr4//8BAAAAf39/AAEAAABkAAAAAAAAABQAAABAHwAAAAAAACYAAAAAAAAAwOD//wAAAAAmAAAAZAAAABYAAABMAAAAAAAAAAAAAAAEAAAAAAAAAAEAAAB3d3cKAAAAACgAAAAoAAAAZAAAAGQAAAAAAAAAzMzMAAAAAABQAAAAUAAAAGQAAABkAAAAAAAAABcAAAAUAAAAAAAAAAAAAAD/fwAA/38AAAAAAAAJAAAABAAAAA8AAAAMAAAAEAAAAAAAAAAAAAAAAAAAAAAAAAAeAAAAaAAAAAAAAAAAAAAAAAAAAAAAAAAAAAAAECcAABAnAAAAAAAAAAAAAAAAAAAAAAAAAAAAAAAAAAAAAAAAAAAAABQAAAAAAAAAwMD/AAAAAABkAAAAMgAAAAAAAABkAAAAAAAAAH9/fwAKAAAAHwAAAFQAAAAAAAAFAAAAAQAAAAAAAAAAAAAAAAAAAAAAAAAAAAAAAAAAAAAAAAAAAAAAAn9/fwAAAAADzMzMAMDA/wB/f38AAAAAAAAAAAAAAAAAAAAAAAAAAAAhAAAAGAAAABQAAAByBAAAHBsAAEI0AAB9IwAAAAAAACYAAAAIAAAAgYAAAAAAAAA="/>
-              </a:ext>
-            </a:extLst>
-          </p:cNvSpPr>
-          <p:nvPr>
-            <p:ph type="title"/>
+          </p:cNvSpPr>
+          <p:nvPr>
+            <p:ph type="title" hasCustomPrompt="1"/>
           </p:nvPr>
         </p:nvSpPr>
         <p:spPr>
@@ -1028,11 +874,7 @@
           </a:xfrm>
         </p:spPr>
         <p:txBody>
-          <a:bodyPr vert="horz" wrap="square" numCol="1" spcCol="215900" anchor="t">
-            <a:prstTxWarp prst="textNoShape">
-              <a:avLst/>
-            </a:prstTxWarp>
-          </a:bodyPr>
+          <a:bodyPr vert="horz" wrap="square" numCol="1" spcCol="215900" anchor="t"/>
           <a:lstStyle>
             <a:lvl1pPr algn="l">
               <a:defRPr sz="4000" b="1" cap="all"/>
@@ -1053,14 +895,9 @@
           <p:cNvPr id="3" name="TexteDiapositive1"/>
           <p:cNvSpPr>
             <a:spLocks noGrp="1" noChangeArrowheads="1"/>
-            <a:extLst>
-              <a:ext uri="smNativeData">
-                <pr:smNativeData xmlns:pr="smNativeData" val="SMDATA_13_fWmYYBMAAAAlAAAAZAAAAA8BAAAAkAAAAEgAAACQAAAASAAAAAAAAAACAAAAAAAAAAEAAABQAAAAAAAAAAAA4D8AAAAAAADgPwAAAAAAAOA/AAAAAAAA4D8AAAAAAADgPwAAAAAAAOA/AAAAAAAA4D8AAAAAAADgPwAAAAAAAOA/AAAAAAAA4D8CAAAAjAAAAAAAAAAAAAAA///3DP//2QgAAAAAAAAAAAAAAAAAAAAAAAAAAAAAAAAAAAAAZAAAAAEAAABAAAAAAAAAAAAAAAAAAAAAAAAAAAAAAAAAAAAAAAAAAAAAAAAAAAAAAAAAAAAAAAAAAAAAAAAAAAAAAAAAAAAAAAAAAAAAAAAAAAAAAAAAAAAAAAAAAAAAFAAAADwAAAAAAAAAAAAAAAAAAAkUAAAAAQAAABQAAAAUAAAAFAAAAAEAAAAAAAAAZAAAAGQAAAAAAAAAZAAAAGQAAAAVAAAAYAAAAAAAAAAAAAAADwAAACADAAAAAAAAAAAAAAEAAACgMgAAVgcAAKr4//8BAAAAf39/AAEAAABkAAAAAAAAABQAAABAHwAAAAAAACYAAAAAAAAAwOD//wAAAAAmAAAAZAAAABYAAABMAAAAAAAAAAAAAAAEAAAAAAAAAAEAAAB3d3cKAAAAACgAAAAoAAAAZAAAAGQAAAAAAAAAzMzMAAAAAABQAAAAUAAAAGQAAABkAAAAAAAAABcAAAAUAAAAAAAAAAAAAAD/fwAA/38AAAAAAAAJAAAABAAAAAAAAAAMAAAAEAAAAAAAAAAAAAAAAAAAAAAAAAAeAAAAaAAAAAAAAAAAAAAAAAAAAAAAAAAAAAAAECcAABAnAAAAAAAAAAAAAAAAAAAAAAAAAAAAAAAAAAAAAAAAAAAAABQAAAAAAAAAwMD/AAAAAABkAAAAMgAAAAAAAABkAAAAAAAAAH9/fwAKAAAAHwAAAFQAAAAAAAAFAAAAAQAAAAAAAAAAAAAAAAAAAAAAAAAAAAAAAAAAAAAAAAAAAAAAAn9/fwAAAAADzMzMAMDA/wB/f38AAAAAAAAAAAAAAAAAAAAAAAAAAAAhAAAAGAAAABQAAAByBAAA4REAAEI0AAAcGwAAAAAAACYAAAAIAAAAgYAAAAAAAAA="/>
-              </a:ext>
-            </a:extLst>
-          </p:cNvSpPr>
-          <p:nvPr>
-            <p:ph idx="1"/>
+          </p:cNvSpPr>
+          <p:nvPr>
+            <p:ph idx="1" hasCustomPrompt="1"/>
           </p:nvPr>
         </p:nvSpPr>
         <p:spPr>
@@ -1070,11 +907,7 @@
           </a:xfrm>
         </p:spPr>
         <p:txBody>
-          <a:bodyPr vert="horz" wrap="square" numCol="1" spcCol="215900" anchor="b">
-            <a:prstTxWarp prst="textNoShape">
-              <a:avLst/>
-            </a:prstTxWarp>
-          </a:bodyPr>
+          <a:bodyPr vert="horz" wrap="square" numCol="1" spcCol="215900" anchor="b"/>
           <a:lstStyle>
             <a:lvl1pPr marL="0" indent="0">
               <a:buNone/>
@@ -1114,7 +947,6 @@
             </a:lvl9pPr>
           </a:lstStyle>
           <a:p>
-            <a:pPr/>
             <a:r>
               <a:t>Cliquez pour modifier les styles du masque de texte</a:t>
             </a:r>
@@ -1126,11 +958,6 @@
           <p:cNvPr id="4" name="ZoneEstampille1"/>
           <p:cNvSpPr>
             <a:spLocks noGrp="1" noChangeArrowheads="1"/>
-            <a:extLst>
-              <a:ext uri="smNativeData">
-                <pr:smNativeData xmlns:pr="smNativeData" val="SMDATA_13_fWmYYBMAAAAlAAAAZAAAAA8BAAAAkAAAAEgAAACQAAAASAAAAAAAAAABAAAAAAAAAAEAAABQAAAAAAAAAAAA4D8AAAAAAADgPwAAAAAAAOA/AAAAAAAA4D8AAAAAAADgPwAAAAAAAOA/AAAAAAAA4D8AAAAAAADgPwAAAAAAAOA/AAAAAAAA4D8CAAAAjAAAAAAAAAAAAAAA///3DP//2QgAAAAAAAAAAAAAAAAAAAAAAAAAAAAAAAAAAAAAZAAAAAEAAABAAAAAAAAAAAAAAAAAAAAAAAAAAAAAAAAAAAAAAAAAAAAAAAAAAAAAAAAAAAAAAAAAAAAAAAAAAAAAAAAAAAAAAAAAAAAAAAAAAAAAAAAAAAAAAAAAAAAAFAAAADwAAAAAAAAAAAAAAAAAAAkUAAAAAQAAABQAAAAUAAAAFAAAAAEAAAAAAAAAZAAAAGQAAAAAAAAAZAAAAGQAAAAVAAAAYAAAAAAAAAAAAAAADwAAACADAAAAAAAAAAAAAAEAAACgMgAAVgcAAKr4//8BAAAAf39/AAEAAABkAAAAAAAAABQAAABAHwAAAAAAACYAAAAAAAAAwOD//wAAAAAmAAAAZAAAABYAAABMAAAAAAAAAAAAAAAEAAAAAAAAAAEAAAB3d3cKAAAAACgAAAAoAAAAZAAAAGQAAAAAAAAAzMzMAAAAAABQAAAAUAAAAGQAAABkAAAAAAAAABcAAAAUAAAAAAAAAAAAAAD/fwAA/38AAAAAAAAJAAAABAAAAAAAAAAMAAAAEAAAAAAAAAAAAAAAAAAAAAAAAAAeAAAAaAAAAAAAAAAAAAAAAAAAAAAAAAAAAAAAECcAABAnAAAAAAAAAAAAAAAAAAAAAAAAAAAAAAAAAAAAAAAAAAAAABQAAAAAAAAAwMD/AAAAAABkAAAAMgAAAAAAAABkAAAAAAAAAH9/fwAKAAAAHwAAAFQAAAAAAAAFAAAAAQAAAAAAAAAAAAAAAAAAAAAAAAAAAAAAAAAAAAAAAAAAAAAAAn9/fwAAAAADzMzMAMDA/wB/f38AAAAAAAAAAAAAAAAAAAAAAAAAAAAhAAAAGAAAABQAAADQAgAAGycAAPAPAABZKQAAAAAAACYAAAAIAAAAAAAAAAAAAAA="/>
-              </a:ext>
-            </a:extLst>
           </p:cNvSpPr>
           <p:nvPr>
             <p:ph type="dt" sz="quarter" idx="10"/>
@@ -1141,10 +968,10 @@
           <a:bodyPr/>
           <a:lstStyle/>
           <a:p>
-            <a:pPr/>
             <a:fld id="{5009C974-3ABD-5C3F-F3B1-CC6A87FF0599}" type="datetime1">
-              <a:t/>
+              <a:rPr/>
             </a:fld>
+            <a:endParaRPr/>
           </a:p>
         </p:txBody>
       </p:sp>
@@ -1153,11 +980,6 @@
           <p:cNvPr id="5" name="ZonePiedDePage1"/>
           <p:cNvSpPr>
             <a:spLocks noGrp="1" noChangeArrowheads="1"/>
-            <a:extLst>
-              <a:ext uri="smNativeData">
-                <pr:smNativeData xmlns:pr="smNativeData" val="SMDATA_13_fWmYYBMAAAAlAAAAZAAAAA8BAAAAkAAAAEgAAACQAAAASAAAAAAAAAABAAAAAAAAAAEAAABQAAAAAAAAAAAA4D8AAAAAAADgPwAAAAAAAOA/AAAAAAAA4D8AAAAAAADgPwAAAAAAAOA/AAAAAAAA4D8AAAAAAADgPwAAAAAAAOA/AAAAAAAA4D8CAAAAjAAAAAAAAAAAAAAA///3DP//2QgAAAAAAAAAAAAAAAAAAAAAAAAAAAAAAAAAAAAAZAAAAAEAAABAAAAAAAAAAAAAAAAAAAAAAAAAAAAAAAAAAAAAAAAAAAAAAAAAAAAAAAAAAAAAAAAAAAAAAAAAAAAAAAAAAAAAAAAAAAAAAAAAAAAAAAAAAAAAAAAAAAAAFAAAADwAAAAAAAAAAAAAAAAAAAkUAAAAAQAAABQAAAAUAAAAFAAAAAEAAAAAAAAAZAAAAGQAAAAAAAAAZAAAAGQAAAAVAAAAYAAAAAAAAAAAAAAADwAAACADAAAAAAAAAAAAAAEAAACgMgAAVgcAAKr4//8BAAAAf39/AAEAAABkAAAAAAAAABQAAABAHwAAAAAAACYAAAAAAAAAwOD//wAAAAAmAAAAZAAAABYAAABMAAAAAAAAAAAAAAAEAAAAAAAAAAEAAAB3d3cKAAAAACgAAAAoAAAAZAAAAGQAAAAAAAAAzMzMAAAAAABQAAAAUAAAAGQAAABkAAAAAAAAABcAAAAUAAAAAAAAAAAAAAD/fwAA/38AAAAAAAAJAAAABAAAACYAAAAMAAAAEAAAAAAAAAAAAAAAAAAAAAAAAAAeAAAAaAAAAAAAAAAAAAAAAAAAAAAAAAAAAAAAECcAABAnAAAAAAAAAAAAAAAAAAAAAAAAAAAAAAAAAAAAAAAAAAAAABQAAAAAAAAAwMD/AAAAAABkAAAAMgAAAAAAAABkAAAAAAAAAH9/fwAKAAAAHwAAAFQAAAAAAAAFAAAAAQAAAAAAAAAAAAAAAAAAAAAAAAAAAAAAAAAAAAAAAAAAAAAAAn9/fwAAAAADzMzMAMDA/wB/f38AAAAAAAAAAAAAAAAAAAAAAAAAAAAhAAAAGAAAABQAAAA4EwAAGycAAAglAABZKQAAAAAAACYAAAAIAAAAAAAAAAAAAAA="/>
-              </a:ext>
-            </a:extLst>
           </p:cNvSpPr>
           <p:nvPr>
             <p:ph type="ftr" sz="quarter" idx="11"/>
@@ -1167,12 +989,7 @@
         <p:txBody>
           <a:bodyPr/>
           <a:lstStyle/>
-          <a:p>
-            <a:pPr/>
-            <a:r>
-              <a:t/>
-            </a:r>
-          </a:p>
+          <a:p/>
         </p:txBody>
       </p:sp>
       <p:sp>
@@ -1180,11 +997,6 @@
           <p:cNvPr id="6" name="ZoneNuméroDiapositive1"/>
           <p:cNvSpPr>
             <a:spLocks noGrp="1" noChangeArrowheads="1"/>
-            <a:extLst>
-              <a:ext uri="smNativeData">
-                <pr:smNativeData xmlns:pr="smNativeData" val="SMDATA_13_fWmYYBMAAAAlAAAAZAAAAA8BAAAAkAAAAEgAAACQAAAASAAAAAAAAAABAAAAAAAAAAEAAABQAAAAAAAAAAAA4D8AAAAAAADgPwAAAAAAAOA/AAAAAAAA4D8AAAAAAADgPwAAAAAAAOA/AAAAAAAA4D8AAAAAAADgPwAAAAAAAOA/AAAAAAAA4D8CAAAAjAAAAAAAAAAAAAAA///3DP//2QgAAAAAAAAAAAAAAAAAAAAAAAAAAAAAAAAAAAAAZAAAAAEAAABAAAAAAAAAAAAAAAAAAAAAAAAAAAAAAAAAAAAAAAAAAAAAAAAAAAAAAAAAAAAAAAAAAAAAAAAAAAAAAAAAAAAAAAAAAAAAAAAAAAAAAAAAAAAAAAAAAAAAFAAAADwAAAAAAAAAAAAAAAAAAAkUAAAAAQAAABQAAAAUAAAAFAAAAAEAAAAAAAAAZAAAAGQAAAAAAAAAZAAAAGQAAAAVAAAAYAAAAAAAAAAAAAAADwAAACADAAAAAAAAAAAAAAEAAACgMgAAVgcAAKr4//8BAAAAf39/AAEAAABkAAAAAAAAABQAAABAHwAAAAAAACYAAAAAAAAAwOD//wAAAAAmAAAAZAAAABYAAABMAAAAAAAAAAAAAAAEAAAAAAAAAAEAAAB3d3cKAAAAACgAAAAoAAAAZAAAAGQAAAAAAAAAzMzMAAAAAABQAAAAUAAAAGQAAABkAAAAAAAAABcAAAAUAAAAAAAAAAAAAAD/fwAA/38AAAAAAAAJAAAABAAAAAAAAAAMAAAAEAAAAAAAAAAAAAAAAAAAAAAAAAAeAAAAaAAAAAAAAAAAAAAAAAAAAAAAAAAAAAAAECcAABAnAAAAAAAAAAAAAAAAAAAAAAAAAAAAAAAAAAAAAAAAAAAAABQAAAAAAAAAwMD/AAAAAABkAAAAMgAAAAAAAABkAAAAAAAAAH9/fwAKAAAAHwAAAFQAAAAAAAAFAAAAAQAAAAAAAAAAAAAAAAAAAAAAAAAAAAAAAAAAAAAAAAAAAAAAAn9/fwAAAAADzMzMAMDA/wB/f38AAAAAAAAAAAAAAAAAAAAAAAAAAAAhAAAAGAAAABQAAABQKAAAGycAAHA1AABZKQAAAAAAACYAAAAIAAAAAAAAAAAAAAA="/>
-              </a:ext>
-            </a:extLst>
           </p:cNvSpPr>
           <p:nvPr>
             <p:ph type="sldNum" sz="quarter" idx="12"/>
@@ -1195,10 +1007,10 @@
           <a:bodyPr/>
           <a:lstStyle/>
           <a:p>
-            <a:pPr/>
             <a:fld id="{409CC91E-50AD-C93F-E324-A66A876A15F3}" type="slidenum">
-              <a:t/>
+              <a:rPr/>
             </a:fld>
+            <a:endParaRPr/>
           </a:p>
         </p:txBody>
       </p:sp>
@@ -1211,7 +1023,7 @@
 </file>
 
 <file path=ppt/slideLayouts/slideLayout4.xml><?xml version="1.0" encoding="utf-8"?>
-<p:sldLayout xmlns:p="http://schemas.openxmlformats.org/presentationml/2006/main" xmlns:p14="http://schemas.microsoft.com/office/powerpoint/2010/main" xmlns:r="http://schemas.openxmlformats.org/officeDocument/2006/relationships" xmlns:a="http://schemas.openxmlformats.org/drawingml/2006/main" type="twoColTx">
+<p:sldLayout xmlns:a="http://schemas.openxmlformats.org/drawingml/2006/main" xmlns:r="http://schemas.openxmlformats.org/officeDocument/2006/relationships" xmlns:p="http://schemas.openxmlformats.org/presentationml/2006/main" type="twoColTx">
   <p:cSld name="Titre et deux contenus">
     <p:spTree>
       <p:nvGrpSpPr>
@@ -1232,14 +1044,9 @@
           <p:cNvPr id="2" name="TitreDiapositive1"/>
           <p:cNvSpPr>
             <a:spLocks noGrp="1" noChangeArrowheads="1"/>
-            <a:extLst>
-              <a:ext uri="smNativeData">
-                <pr:smNativeData xmlns:pr="smNativeData" val="SMDATA_13_fWmYYBMAAAAlAAAAZAAAAA8BAAAAkAAAAEgAAACQAAAASAAAAAAAAAABAAAAAAAAAAEAAABQAAAAAAAAAAAA4D8AAAAAAADgPwAAAAAAAOA/AAAAAAAA4D8AAAAAAADgPwAAAAAAAOA/AAAAAAAA4D8AAAAAAADgPwAAAAAAAOA/AAAAAAAA4D8CAAAAjAAAAAAAAAAAAAAA///3DP//2QgAAAAAAAAAAAAAAAAAAAAAAAAAAAAAAAAAAAAAZAAAAAEAAABAAAAAAAAAAAAAAAAAAAAAAAAAAAAAAAAAAAAAAAAAAAAAAAAAAAAAAAAAAAAAAAAAAAAAAAAAAAAAAAAAAAAAAAAAAAAAAAAAAAAAAAAAAAAAAAAAAAAAFAAAADwAAAAAAAAAAAAAAAAAAAkUAAAAAQAAABQAAAAUAAAAFAAAAAEAAAAAAAAAZAAAAGQAAAAAAAAAZAAAAGQAAAAVAAAAYAAAAAAAAAAAAAAADwAAACADAAAAAAAAAAAAAAEAAACgMgAAVgcAAKr4//8BAAAAf39/AAEAAABkAAAAAAAAABQAAABAHwAAAAAAACYAAAAAAAAAwOD//wAAAAAmAAAAZAAAABYAAABMAAAAAAAAAAAAAAAEAAAAAAAAAAEAAAB3d3cKAAAAACgAAAAoAAAAZAAAAGQAAAAAAAAAzMzMAAAAAABQAAAAUAAAAGQAAABkAAAAAAAAABcAAAAUAAAAAAAAAAAAAAD/fwAA/38AAAAAAAAJAAAABAAAAAAAAAAMAAAAEAAAAAAAAAAAAAAAAAAAAAAAAAAeAAAAaAAAAAAAAAAAAAAAAAAAAAAAAAAAAAAAECcAABAnAAAAAAAAAAAAAAAAAAAAAAAAAAAAAAAAAAAAAAAAAAAAABQAAAAAAAAAwMD/AAAAAABkAAAAMgAAAAAAAABkAAAAAAAAAH9/fwAKAAAAHwAAAFQAAAAAAAAFAAAAAQAAAAAAAAAAAAAAAAAAAAAAAAAAAAAAAAAAAAAAAAAAAAAAAn9/fwAAAAADzMzMAMDA/wB/f38AAAAAAAAAAAAAAAAAAAAAAAAAAAAhAAAAGAAAABQAAADQAgAAsAEAAHA1AAC4CAAAAAAAACYAAAAIAAAAAAAAAAAAAAA="/>
-              </a:ext>
-            </a:extLst>
-          </p:cNvSpPr>
-          <p:nvPr>
-            <p:ph type="title"/>
+          </p:cNvSpPr>
+          <p:nvPr>
+            <p:ph type="title" hasCustomPrompt="1"/>
           </p:nvPr>
         </p:nvSpPr>
         <p:spPr/>
@@ -1247,7 +1054,6 @@
           <a:bodyPr/>
           <a:lstStyle/>
           <a:p>
-            <a:pPr/>
             <a:r>
               <a:t>Cliquez pour modifier le style du masque de titre</a:t>
             </a:r>
@@ -1259,14 +1065,9 @@
           <p:cNvPr id="3" name="TexteDiapositive2"/>
           <p:cNvSpPr>
             <a:spLocks noGrp="1" noChangeArrowheads="1"/>
-            <a:extLst>
-              <a:ext uri="smNativeData">
-                <pr:smNativeData xmlns:pr="smNativeData" val="SMDATA_13_fWmYYBMAAAAlAAAAZAAAAA8BAAAAkAAAAEgAAACQAAAASAAAAAAAAAAAAAAAAAAAAAEAAABQAAAAAAAAAAAA4D8AAAAAAADgPwAAAAAAAOA/AAAAAAAA4D8AAAAAAADgPwAAAAAAAOA/AAAAAAAA4D8AAAAAAADgPwAAAAAAAOA/AAAAAAAA4D8CAAAAjAAAAAAAAAAAAAAA///3DP//2QgAAAAAAAAAAAAAAAAAAAAAAAAAAAAAAAAAAAAAZAAAAAEAAABAAAAAAAAAAAAAAAAAAAAAAAAAAAAAAAAAAAAAAAAAAAAAAAAAAAAAAAAAAAAAAAAAAAAAAAAAAAAAAAAAAAAAAAAAAAAAAAAAAAAAAAAAAAAAAAAAAAAAFAAAADwAAAAAAAAAAAAAAAAAAAkUAAAAAQAAABQAAAAUAAAAFAAAAAEAAAAAAAAAZAAAAGQAAAAAAAAAZAAAAGQAAAAVAAAAYAAAAAAAAAAAAAAADwAAACADAAAAAAAAAAAAAAEAAACgMgAAVgcAAKr4//8BAAAAf39/AAEAAABkAAAAAAAAABQAAABAHwAAAAAAACYAAAAAAAAAwOD//wAAAAAmAAAAZAAAABYAAABMAAAAAAAAAAAAAAAEAAAAAAAAAAEAAAB3d3cKAAAAACgAAAAoAAAAZAAAAGQAAAAAAAAAzMzMAAAAAABQAAAAUAAAAGQAAABkAAAAAAAAABcAAAAUAAAAAAAAAAAAAAD/fwAA/38AAAAAAAAJAAAABAAAAAAAAAAMAAAAEAAAAAAAAAAAAAAAAAAAAAAAAAAeAAAAaAAAAAAAAAAAAAAAAAAAAAAAAAAAAAAAECcAABAnAAAAAAAAAAAAAAAAAAAAAAAAAAAAAAAAAAAAAAAAAAAAABQAAAAAAAAAwMD/AAAAAABkAAAAMgAAAAAAAABkAAAAAAAAAH9/fwAKAAAAHwAAAFQAAAAAAAAFAAAAAQAAAAAAAAAAAAAAAAAAAAAAAAAAAAAAAAAAAAAAAAAAAAAAAn9/fwAAAAADzMzMAMDA/wB/f38AAAAAAAAAAAAAAAAAAAAAAAAAAAAhAAAAGAAAABQAAADQAgAA2AkAAKgbAACwJQAAAAAAACYAAAAIAAAAAYAAAAAAAAA="/>
-              </a:ext>
-            </a:extLst>
-          </p:cNvSpPr>
-          <p:nvPr>
-            <p:ph sz="half" idx="1"/>
+          </p:cNvSpPr>
+          <p:nvPr>
+            <p:ph sz="half" idx="1" hasCustomPrompt="1"/>
           </p:nvPr>
         </p:nvSpPr>
         <p:spPr>
@@ -1307,7 +1108,6 @@
             </a:lvl9pPr>
           </a:lstStyle>
           <a:p>
-            <a:pPr/>
             <a:r>
               <a:t>Cliquez pour modifier les styles du masque de texte</a:t>
             </a:r>
@@ -1343,14 +1143,9 @@
           <p:cNvPr id="4" name="TexteDiapositive1"/>
           <p:cNvSpPr>
             <a:spLocks noGrp="1" noChangeArrowheads="1"/>
-            <a:extLst>
-              <a:ext uri="smNativeData">
-                <pr:smNativeData xmlns:pr="smNativeData" val="SMDATA_13_fWmYYBMAAAAlAAAAZAAAAA8BAAAAkAAAAEgAAACQAAAASAAAAAAAAAAAAAAAAAAAAAEAAABQAAAAAAAAAAAA4D8AAAAAAADgPwAAAAAAAOA/AAAAAAAA4D8AAAAAAADgPwAAAAAAAOA/AAAAAAAA4D8AAAAAAADgPwAAAAAAAOA/AAAAAAAA4D8CAAAAjAAAAAAAAAAAAAAA///3DP//2QgAAAAAAAAAAAAAAAAAAAAAAAAAAAAAAAAAAAAAZAAAAAEAAABAAAAAAAAAAAAAAAAAAAAAAAAAAAAAAAAAAAAAAAAAAAAAAAAAAAAAAAAAAAAAAAAAAAAAAAAAAAAAAAAAAAAAAAAAAAAAAAAAAAAAAAAAAAAAAAAAAAAAFAAAADwAAAAAAAAAAAAAAAAAAAkUAAAAAQAAABQAAAAUAAAAFAAAAAEAAAAAAAAAZAAAAGQAAAAAAAAAZAAAAGQAAAAVAAAAYAAAAAAAAAAAAAAADwAAACADAAAAAAAAAAAAAAEAAACgMgAAVgcAAKr4//8BAAAAf39/AAEAAABkAAAAAAAAABQAAABAHwAAAAAAACYAAAAAAAAAwOD//wAAAAAmAAAAZAAAABYAAABMAAAAAAAAAAAAAAAEAAAAAAAAAAEAAAB3d3cKAAAAACgAAAAoAAAAZAAAAGQAAAAAAAAAzMzMAAAAAABQAAAAUAAAAGQAAABkAAAAAAAAABcAAAAUAAAAAAAAAAAAAAD/fwAA/38AAAAAAAAJAAAABAAAACYAAAAMAAAAEAAAAAAAAAAAAAAAAAAAAAAAAAAeAAAAaAAAAAAAAAAAAAAAAAAAAAAAAAAAAAAAECcAABAnAAAAAAAAAAAAAAAAAAAAAAAAAAAAAAAAAAAAAAAAAAAAABQAAAAAAAAAwMD/AAAAAABkAAAAMgAAAAAAAABkAAAAAAAAAH9/fwAKAAAAHwAAAFQAAAAAAAAFAAAAAQAAAAAAAAAAAAAAAAAAAAAAAAAAAAAAAAAAAAAAAAAAAAAAAn9/fwAAAAADzMzMAMDA/wB/f38AAAAAAAAAAAAAAAAAAAAAAAAAAAAhAAAAGAAAABQAAACYHAAA2AkAAHA1AACwJQAAAAAAACYAAAAIAAAAAYAAAAAAAAA="/>
-              </a:ext>
-            </a:extLst>
-          </p:cNvSpPr>
-          <p:nvPr>
-            <p:ph sz="half" idx="2"/>
+          </p:cNvSpPr>
+          <p:nvPr>
+            <p:ph sz="half" idx="2" hasCustomPrompt="1"/>
           </p:nvPr>
         </p:nvSpPr>
         <p:spPr>
@@ -1391,7 +1186,6 @@
             </a:lvl9pPr>
           </a:lstStyle>
           <a:p>
-            <a:pPr/>
             <a:r>
               <a:t>Cliquez pour modifier les styles du masque de texte</a:t>
             </a:r>
@@ -1427,11 +1221,6 @@
           <p:cNvPr id="5" name="ZoneEstampille1"/>
           <p:cNvSpPr>
             <a:spLocks noGrp="1" noChangeArrowheads="1"/>
-            <a:extLst>
-              <a:ext uri="smNativeData">
-                <pr:smNativeData xmlns:pr="smNativeData" val="SMDATA_13_fWmYYBMAAAAlAAAAZAAAAA8BAAAAkAAAAEgAAACQAAAASAAAAAAAAAABAAAAAAAAAAEAAABQAAAAAAAAAAAA4D8AAAAAAADgPwAAAAAAAOA/AAAAAAAA4D8AAAAAAADgPwAAAAAAAOA/AAAAAAAA4D8AAAAAAADgPwAAAAAAAOA/AAAAAAAA4D8CAAAAjAAAAAAAAAAAAAAA///3DP//2QgAAAAAAAAAAAAAAAAAAAAAAAAAAAAAAAAAAAAAZAAAAAEAAABAAAAAAAAAAAAAAAAAAAAAAAAAAAAAAAAAAAAAAAAAAAAAAAAAAAAAAAAAAAAAAAAAAAAAAAAAAAAAAAAAAAAAAAAAAAAAAAAAAAAAAAAAAAAAAAAAAAAAFAAAADwAAAAAAAAAAAAAAAAAAAkUAAAAAQAAABQAAAAUAAAAFAAAAAEAAAAAAAAAZAAAAGQAAAAAAAAAZAAAAGQAAAAVAAAAYAAAAAAAAAAAAAAADwAAACADAAAAAAAAAAAAAAEAAACgMgAAVgcAAKr4//8BAAAAf39/AAEAAABkAAAAAAAAABQAAABAHwAAAAAAACYAAAAAAAAAwOD//wAAAAAmAAAAZAAAABYAAABMAAAAAAAAAAAAAAAEAAAAAAAAAAEAAAB3d3cKAAAAACgAAAAoAAAAZAAAAGQAAAAAAAAAzMzMAAAAAABQAAAAUAAAAGQAAABkAAAAAAAAABcAAAAUAAAAAAAAAAAAAAD/fwAA/38AAAAAAAAJAAAABAAAAAAAAAAMAAAAEAAAAAAAAAAAAAAAAAAAAAAAAAAeAAAAaAAAAAAAAAAAAAAAAAAAAAAAAAAAAAAAECcAABAnAAAAAAAAAAAAAAAAAAAAAAAAAAAAAAAAAAAAAAAAAAAAABQAAAAAAAAAwMD/AAAAAABkAAAAMgAAAAAAAABkAAAAAAAAAH9/fwAKAAAAHwAAAFQAAAAAAAAFAAAAAQAAAAAAAAAAAAAAAAAAAAAAAAAAAAAAAAAAAAAAAAAAAAAAAn9/fwAAAAADzMzMAMDA/wB/f38AAAAAAAAAAAAAAAAAAAAAAAAAAAAhAAAAGAAAABQAAADQAgAAGycAAPAPAABZKQAAAAAAACYAAAAIAAAAAAAAAAAAAAA="/>
-              </a:ext>
-            </a:extLst>
           </p:cNvSpPr>
           <p:nvPr>
             <p:ph type="dt" sz="quarter" idx="10"/>
@@ -1442,10 +1231,10 @@
           <a:bodyPr/>
           <a:lstStyle/>
           <a:p>
-            <a:pPr/>
             <a:fld id="{704C74DE-909D-1982-D3F4-66D73ABA2533}" type="datetime1">
-              <a:t/>
+              <a:rPr/>
             </a:fld>
+            <a:endParaRPr/>
           </a:p>
         </p:txBody>
       </p:sp>
@@ -1454,11 +1243,6 @@
           <p:cNvPr id="6" name="ZonePiedDePage1"/>
           <p:cNvSpPr>
             <a:spLocks noGrp="1" noChangeArrowheads="1"/>
-            <a:extLst>
-              <a:ext uri="smNativeData">
-                <pr:smNativeData xmlns:pr="smNativeData" val="SMDATA_13_fWmYYBMAAAAlAAAAZAAAAA8BAAAAkAAAAEgAAACQAAAASAAAAAAAAAABAAAAAAAAAAEAAABQAAAAAAAAAAAA4D8AAAAAAADgPwAAAAAAAOA/AAAAAAAA4D8AAAAAAADgPwAAAAAAAOA/AAAAAAAA4D8AAAAAAADgPwAAAAAAAOA/AAAAAAAA4D8CAAAAjAAAAAAAAAAAAAAA///3DP//2QgAAAAAAAAAAAAAAAAAAAAAAAAAAAAAAAAAAAAAZAAAAAEAAABAAAAAAAAAAAAAAAAAAAAAAAAAAAAAAAAAAAAAAAAAAAAAAAAAAAAAAAAAAAAAAAAAAAAAAAAAAAAAAAAAAAAAAAAAAAAAAAAAAAAAAAAAAAAAAAAAAAAAFAAAADwAAAAAAAAAAAAAAAAAAAkUAAAAAQAAABQAAAAUAAAAFAAAAAEAAAAAAAAAZAAAAGQAAAAAAAAAZAAAAGQAAAAVAAAAYAAAAAAAAAAAAAAADwAAACADAAAAAAAAAAAAAAEAAACgMgAAVgcAAKr4//8BAAAAf39/AAEAAABkAAAAAAAAABQAAABAHwAAAAAAACYAAAAAAAAAwOD//wAAAAAmAAAAZAAAABYAAABMAAAAAAAAAAAAAAAEAAAAAAAAAAEAAAB3d3cKAAAAACgAAAAoAAAAZAAAAGQAAAAAAAAAzMzMAAAAAABQAAAAUAAAAGQAAABkAAAAAAAAABcAAAAUAAAAAAAAAAAAAAD/fwAA/38AAAAAAAAJAAAABAAAAAAAAAAMAAAAEAAAAAAAAAAAAAAAAAAAAAAAAAAeAAAAaAAAAAAAAAAAAAAAAAAAAAAAAAAAAAAAECcAABAnAAAAAAAAAAAAAAAAAAAAAAAAAAAAAAAAAAAAAAAAAAAAABQAAAAAAAAAwMD/AAAAAABkAAAAMgAAAAAAAABkAAAAAAAAAH9/fwAKAAAAHwAAAFQAAAAAAAAFAAAAAQAAAAAAAAAAAAAAAAAAAAAAAAAAAAAAAAAAAAAAAAAAAAAAAn9/fwAAAAADzMzMAMDA/wB/f38AAAAAAAAAAAAAAAAAAAAAAAAAAAAhAAAAGAAAABQAAAA4EwAAGycAAAglAABZKQAAAAAAACYAAAAIAAAAAAAAAAAAAAA="/>
-              </a:ext>
-            </a:extLst>
           </p:cNvSpPr>
           <p:nvPr>
             <p:ph type="ftr" sz="quarter" idx="11"/>
@@ -1468,12 +1252,7 @@
         <p:txBody>
           <a:bodyPr/>
           <a:lstStyle/>
-          <a:p>
-            <a:pPr/>
-            <a:r>
-              <a:t/>
-            </a:r>
-          </a:p>
+          <a:p/>
         </p:txBody>
       </p:sp>
       <p:sp>
@@ -1481,11 +1260,6 @@
           <p:cNvPr id="7" name="ZoneNuméroDiapositive1"/>
           <p:cNvSpPr>
             <a:spLocks noGrp="1" noChangeArrowheads="1"/>
-            <a:extLst>
-              <a:ext uri="smNativeData">
-                <pr:smNativeData xmlns:pr="smNativeData" val="SMDATA_13_fWmYYBMAAAAlAAAAZAAAAA8BAAAAkAAAAEgAAACQAAAASAAAAAAAAAABAAAAAAAAAAEAAABQAAAAAAAAAAAA4D8AAAAAAADgPwAAAAAAAOA/AAAAAAAA4D8AAAAAAADgPwAAAAAAAOA/AAAAAAAA4D8AAAAAAADgPwAAAAAAAOA/AAAAAAAA4D8CAAAAjAAAAAAAAAAAAAAA///3DP//2QgAAAAAAAAAAAAAAAAAAAAAAAAAAAAAAAAAAAAAZAAAAAEAAABAAAAAAAAAAAAAAAAAAAAAAAAAAAAAAAAAAAAAAAAAAAAAAAAAAAAAAAAAAAAAAAAAAAAAAAAAAAAAAAAAAAAAAAAAAAAAAAAAAAAAAAAAAAAAAAAAAAAAFAAAADwAAAAAAAAAAAAAAAAAAAkUAAAAAQAAABQAAAAUAAAAFAAAAAEAAAAAAAAAZAAAAGQAAAAAAAAAZAAAAGQAAAAVAAAAYAAAAAAAAAAAAAAADwAAACADAAAAAAAAAAAAAAEAAACgMgAAVgcAAKr4//8BAAAAf39/AAEAAABkAAAAAAAAABQAAABAHwAAAAAAACYAAAAAAAAAwOD//wAAAAAmAAAAZAAAABYAAABMAAAAAAAAAAAAAAAEAAAAAAAAAAEAAAB3d3cKAAAAACgAAAAoAAAAZAAAAGQAAAAAAAAAzMzMAAAAAABQAAAAUAAAAGQAAABkAAAAAAAAABcAAAAUAAAAAAAAAAAAAAD/fwAA/38AAAAAAAAJAAAABAAAAAAAAAAMAAAAEAAAAAAAAAAAAAAAAAAAAAAAAAAeAAAAaAAAAAAAAAAAAAAAAAAAAAAAAAAAAAAAECcAABAnAAAAAAAAAAAAAAAAAAAAAAAAAAAAAAAAAAAAAAAAAAAAABQAAAAAAAAAwMD/AAAAAABkAAAAMgAAAAAAAABkAAAAAAAAAH9/fwAKAAAAHwAAAFQAAAAAAAAFAAAAAQAAAAAAAAAAAAAAAAAAAAAAAAAAAAAAAAAAAAAAAAAAAAAAAn9/fwAAAAADzMzMAMDA/wB/f38AAAAAAAAAAAAAAAAAAAAAAAAAAAAhAAAAGAAAABQAAABQKAAAGycAAHA1AABZKQAAAAAAACYAAAAIAAAAAAAAAAAAAAA="/>
-              </a:ext>
-            </a:extLst>
           </p:cNvSpPr>
           <p:nvPr>
             <p:ph type="sldNum" sz="quarter" idx="12"/>
@@ -1496,10 +1270,10 @@
           <a:bodyPr/>
           <a:lstStyle/>
           <a:p>
-            <a:pPr/>
             <a:fld id="{3799E4BE-F0DA-CC12-9421-0647AA6F6253}" type="slidenum">
-              <a:t/>
+              <a:rPr/>
             </a:fld>
+            <a:endParaRPr/>
           </a:p>
         </p:txBody>
       </p:sp>
@@ -1512,7 +1286,7 @@
 </file>
 
 <file path=ppt/slideLayouts/slideLayout5.xml><?xml version="1.0" encoding="utf-8"?>
-<p:sldLayout xmlns:p="http://schemas.openxmlformats.org/presentationml/2006/main" xmlns:p14="http://schemas.microsoft.com/office/powerpoint/2010/main" xmlns:r="http://schemas.openxmlformats.org/officeDocument/2006/relationships" xmlns:a="http://schemas.openxmlformats.org/drawingml/2006/main" type="twoTxTwoObj">
+<p:sldLayout xmlns:a="http://schemas.openxmlformats.org/drawingml/2006/main" xmlns:r="http://schemas.openxmlformats.org/officeDocument/2006/relationships" xmlns:p="http://schemas.openxmlformats.org/presentationml/2006/main" type="twoTxTwoObj">
   <p:cSld name="Comparaison">
     <p:spTree>
       <p:nvGrpSpPr>
@@ -1533,14 +1307,9 @@
           <p:cNvPr id="2" name="TitreDiapositive1"/>
           <p:cNvSpPr>
             <a:spLocks noGrp="1" noChangeArrowheads="1"/>
-            <a:extLst>
-              <a:ext uri="smNativeData">
-                <pr:smNativeData xmlns:pr="smNativeData" val="SMDATA_13_fWmYYBMAAAAlAAAAZAAAAA8BAAAAkAAAAEgAAACQAAAASAAAAAAAAAABAAAAAAAAAAEAAABQAAAAAAAAAAAA4D8AAAAAAADgPwAAAAAAAOA/AAAAAAAA4D8AAAAAAADgPwAAAAAAAOA/AAAAAAAA4D8AAAAAAADgPwAAAAAAAOA/AAAAAAAA4D8CAAAAjAAAAAAAAAAAAAAA///3DP//2QgAAAAAAAAAAAAAAAAAAAAAAAAAAAAAAAAAAAAAZAAAAAEAAABAAAAAAAAAAAAAAAAAAAAAAAAAAAAAAAAAAAAAAAAAAAAAAAAAAAAAAAAAAAAAAAAAAAAAAAAAAAAAAAAAAAAAAAAAAAAAAAAAAAAAAAAAAAAAAAAAAAAAFAAAADwAAAAAAAAAAAAAAAAAAAkUAAAAAQAAABQAAAAUAAAAFAAAAAEAAAAAAAAAZAAAAGQAAAAAAAAAZAAAAGQAAAAVAAAAYAAAAAAAAAAAAAAADwAAACADAAAAAAAAAAAAAAEAAACgMgAAVgcAAKr4//8BAAAAf39/AAEAAABkAAAAAAAAABQAAABAHwAAAAAAACYAAAAAAAAAwOD//wAAAAAmAAAAZAAAABYAAABMAAAAAAAAAAAAAAAEAAAAAAAAAAEAAAB3d3cKAAAAACgAAAAoAAAAZAAAAGQAAAAAAAAAzMzMAAAAAABQAAAAUAAAAGQAAABkAAAAAAAAABcAAAAUAAAAAAAAAAAAAAD/fwAA/38AAAAAAAAJAAAABAAAAGEyVTAMAAAAEAAAAAAAAAAAAAAAAAAAAAAAAAAeAAAAaAAAAAAAAAAAAAAAAAAAAAAAAAAAAAAAECcAABAnAAAAAAAAAAAAAAAAAAAAAAAAAAAAAAAAAAAAAAAAAAAAABQAAAAAAAAAwMD/AAAAAABkAAAAMgAAAAAAAABkAAAAAAAAAH9/fwAKAAAAHwAAAFQAAAAAAAAFAAAAAQAAAAAAAAAAAAAAAAAAAAAAAAAAAAAAAAAAAAAAAAAAAAAAAn9/fwAAAAADzMzMAMDA/wB/f38AAAAAAAAAAAAAAAAAAAAAAAAAAAAhAAAAGAAAABQAAADQAgAAsAEAAHA1AAC4CAAAAAAAACYAAAAIAAAAAAAAAAAAAAA="/>
-              </a:ext>
-            </a:extLst>
-          </p:cNvSpPr>
-          <p:nvPr>
-            <p:ph type="title"/>
+          </p:cNvSpPr>
+          <p:nvPr>
+            <p:ph type="title" hasCustomPrompt="1"/>
           </p:nvPr>
         </p:nvSpPr>
         <p:spPr/>
@@ -1548,7 +1317,6 @@
           <a:bodyPr/>
           <a:lstStyle/>
           <a:p>
-            <a:pPr/>
             <a:r>
               <a:t>Cliquez pour modifier le style du masque de titre</a:t>
             </a:r>
@@ -1560,14 +1328,9 @@
           <p:cNvPr id="3" name="TexteDiapositive3"/>
           <p:cNvSpPr>
             <a:spLocks noGrp="1" noChangeArrowheads="1"/>
-            <a:extLst>
-              <a:ext uri="smNativeData">
-                <pr:smNativeData xmlns:pr="smNativeData" val="SMDATA_13_fWmYYBMAAAAlAAAAZAAAAA8BAAAAkAAAAEgAAACQAAAASAAAAAAAAAACAAAAAAAAAAEAAABQAAAAAAAAAAAA4D8AAAAAAADgPwAAAAAAAOA/AAAAAAAA4D8AAAAAAADgPwAAAAAAAOA/AAAAAAAA4D8AAAAAAADgPwAAAAAAAOA/AAAAAAAA4D8CAAAAjAAAAAAAAAAAAAAA///3DP//2QgAAAAAAAAAAAAAAAAAAAAAAAAAAAAAAAAAAAAAZAAAAAEAAABAAAAAAAAAAAAAAAAAAAAAAAAAAAAAAAAAAAAAAAAAAAAAAAAAAAAAAAAAAAAAAAAAAAAAAAAAAAAAAAAAAAAAAAAAAAAAAAAAAAAAAAAAAAAAAAAAAAAAFAAAADwAAAAAAAAAAAAAAAAAAAkUAAAAAQAAABQAAAAUAAAAFAAAAAEAAAAAAAAAZAAAAGQAAAAAAAAAZAAAAGQAAAAVAAAAYAAAAAAAAAAAAAAADwAAACADAAAAAAAAAAAAAAEAAACgMgAAVgcAAKr4//8BAAAAf39/AAEAAABkAAAAAAAAABQAAABAHwAAAAAAACYAAAAAAAAAwOD//wAAAAAmAAAAZAAAABYAAABMAAAAAAAAAAAAAAAEAAAAAAAAAAEAAAB3d3cKAAAAACgAAAAoAAAAZAAAAGQAAAAAAAAAzMzMAAAAAABQAAAAUAAAAGQAAABkAAAAAAAAABcAAAAUAAAAAAAAAAAAAAD/fwAA/38AAAAAAAAJAAAABAAAAA8AAAAMAAAAEAAAAAAAAAAAAAAAAAAAAAAAAAAeAAAAaAAAAAAAAAAAAAAAAAAAAAAAAAAAAAAAECcAABAnAAAAAAAAAAAAAAAAAAAAAAAAAAAAAAAAAAAAAAAAAAAAABQAAAAAAAAAwMD/AAAAAABkAAAAMgAAAAAAAABkAAAAAAAAAH9/fwAKAAAAHwAAAFQAAAAAAAAFAAAAAQAAAAAAAAAAAAAAAAAAAAAAAAAAAAAAAAAAAAAAAAAAAAAAAn9/fwAAAAADzMzMAMDA/wB/f38AAAAAAAAAAAAAAAAAAAAAAAAAAAAhAAAAGAAAABQAAADQAgAAcQkAAKobAABhDQAAAAAAACYAAAAIAAAAgYAAAAAAAAA="/>
-              </a:ext>
-            </a:extLst>
-          </p:cNvSpPr>
-          <p:nvPr>
-            <p:ph idx="1"/>
+          </p:cNvSpPr>
+          <p:nvPr>
+            <p:ph idx="1" hasCustomPrompt="1"/>
           </p:nvPr>
         </p:nvSpPr>
         <p:spPr>
@@ -1577,11 +1340,7 @@
           </a:xfrm>
         </p:spPr>
         <p:txBody>
-          <a:bodyPr vert="horz" wrap="square" numCol="1" spcCol="215900" anchor="b">
-            <a:prstTxWarp prst="textNoShape">
-              <a:avLst/>
-            </a:prstTxWarp>
-          </a:bodyPr>
+          <a:bodyPr vert="horz" wrap="square" numCol="1" spcCol="215900" anchor="b"/>
           <a:lstStyle>
             <a:lvl1pPr marL="0" indent="0">
               <a:buNone/>
@@ -1621,7 +1380,6 @@
             </a:lvl9pPr>
           </a:lstStyle>
           <a:p>
-            <a:pPr/>
             <a:r>
               <a:t>Cliquez pour modifier les styles du masque de texte</a:t>
             </a:r>
@@ -1633,14 +1391,9 @@
           <p:cNvPr id="4" name="TexteDiapositive1"/>
           <p:cNvSpPr>
             <a:spLocks noGrp="1" noChangeArrowheads="1"/>
-            <a:extLst>
-              <a:ext uri="smNativeData">
-                <pr:smNativeData xmlns:pr="smNativeData" val="SMDATA_13_fWmYYBMAAAAlAAAAZAAAAA8BAAAAkAAAAEgAAACQAAAASAAAAAAAAAAAAAAAAAAAAAEAAABQAAAAAAAAAAAA4D8AAAAAAADgPwAAAAAAAOA/AAAAAAAA4D8AAAAAAADgPwAAAAAAAOA/AAAAAAAA4D8AAAAAAADgPwAAAAAAAOA/AAAAAAAA4D8CAAAAjAAAAAAAAAAAAAAA///3DP//2QgAAAAAAAAAAAAAAAAAAAAAAAAAAAAAAAAAAAAAZAAAAAEAAABAAAAAAAAAAAAAAAAAAAAAAAAAAAAAAAAAAAAAAAAAAAAAAAAAAAAAAAAAAAAAAAAAAAAAAAAAAAAAAAAAAAAAAAAAAAAAAAAAAAAAAAAAAAAAAAAAAAAAFAAAADwAAAAAAAAAAAAAAAAAAAkUAAAAAQAAABQAAAAUAAAAFAAAAAEAAAAAAAAAZAAAAGQAAAAAAAAAZAAAAGQAAAAVAAAAYAAAAAAAAAAAAAAADwAAACADAAAAAAAAAAAAAAEAAACgMgAAVgcAAKr4//8BAAAAf39/AAEAAABkAAAAAAAAABQAAABAHwAAAAAAACYAAAAAAAAAwOD//wAAAAAmAAAAZAAAABYAAABMAAAAAAAAAAAAAAAEAAAAAAAAAAEAAAB3d3cKAAAAACgAAAAoAAAAZAAAAGQAAAAAAAAAzMzMAAAAAABQAAAAUAAAAGQAAABkAAAAAAAAABcAAAAUAAAAAAAAAAAAAAD/fwAA/38AAAAAAAAJAAAABAAAAA8AAAAMAAAAEAAAAAAAAAAAAAAAAAAAAAAAAAAeAAAAaAAAAAAAAAAAAAAAAAAAAAAAAAAAAAAAECcAABAnAAAAAAAAAAAAAAAAAAAAAAAAAAAAAAAAAAAAAAAAAAAAABQAAAAAAAAAwMD/AAAAAABkAAAAMgAAAAAAAABkAAAAAAAAAH9/fwAKAAAAHwAAAFQAAAAAAAAFAAAAAQAAAAAAAAAAAAAAAAAAAAAAAAAAAAAAAAAAAAAAAAAAAAAAAn9/fwAAAAADzMzMAMDA/wB/f38AAAAAAAAAAAAAAAAAAAAAAAAAAAAhAAAAGAAAABQAAADQAgAAYQ0AAKobAACwJQAAAAAAACYAAAAIAAAAAYAAAAAAAAA="/>
-              </a:ext>
-            </a:extLst>
-          </p:cNvSpPr>
-          <p:nvPr>
-            <p:ph sz="half" idx="2"/>
+          </p:cNvSpPr>
+          <p:nvPr>
+            <p:ph sz="half" idx="2" hasCustomPrompt="1"/>
           </p:nvPr>
         </p:nvSpPr>
         <p:spPr>
@@ -1681,7 +1434,6 @@
             </a:lvl9pPr>
           </a:lstStyle>
           <a:p>
-            <a:pPr/>
             <a:r>
               <a:t>Cliquez pour modifier les styles du masque de texte</a:t>
             </a:r>
@@ -1717,14 +1469,9 @@
           <p:cNvPr id="5" name="TexteDiapositive2"/>
           <p:cNvSpPr>
             <a:spLocks noGrp="1" noChangeArrowheads="1"/>
-            <a:extLst>
-              <a:ext uri="smNativeData">
-                <pr:smNativeData xmlns:pr="smNativeData" val="SMDATA_13_fWmYYBMAAAAlAAAAZAAAAA8BAAAAkAAAAEgAAACQAAAASAAAAAAAAAACAAAAAAAAAAEAAABQAAAAAAAAAAAA4D8AAAAAAADgPwAAAAAAAOA/AAAAAAAA4D8AAAAAAADgPwAAAAAAAOA/AAAAAAAA4D8AAAAAAADgPwAAAAAAAOA/AAAAAAAA4D8CAAAAjAAAAAAAAAAAAAAA///3DP//2QgAAAAAAAAAAAAAAAAAAAAAAAAAAAAAAAAAAAAAZAAAAAEAAABAAAAAAAAAAAAAAAAAAAAAAAAAAAAAAAAAAAAAAAAAAAAAAAAAAAAAAAAAAAAAAAAAAAAAAAAAAAAAAAAAAAAAAAAAAAAAAAAAAAAAAAAAAAAAAAAAAAAAFAAAADwAAAAAAAAAAAAAAAAAAAkUAAAAAQAAABQAAAAUAAAAFAAAAAEAAAAAAAAAZAAAAGQAAAAAAAAAZAAAAGQAAAAVAAAAYAAAAAAAAAAAAAAADwAAACADAAAAAAAAAAAAAAEAAACgMgAAVgcAAKr4//8BAAAAf39/AAEAAABkAAAAAAAAABQAAABAHwAAAAAAACYAAAAAAAAAwOD//wAAAAAmAAAAZAAAABYAAABMAAAAAAAAAAAAAAAEAAAAAAAAAAEAAAB3d3cKAAAAACgAAAAoAAAAZAAAAGQAAAAAAAAAzMzMAAAAAABQAAAAUAAAAGQAAABkAAAAAAAAABcAAAAUAAAAAAAAAAAAAAD/fwAA/38AAAAAAAAJAAAABAAAAAAAAAAMAAAAEAAAAAAAAAAAAAAAAAAAAAAAAAAeAAAAaAAAAAAAAAAAAAAAAAAAAAAAAAAAAAAAECcAABAnAAAAAAAAAAAAAAAAAAAAAAAAAAAAAAAAAAAAAAAAAAAAABQAAAAAAAAAwMD/AAAAAABkAAAAMgAAAAAAAABkAAAAAAAAAH9/fwAKAAAAHwAAAFQAAAAAAAAFAAAAAQAAAAAAAAAAAAAAAAAAAAAAAAAAAAAAAAAAAAAAAAAAAAAAAn9/fwAAAAADzMzMAMDA/wB/f38AAAAAAAAAAAAAAAAAAAAAAAAAAAAhAAAAGAAAABQAAACWHAAAcQkAAHA1AABhDQAAAAAAACYAAAAIAAAAgYAAAAAAAAA="/>
-              </a:ext>
-            </a:extLst>
-          </p:cNvSpPr>
-          <p:nvPr>
-            <p:ph idx="3"/>
+          </p:cNvSpPr>
+          <p:nvPr>
+            <p:ph idx="3" hasCustomPrompt="1"/>
           </p:nvPr>
         </p:nvSpPr>
         <p:spPr>
@@ -1734,11 +1481,7 @@
           </a:xfrm>
         </p:spPr>
         <p:txBody>
-          <a:bodyPr vert="horz" wrap="square" numCol="1" spcCol="215900" anchor="b">
-            <a:prstTxWarp prst="textNoShape">
-              <a:avLst/>
-            </a:prstTxWarp>
-          </a:bodyPr>
+          <a:bodyPr vert="horz" wrap="square" numCol="1" spcCol="215900" anchor="b"/>
           <a:lstStyle>
             <a:lvl1pPr marL="0" indent="0">
               <a:buNone/>
@@ -1778,7 +1521,6 @@
             </a:lvl9pPr>
           </a:lstStyle>
           <a:p>
-            <a:pPr/>
             <a:r>
               <a:t>Cliquez pour modifier les styles du masque de texte</a:t>
             </a:r>
@@ -1790,14 +1532,9 @@
           <p:cNvPr id="6" name="TexteDiapositive4"/>
           <p:cNvSpPr>
             <a:spLocks noGrp="1" noChangeArrowheads="1"/>
-            <a:extLst>
-              <a:ext uri="smNativeData">
-                <pr:smNativeData xmlns:pr="smNativeData" val="SMDATA_13_fWmYYBMAAAAlAAAAZAAAAA8BAAAAkAAAAEgAAACQAAAASAAAAAAAAAAAAAAAAAAAAAEAAABQAAAAAAAAAAAA4D8AAAAAAADgPwAAAAAAAOA/AAAAAAAA4D8AAAAAAADgPwAAAAAAAOA/AAAAAAAA4D8AAAAAAADgPwAAAAAAAOA/AAAAAAAA4D8CAAAAjAAAAAAAAAAAAAAA///3DP//2QgAAAAAAAAAAAAAAAAAAAAAAAAAAAAAAAAAAAAAZAAAAAEAAABAAAAAAAAAAAAAAAAAAAAAAAAAAAAAAAAAAAAAAAAAAAAAAAAAAAAAAAAAAAAAAAAAAAAAAAAAAAAAAAAAAAAAAAAAAAAAAAAAAAAAAAAAAAAAAAAAAAAAFAAAADwAAAAAAAAAAAAAAAAAAAkUAAAAAQAAABQAAAAUAAAAFAAAAAEAAAAAAAAAZAAAAGQAAAAAAAAAZAAAAGQAAAAVAAAAYAAAAAAAAAAAAAAADwAAACADAAAAAAAAAAAAAAEAAACgMgAAVgcAAKr4//8BAAAAf39/AAEAAABkAAAAAAAAABQAAABAHwAAAAAAACYAAAAAAAAAwOD//wAAAAAmAAAAZAAAABYAAABMAAAAAAAAAAAAAAAEAAAAAAAAAAEAAAB3d3cKAAAAACgAAAAoAAAAZAAAAGQAAAAAAAAAzMzMAAAAAABQAAAAUAAAAGQAAABkAAAAAAAAABcAAAAUAAAAAAAAAAAAAAD/fwAA/38AAAAAAAAJAAAABAAAAAAAAAAMAAAAEAAAAAAAAAAAAAAAAAAAAAAAAAAeAAAAaAAAAAAAAAAAAAAAAAAAAAAAAAAAAAAAECcAABAnAAAAAAAAAAAAAAAAAAAAAAAAAAAAAAAAAAAAAAAAAAAAABQAAAAAAAAAwMD/AAAAAABkAAAAMgAAAAAAAABkAAAAAAAAAH9/fwAKAAAAHwAAAFQAAAAAAAAFAAAAAQAAAAAAAAAAAAAAAAAAAAAAAAAAAAAAAAAAAAAAAAAAAAAAAn9/fwAAAAADzMzMAMDA/wB/f38AAAAAAAAAAAAAAAAAAAAAAAAAAAAhAAAAGAAAABQAAACWHAAAYQ0AAHA1AACwJQAAAAAAACYAAAAIAAAAAYAAAAAAAAA="/>
-              </a:ext>
-            </a:extLst>
-          </p:cNvSpPr>
-          <p:nvPr>
-            <p:ph sz="half" idx="4"/>
+          </p:cNvSpPr>
+          <p:nvPr>
+            <p:ph sz="half" idx="4" hasCustomPrompt="1"/>
           </p:nvPr>
         </p:nvSpPr>
         <p:spPr>
@@ -1838,7 +1575,6 @@
             </a:lvl9pPr>
           </a:lstStyle>
           <a:p>
-            <a:pPr/>
             <a:r>
               <a:t>Cliquez pour modifier les styles du masque de texte</a:t>
             </a:r>
@@ -1874,11 +1610,6 @@
           <p:cNvPr id="7" name="ZoneEstampille1"/>
           <p:cNvSpPr>
             <a:spLocks noGrp="1" noChangeArrowheads="1"/>
-            <a:extLst>
-              <a:ext uri="smNativeData">
-                <pr:smNativeData xmlns:pr="smNativeData" val="SMDATA_13_fWmYYBMAAAAlAAAAZAAAAA8BAAAAkAAAAEgAAACQAAAASAAAAAAAAAABAAAAAAAAAAEAAABQAAAAAAAAAAAA4D8AAAAAAADgPwAAAAAAAOA/AAAAAAAA4D8AAAAAAADgPwAAAAAAAOA/AAAAAAAA4D8AAAAAAADgPwAAAAAAAOA/AAAAAAAA4D8CAAAAjAAAAAAAAAAAAAAA///3DP//2QgAAAAAAAAAAAAAAAAAAAAAAAAAAAAAAAAAAAAAZAAAAAEAAABAAAAAAAAAAAAAAAAAAAAAAAAAAAAAAAAAAAAAAAAAAAAAAAAAAAAAAAAAAAAAAAAAAAAAAAAAAAAAAAAAAAAAAAAAAAAAAAAAAAAAAAAAAAAAAAAAAAAAFAAAADwAAAAAAAAAAAAAAAAAAAkUAAAAAQAAABQAAAAUAAAAFAAAAAEAAAAAAAAAZAAAAGQAAAAAAAAAZAAAAGQAAAAVAAAAYAAAAAAAAAAAAAAADwAAACADAAAAAAAAAAAAAAEAAACgMgAAVgcAAKr4//8BAAAAf39/AAEAAABkAAAAAAAAABQAAABAHwAAAAAAACYAAAAAAAAAwOD//wAAAAAmAAAAZAAAABYAAABMAAAAAAAAAAAAAAAEAAAAAAAAAAEAAAB3d3cKAAAAACgAAAAoAAAAZAAAAGQAAAAAAAAAzMzMAAAAAABQAAAAUAAAAGQAAABkAAAAAAAAABcAAAAUAAAAAAAAAAAAAAD/fwAA/38AAAAAAAAJAAAABAAAAAEAAAAMAAAAEAAAAAAAAAAAAAAAAAAAAAAAAAAeAAAAaAAAAAAAAAAAAAAAAAAAAAAAAAAAAAAAECcAABAnAAAAAAAAAAAAAAAAAAAAAAAAAAAAAAAAAAAAAAAAAAAAABQAAAAAAAAAwMD/AAAAAABkAAAAMgAAAAAAAABkAAAAAAAAAH9/fwAKAAAAHwAAAFQAAAAAAAAFAAAAAQAAAAAAAAAAAAAAAAAAAAAAAAAAAAAAAAAAAAAAAAAAAAAAAn9/fwAAAAADzMzMAMDA/wB/f38AAAAAAAAAAAAAAAAAAAAAAAAAAAAhAAAAGAAAABQAAADQAgAAGycAAPAPAABZKQAAAAAAACYAAAAIAAAAAAAAAAAAAAA="/>
-              </a:ext>
-            </a:extLst>
           </p:cNvSpPr>
           <p:nvPr>
             <p:ph type="dt" sz="quarter" idx="10"/>
@@ -1889,10 +1620,10 @@
           <a:bodyPr/>
           <a:lstStyle/>
           <a:p>
-            <a:pPr/>
             <a:fld id="{68A5C3CD-8385-F035-CB1D-75608D533D20}" type="datetime1">
-              <a:t/>
+              <a:rPr/>
             </a:fld>
+            <a:endParaRPr/>
           </a:p>
         </p:txBody>
       </p:sp>
@@ -1901,11 +1632,6 @@
           <p:cNvPr id="8" name="ZonePiedDePage1"/>
           <p:cNvSpPr>
             <a:spLocks noGrp="1" noChangeArrowheads="1"/>
-            <a:extLst>
-              <a:ext uri="smNativeData">
-                <pr:smNativeData xmlns:pr="smNativeData" val="SMDATA_13_fWmYYBMAAAAlAAAAZAAAAA8BAAAAkAAAAEgAAACQAAAASAAAAAAAAAABAAAAAAAAAAEAAABQAAAAAAAAAAAA4D8AAAAAAADgPwAAAAAAAOA/AAAAAAAA4D8AAAAAAADgPwAAAAAAAOA/AAAAAAAA4D8AAAAAAADgPwAAAAAAAOA/AAAAAAAA4D8CAAAAjAAAAAAAAAAAAAAA///3DP//2QgAAAAAAAAAAAAAAAAAAAAAAAAAAAAAAAAAAAAAZAAAAAEAAABAAAAAAAAAAAAAAAAAAAAAAAAAAAAAAAAAAAAAAAAAAAAAAAAAAAAAAAAAAAAAAAAAAAAAAAAAAAAAAAAAAAAAAAAAAAAAAAAAAAAAAAAAAAAAAAAAAAAAFAAAADwAAAAAAAAAAAAAAAAAAAkUAAAAAQAAABQAAAAUAAAAFAAAAAEAAAAAAAAAZAAAAGQAAAAAAAAAZAAAAGQAAAAVAAAAYAAAAAAAAAAAAAAADwAAACADAAAAAAAAAAAAAAEAAACgMgAAVgcAAKr4//8BAAAAf39/AAEAAABkAAAAAAAAABQAAABAHwAAAAAAACYAAAAAAAAAwOD//wAAAAAmAAAAZAAAABYAAABMAAAAAAAAAAAAAAAEAAAAAAAAAAEAAAB3d3cKAAAAACgAAAAoAAAAZAAAAGQAAAAAAAAAzMzMAAAAAABQAAAAUAAAAGQAAABkAAAAAAAAABcAAAAUAAAAAAAAAAAAAAD/fwAA/38AAAAAAAAJAAAABAAAAAAAAAAMAAAAEAAAAAAAAAAAAAAAAAAAAAAAAAAeAAAAaAAAAAAAAAAAAAAAAAAAAAAAAAAAAAAAECcAABAnAAAAAAAAAAAAAAAAAAAAAAAAAAAAAAAAAAAAAAAAAAAAABQAAAAAAAAAwMD/AAAAAABkAAAAMgAAAAAAAABkAAAAAAAAAH9/fwAKAAAAHwAAAFQAAAAAAAAFAAAAAQAAAAAAAAAAAAAAAAAAAAAAAAAAAAAAAAAAAAAAAAAAAAAAAn9/fwAAAAADzMzMAMDA/wB/f38AAAAAAAAAAAAAAAAAAAAAAAAAAAAhAAAAGAAAABQAAAA4EwAAGycAAAglAABZKQAAAAAAACYAAAAIAAAAAAAAAAAAAAA="/>
-              </a:ext>
-            </a:extLst>
           </p:cNvSpPr>
           <p:nvPr>
             <p:ph type="ftr" sz="quarter" idx="11"/>
@@ -1915,12 +1641,7 @@
         <p:txBody>
           <a:bodyPr/>
           <a:lstStyle/>
-          <a:p>
-            <a:pPr/>
-            <a:r>
-              <a:t/>
-            </a:r>
-          </a:p>
+          <a:p/>
         </p:txBody>
       </p:sp>
       <p:sp>
@@ -1928,11 +1649,6 @@
           <p:cNvPr id="9" name="ZoneNuméroDiapositive1"/>
           <p:cNvSpPr>
             <a:spLocks noGrp="1" noChangeArrowheads="1"/>
-            <a:extLst>
-              <a:ext uri="smNativeData">
-                <pr:smNativeData xmlns:pr="smNativeData" val="SMDATA_13_fWmYYBMAAAAlAAAAZAAAAA8BAAAAkAAAAEgAAACQAAAASAAAAAAAAAABAAAAAAAAAAEAAABQAAAAAAAAAAAA4D8AAAAAAADgPwAAAAAAAOA/AAAAAAAA4D8AAAAAAADgPwAAAAAAAOA/AAAAAAAA4D8AAAAAAADgPwAAAAAAAOA/AAAAAAAA4D8CAAAAjAAAAAAAAAAAAAAA///3DP//2QgAAAAAAAAAAAAAAAAAAAAAAAAAAAAAAAAAAAAAZAAAAAEAAABAAAAAAAAAAAAAAAAAAAAAAAAAAAAAAAAAAAAAAAAAAAAAAAAAAAAAAAAAAAAAAAAAAAAAAAAAAAAAAAAAAAAAAAAAAAAAAAAAAAAAAAAAAAAAAAAAAAAAFAAAADwAAAAAAAAAAAAAAAAAAAkUAAAAAQAAABQAAAAUAAAAFAAAAAEAAAAAAAAAZAAAAGQAAAAAAAAAZAAAAGQAAAAVAAAAYAAAAAAAAAAAAAAADwAAACADAAAAAAAAAAAAAAEAAACgMgAAVgcAAKr4//8BAAAAf39/AAEAAABkAAAAAAAAABQAAABAHwAAAAAAACYAAAAAAAAAwOD//wAAAAAmAAAAZAAAABYAAABMAAAAAAAAAAAAAAAEAAAAAAAAAAEAAAB3d3cKAAAAACgAAAAoAAAAZAAAAGQAAAAAAAAAzMzMAAAAAABQAAAAUAAAAGQAAABkAAAAAAAAABcAAAAUAAAAAAAAAAAAAAD/fwAA/38AAAAAAAAJAAAABAAAACgAAAAMAAAAEAAAAAAAAAAAAAAAAAAAAAAAAAAeAAAAaAAAAAAAAAAAAAAAAAAAAAAAAAAAAAAAECcAABAnAAAAAAAAAAAAAAAAAAAAAAAAAAAAAAAAAAAAAAAAAAAAABQAAAAAAAAAwMD/AAAAAABkAAAAMgAAAAAAAABkAAAAAAAAAH9/fwAKAAAAHwAAAFQAAAAAAAAFAAAAAQAAAAAAAAAAAAAAAAAAAAAAAAAAAAAAAAAAAAAAAAAAAAAAAn9/fwAAAAADzMzMAMDA/wB/f38AAAAAAAAAAAAAAAAAAAAAAAAAAAAhAAAAGAAAABQAAABQKAAAGycAAHA1AABZKQAAAAAAACYAAAAIAAAAAAAAAAAAAAA="/>
-              </a:ext>
-            </a:extLst>
           </p:cNvSpPr>
           <p:nvPr>
             <p:ph type="sldNum" sz="quarter" idx="12"/>
@@ -1943,10 +1659,10 @@
           <a:bodyPr/>
           <a:lstStyle/>
           <a:p>
-            <a:pPr/>
             <a:fld id="{47072D65-2BAA-52DB-E4BF-DD8E63F11288}" type="slidenum">
-              <a:t/>
+              <a:rPr/>
             </a:fld>
+            <a:endParaRPr/>
           </a:p>
         </p:txBody>
       </p:sp>
@@ -1959,7 +1675,7 @@
 </file>
 
 <file path=ppt/slideLayouts/slideLayout6.xml><?xml version="1.0" encoding="utf-8"?>
-<p:sldLayout xmlns:p="http://schemas.openxmlformats.org/presentationml/2006/main" xmlns:p14="http://schemas.microsoft.com/office/powerpoint/2010/main" xmlns:r="http://schemas.openxmlformats.org/officeDocument/2006/relationships" xmlns:a="http://schemas.openxmlformats.org/drawingml/2006/main" type="titleOnly">
+<p:sldLayout xmlns:a="http://schemas.openxmlformats.org/drawingml/2006/main" xmlns:r="http://schemas.openxmlformats.org/officeDocument/2006/relationships" xmlns:p="http://schemas.openxmlformats.org/presentationml/2006/main" type="titleOnly">
   <p:cSld name="Titre uniquement">
     <p:spTree>
       <p:nvGrpSpPr>
@@ -1980,14 +1696,9 @@
           <p:cNvPr id="2" name="TitreDiapositive1"/>
           <p:cNvSpPr>
             <a:spLocks noGrp="1" noChangeArrowheads="1"/>
-            <a:extLst>
-              <a:ext uri="smNativeData">
-                <pr:smNativeData xmlns:pr="smNativeData" val="SMDATA_13_fWmYYBMAAAAlAAAAZAAAAA8BAAAAkAAAAEgAAACQAAAASAAAAAAAAAABAAAAAAAAAAEAAABQAAAAAAAAAAAA4D8AAAAAAADgPwAAAAAAAOA/AAAAAAAA4D8AAAAAAADgPwAAAAAAAOA/AAAAAAAA4D8AAAAAAADgPwAAAAAAAOA/AAAAAAAA4D8CAAAAjAAAAAAAAAAAAAAA///3DP//2QgAAAAAAAAAAAAAAAAAAAAAAAAAAAAAAAAAAAAAZAAAAAEAAABAAAAAAAAAAAAAAAAAAAAAAAAAAAAAAAAAAAAAAAAAAAAAAAAAAAAAAAAAAAAAAAAAAAAAAAAAAAAAAAAAAAAAAAAAAAAAAAAAAAAAAAAAAAAAAAAAAAAAFAAAADwAAAAAAAAAAAAAAAAAAAkUAAAAAQAAABQAAAAUAAAAFAAAAAEAAAAAAAAAZAAAAGQAAAAAAAAAZAAAAGQAAAAVAAAAYAAAAAAAAAAAAAAADwAAACADAAAAAAAAAAAAAAEAAACgMgAAVgcAAKr4//8BAAAAf39/AAEAAABkAAAAAAAAABQAAABAHwAAAAAAACYAAAAAAAAAwOD//wAAAAAmAAAAZAAAABYAAABMAAAAAAAAAAAAAAAEAAAAAAAAAAEAAAB3d3cKAAAAACgAAAAoAAAAZAAAAGQAAAAAAAAAzMzMAAAAAABQAAAAUAAAAGQAAABkAAAAAAAAABcAAAAUAAAAAAAAAAAAAAD/fwAA/38AAAAAAAAJAAAABAAAAFAAAAAMAAAAEAAAAAAAAAAAAAAAAAAAAAAAAAAeAAAAaAAAAAAAAAAAAAAAAAAAAAAAAAAAAAAAECcAABAnAAAAAAAAAAAAAAAAAAAAAAAAAAAAAAAAAAAAAAAAAAAAABQAAAAAAAAAwMD/AAAAAABkAAAAMgAAAAAAAABkAAAAAAAAAH9/fwAKAAAAHwAAAFQAAAAAAAAFAAAAAQAAAAAAAAAAAAAAAAAAAAAAAAAAAAAAAAAAAAAAAAAAAAAAAn9/fwAAAAADzMzMAMDA/wB/f38AAAAAAAAAAAAAAAAAAAAAAAAAAAAhAAAAGAAAABQAAADQAgAAsAEAAHA1AAC4CAAAAAAAACYAAAAIAAAAAAAAAAAAAAA="/>
-              </a:ext>
-            </a:extLst>
-          </p:cNvSpPr>
-          <p:nvPr>
-            <p:ph type="title"/>
+          </p:cNvSpPr>
+          <p:nvPr>
+            <p:ph type="title" hasCustomPrompt="1"/>
           </p:nvPr>
         </p:nvSpPr>
         <p:spPr/>
@@ -1995,7 +1706,6 @@
           <a:bodyPr/>
           <a:lstStyle/>
           <a:p>
-            <a:pPr/>
             <a:r>
               <a:t>Cliquez pour modifier le style du masque de titre</a:t>
             </a:r>
@@ -2007,11 +1717,6 @@
           <p:cNvPr id="3" name="ZoneEstampille1"/>
           <p:cNvSpPr>
             <a:spLocks noGrp="1" noChangeArrowheads="1"/>
-            <a:extLst>
-              <a:ext uri="smNativeData">
-                <pr:smNativeData xmlns:pr="smNativeData" val="SMDATA_13_fWmYYBMAAAAlAAAAZAAAAA8BAAAAkAAAAEgAAACQAAAASAAAAAAAAAABAAAAAAAAAAEAAABQAAAAAAAAAAAA4D8AAAAAAADgPwAAAAAAAOA/AAAAAAAA4D8AAAAAAADgPwAAAAAAAOA/AAAAAAAA4D8AAAAAAADgPwAAAAAAAOA/AAAAAAAA4D8CAAAAjAAAAAAAAAAAAAAA///3DP//2QgAAAAAAAAAAAAAAAAAAAAAAAAAAAAAAAAAAAAAZAAAAAEAAABAAAAAAAAAAAAAAAAAAAAAAAAAAAAAAAAAAAAAAAAAAAAAAAAAAAAAAAAAAAAAAAAAAAAAAAAAAAAAAAAAAAAAAAAAAAAAAAAAAAAAAAAAAAAAAAAAAAAAFAAAADwAAAAAAAAAAAAAAAAAAAkUAAAAAQAAABQAAAAUAAAAFAAAAAEAAAAAAAAAZAAAAGQAAAAAAAAAZAAAAGQAAAAVAAAAYAAAAAAAAAAAAAAADwAAACADAAAAAAAAAAAAAAEAAACgMgAAVgcAAKr4//8BAAAAf39/AAEAAABkAAAAAAAAABQAAABAHwAAAAAAACYAAAAAAAAAwOD//wAAAAAmAAAAZAAAABYAAABMAAAAAAAAAAAAAAAEAAAAAAAAAAEAAAB3d3cKAAAAACgAAAAoAAAAZAAAAGQAAAAAAAAAzMzMAAAAAABQAAAAUAAAAGQAAABkAAAAAAAAABcAAAAUAAAAAAAAAAAAAAD/fwAA/38AAAAAAAAJAAAABAAAAAAAAAAMAAAAEAAAAAAAAAAAAAAAAAAAAAAAAAAeAAAAaAAAAAAAAAAAAAAAAAAAAAAAAAAAAAAAECcAABAnAAAAAAAAAAAAAAAAAAAAAAAAAAAAAAAAAAAAAAAAAAAAABQAAAAAAAAAwMD/AAAAAABkAAAAMgAAAAAAAABkAAAAAAAAAH9/fwAKAAAAHwAAAFQAAAAAAAAFAAAAAQAAAAAAAAAAAAAAAAAAAAAAAAAAAAAAAAAAAAAAAAAAAAAAAn9/fwAAAAADzMzMAMDA/wB/f38AAAAAAAAAAAAAAAAAAAAAAAAAAAAhAAAAGAAAABQAAADQAgAAGycAAPAPAABZKQAAAAAAACYAAAAIAAAAAAAAAAAAAAA="/>
-              </a:ext>
-            </a:extLst>
           </p:cNvSpPr>
           <p:nvPr>
             <p:ph type="dt" sz="quarter" idx="10"/>
@@ -2022,10 +1727,10 @@
           <a:bodyPr/>
           <a:lstStyle/>
           <a:p>
-            <a:pPr/>
             <a:fld id="{59731954-1AB4-26EF-FACB-ECBA57850CB9}" type="datetime1">
-              <a:t/>
+              <a:rPr/>
             </a:fld>
+            <a:endParaRPr/>
           </a:p>
         </p:txBody>
       </p:sp>
@@ -2034,11 +1739,6 @@
           <p:cNvPr id="4" name="ZonePiedDePage1"/>
           <p:cNvSpPr>
             <a:spLocks noGrp="1" noChangeArrowheads="1"/>
-            <a:extLst>
-              <a:ext uri="smNativeData">
-                <pr:smNativeData xmlns:pr="smNativeData" val="SMDATA_13_fWmYYBMAAAAlAAAAZAAAAA8BAAAAkAAAAEgAAACQAAAASAAAAAAAAAABAAAAAAAAAAEAAABQAAAAAAAAAAAA4D8AAAAAAADgPwAAAAAAAOA/AAAAAAAA4D8AAAAAAADgPwAAAAAAAOA/AAAAAAAA4D8AAAAAAADgPwAAAAAAAOA/AAAAAAAA4D8CAAAAjAAAAAAAAAAAAAAA///3DP//2QgAAAAAAAAAAAAAAAAAAAAAAAAAAAAAAAAAAAAAZAAAAAEAAABAAAAAAAAAAAAAAAAAAAAAAAAAAAAAAAAAAAAAAAAAAAAAAAAAAAAAAAAAAAAAAAAAAAAAAAAAAAAAAAAAAAAAAAAAAAAAAAAAAAAAAAAAAAAAAAAAAAAAFAAAADwAAAAAAAAAAAAAAAAAAAkUAAAAAQAAABQAAAAUAAAAFAAAAAEAAAAAAAAAZAAAAGQAAAAAAAAAZAAAAGQAAAAVAAAAYAAAAAAAAAAAAAAADwAAACADAAAAAAAAAAAAAAEAAACgMgAAVgcAAKr4//8BAAAAf39/AAEAAABkAAAAAAAAABQAAABAHwAAAAAAACYAAAAAAAAAwOD//wAAAAAmAAAAZAAAABYAAABMAAAAAAAAAAAAAAAEAAAAAAAAAAEAAAB3d3cKAAAAACgAAAAoAAAAZAAAAGQAAAAAAAAAzMzMAAAAAABQAAAAUAAAAGQAAABkAAAAAAAAABcAAAAUAAAAAAAAAAAAAAD/fwAA/38AAAAAAAAJAAAABAAAAAAAAAAMAAAAEAAAAAAAAAAAAAAAAAAAAAAAAAAeAAAAaAAAAAAAAAAAAAAAAAAAAAAAAAAAAAAAECcAABAnAAAAAAAAAAAAAAAAAAAAAAAAAAAAAAAAAAAAAAAAAAAAABQAAAAAAAAAwMD/AAAAAABkAAAAMgAAAAAAAABkAAAAAAAAAH9/fwAKAAAAHwAAAFQAAAAAAAAFAAAAAQAAAAAAAAAAAAAAAAAAAAAAAAAAAAAAAAAAAAAAAAAAAAAAAn9/fwAAAAADzMzMAMDA/wB/f38AAAAAAAAAAAAAAAAAAAAAAAAAAAAhAAAAGAAAABQAAAA4EwAAGycAAAglAABZKQAAAAAAACYAAAAIAAAAAAAAAAAAAAA="/>
-              </a:ext>
-            </a:extLst>
           </p:cNvSpPr>
           <p:nvPr>
             <p:ph type="ftr" sz="quarter" idx="11"/>
@@ -2048,12 +1748,7 @@
         <p:txBody>
           <a:bodyPr/>
           <a:lstStyle/>
-          <a:p>
-            <a:pPr/>
-            <a:r>
-              <a:t/>
-            </a:r>
-          </a:p>
+          <a:p/>
         </p:txBody>
       </p:sp>
       <p:sp>
@@ -2061,11 +1756,6 @@
           <p:cNvPr id="5" name="ZoneNuméroDiapositive1"/>
           <p:cNvSpPr>
             <a:spLocks noGrp="1" noChangeArrowheads="1"/>
-            <a:extLst>
-              <a:ext uri="smNativeData">
-                <pr:smNativeData xmlns:pr="smNativeData" val="SMDATA_13_fWmYYBMAAAAlAAAAZAAAAA8BAAAAkAAAAEgAAACQAAAASAAAAAAAAAABAAAAAAAAAAEAAABQAAAAAAAAAAAA4D8AAAAAAADgPwAAAAAAAOA/AAAAAAAA4D8AAAAAAADgPwAAAAAAAOA/AAAAAAAA4D8AAAAAAADgPwAAAAAAAOA/AAAAAAAA4D8CAAAAjAAAAAAAAAAAAAAA///3DP//2QgAAAAAAAAAAAAAAAAAAAAAAAAAAAAAAAAAAAAAZAAAAAEAAABAAAAAAAAAAAAAAAAAAAAAAAAAAAAAAAAAAAAAAAAAAAAAAAAAAAAAAAAAAAAAAAAAAAAAAAAAAAAAAAAAAAAAAAAAAAAAAAAAAAAAAAAAAAAAAAAAAAAAFAAAADwAAAAAAAAAAAAAAAAAAAkUAAAAAQAAABQAAAAUAAAAFAAAAAEAAAAAAAAAZAAAAGQAAAAAAAAAZAAAAGQAAAAVAAAAYAAAAAAAAAAAAAAADwAAACADAAAAAAAAAAAAAAEAAACgMgAAVgcAAKr4//8BAAAAf39/AAEAAABkAAAAAAAAABQAAABAHwAAAAAAACYAAAAAAAAAwOD//wAAAAAmAAAAZAAAABYAAABMAAAAAAAAAAAAAAAEAAAAAAAAAAEAAAB3d3cKAAAAACgAAAAoAAAAZAAAAGQAAAAAAAAAzMzMAAAAAABQAAAAUAAAAGQAAABkAAAAAAAAABcAAAAUAAAAAAAAAAAAAAD/fwAA/38AAAAAAAAJAAAABAAAAAAAAAAMAAAAEAAAAAAAAAAAAAAAAAAAAAAAAAAeAAAAaAAAAAAAAAAAAAAAAAAAAAAAAAAAAAAAECcAABAnAAAAAAAAAAAAAAAAAAAAAAAAAAAAAAAAAAAAAAAAAAAAABQAAAAAAAAAwMD/AAAAAABkAAAAMgAAAAAAAABkAAAAAAAAAH9/fwAKAAAAHwAAAFQAAAAAAAAFAAAAAQAAAAAAAAAAAAAAAAAAAAAAAAAAAAAAAAAAAAAAAAAAAAAAAn9/fwAAAAADzMzMAMDA/wB/f38AAAAAAAAAAAAAAAAAAAAAAAAAAAAhAAAAGAAAABQAAABQKAAAGycAAHA1AABZKQAAAAAAACYAAAAIAAAAAAAAAAAAAAA="/>
-              </a:ext>
-            </a:extLst>
           </p:cNvSpPr>
           <p:nvPr>
             <p:ph type="sldNum" sz="quarter" idx="12"/>
@@ -2076,10 +1766,10 @@
           <a:bodyPr/>
           <a:lstStyle/>
           <a:p>
-            <a:pPr/>
             <a:fld id="{52EF639A-D4BF-BA95-F157-22C02D190777}" type="slidenum">
-              <a:t/>
+              <a:rPr/>
             </a:fld>
+            <a:endParaRPr/>
           </a:p>
         </p:txBody>
       </p:sp>
@@ -2092,7 +1782,7 @@
 </file>
 
 <file path=ppt/slideLayouts/slideLayout7.xml><?xml version="1.0" encoding="utf-8"?>
-<p:sldLayout xmlns:p="http://schemas.openxmlformats.org/presentationml/2006/main" xmlns:p14="http://schemas.microsoft.com/office/powerpoint/2010/main" xmlns:r="http://schemas.openxmlformats.org/officeDocument/2006/relationships" xmlns:a="http://schemas.openxmlformats.org/drawingml/2006/main" type="blank">
+<p:sldLayout xmlns:a="http://schemas.openxmlformats.org/drawingml/2006/main" xmlns:r="http://schemas.openxmlformats.org/officeDocument/2006/relationships" xmlns:p="http://schemas.openxmlformats.org/presentationml/2006/main" type="blank">
   <p:cSld name="Vide">
     <p:spTree>
       <p:nvGrpSpPr>
@@ -2113,11 +1803,6 @@
           <p:cNvPr id="2" name="ZoneEstampille1"/>
           <p:cNvSpPr>
             <a:spLocks noGrp="1" noChangeArrowheads="1"/>
-            <a:extLst>
-              <a:ext uri="smNativeData">
-                <pr:smNativeData xmlns:pr="smNativeData" val="SMDATA_13_fWmYYBMAAAAlAAAAZAAAAA8BAAAAkAAAAEgAAACQAAAASAAAAAAAAAABAAAAAAAAAAEAAABQAAAAAAAAAAAA4D8AAAAAAADgPwAAAAAAAOA/AAAAAAAA4D8AAAAAAADgPwAAAAAAAOA/AAAAAAAA4D8AAAAAAADgPwAAAAAAAOA/AAAAAAAA4D8CAAAAjAAAAAAAAAAAAAAA///3DP//2QgAAAAAAAAAAAAAAAAAAAAAAAAAAAAAAAAAAAAAZAAAAAEAAABAAAAAAAAAAAAAAAAAAAAAAAAAAAAAAAAAAAAAAAAAAAAAAAAAAAAAAAAAAAAAAAAAAAAAAAAAAAAAAAAAAAAAAAAAAAAAAAAAAAAAAAAAAAAAAAAAAAAAFAAAADwAAAAAAAAAAAAAAAAAAAkUAAAAAQAAABQAAAAUAAAAFAAAAAEAAAAAAAAAZAAAAGQAAAAAAAAAZAAAAGQAAAAVAAAAYAAAAAAAAAAAAAAADwAAACADAAAAAAAAAAAAAAEAAACgMgAAVgcAAKr4//8BAAAAf39/AAEAAABkAAAAAAAAABQAAABAHwAAAAAAACYAAAAAAAAAwOD//wAAAAAmAAAAZAAAABYAAABMAAAAAAAAAAAAAAAEAAAAAAAAAAEAAAB3d3cKAAAAACgAAAAoAAAAZAAAAGQAAAAAAAAAzMzMAAAAAABQAAAAUAAAAGQAAABkAAAAAAAAABcAAAAUAAAAAAAAAAAAAAD/fwAA/38AAAAAAAAJAAAABAAAACAAbwAMAAAAEAAAAAAAAAAAAAAAAAAAAAAAAAAeAAAAaAAAAAAAAAAAAAAAAAAAAAAAAAAAAAAAECcAABAnAAAAAAAAAAAAAAAAAAAAAAAAAAAAAAAAAAAAAAAAAAAAABQAAAAAAAAAwMD/AAAAAABkAAAAMgAAAAAAAABkAAAAAAAAAH9/fwAKAAAAHwAAAFQAAAAAAAAFAAAAAQAAAAAAAAAAAAAAAAAAAAAAAAAAAAAAAAAAAAAAAAAAAAAAAn9/fwAAAAADzMzMAMDA/wB/f38AAAAAAAAAAAAAAAAAAAAAAAAAAAAhAAAAGAAAABQAAADQAgAAGycAAPAPAABZKQAAAAAAACYAAAAIAAAAAAAAAAAAAAA="/>
-              </a:ext>
-            </a:extLst>
           </p:cNvSpPr>
           <p:nvPr>
             <p:ph type="dt" sz="quarter" idx="10"/>
@@ -2128,10 +1813,10 @@
           <a:bodyPr/>
           <a:lstStyle/>
           <a:p>
-            <a:pPr/>
             <a:fld id="{276DF342-0CCA-3805-84D5-FA50BD9B72AF}" type="datetime1">
-              <a:t/>
+              <a:rPr/>
             </a:fld>
+            <a:endParaRPr/>
           </a:p>
         </p:txBody>
       </p:sp>
@@ -2140,11 +1825,6 @@
           <p:cNvPr id="3" name="ZonePiedDePage1"/>
           <p:cNvSpPr>
             <a:spLocks noGrp="1" noChangeArrowheads="1"/>
-            <a:extLst>
-              <a:ext uri="smNativeData">
-                <pr:smNativeData xmlns:pr="smNativeData" val="SMDATA_13_fWmYYBMAAAAlAAAAZAAAAA8BAAAAkAAAAEgAAACQAAAASAAAAAAAAAABAAAAAAAAAAEAAABQAAAAAAAAAAAA4D8AAAAAAADgPwAAAAAAAOA/AAAAAAAA4D8AAAAAAADgPwAAAAAAAOA/AAAAAAAA4D8AAAAAAADgPwAAAAAAAOA/AAAAAAAA4D8CAAAAjAAAAAAAAAAAAAAA///3DP//2QgAAAAAAAAAAAAAAAAAAAAAAAAAAAAAAAAAAAAAZAAAAAEAAABAAAAAAAAAAAAAAAAAAAAAAAAAAAAAAAAAAAAAAAAAAAAAAAAAAAAAAAAAAAAAAAAAAAAAAAAAAAAAAAAAAAAAAAAAAAAAAAAAAAAAAAAAAAAAAAAAAAAAFAAAADwAAAAAAAAAAAAAAAAAAAkUAAAAAQAAABQAAAAUAAAAFAAAAAEAAAAAAAAAZAAAAGQAAAAAAAAAZAAAAGQAAAAVAAAAYAAAAAAAAAAAAAAADwAAACADAAAAAAAAAAAAAAEAAACgMgAAVgcAAKr4//8BAAAAf39/AAEAAABkAAAAAAAAABQAAABAHwAAAAAAACYAAAAAAAAAwOD//wAAAAAmAAAAZAAAABYAAABMAAAAAAAAAAAAAAAEAAAAAAAAAAEAAAB3d3cKAAAAACgAAAAoAAAAZAAAAGQAAAAAAAAAzMzMAAAAAABQAAAAUAAAAGQAAABkAAAAAAAAABcAAAAUAAAAAAAAAAAAAAD/fwAA/38AAAAAAAAJAAAABAAAAAAAAAAMAAAAEAAAAAAAAAAAAAAAAAAAAAAAAAAeAAAAaAAAAAAAAAAAAAAAAAAAAAAAAAAAAAAAECcAABAnAAAAAAAAAAAAAAAAAAAAAAAAAAAAAAAAAAAAAAAAAAAAABQAAAAAAAAAwMD/AAAAAABkAAAAMgAAAAAAAABkAAAAAAAAAH9/fwAKAAAAHwAAAFQAAAAAAAAFAAAAAQAAAAAAAAAAAAAAAAAAAAAAAAAAAAAAAAAAAAAAAAAAAAAAAn9/fwAAAAADzMzMAMDA/wB/f38AAAAAAAAAAAAAAAAAAAAAAAAAAAAhAAAAGAAAABQAAAA4EwAAGycAAAglAABZKQAAAAAAACYAAAAIAAAAAAAAAAAAAAA="/>
-              </a:ext>
-            </a:extLst>
           </p:cNvSpPr>
           <p:nvPr>
             <p:ph type="ftr" sz="quarter" idx="11"/>
@@ -2154,12 +1834,7 @@
         <p:txBody>
           <a:bodyPr/>
           <a:lstStyle/>
-          <a:p>
-            <a:pPr/>
-            <a:r>
-              <a:t/>
-            </a:r>
-          </a:p>
+          <a:p/>
         </p:txBody>
       </p:sp>
       <p:sp>
@@ -2167,11 +1842,6 @@
           <p:cNvPr id="4" name="ZoneNuméroDiapositive1"/>
           <p:cNvSpPr>
             <a:spLocks noGrp="1" noChangeArrowheads="1"/>
-            <a:extLst>
-              <a:ext uri="smNativeData">
-                <pr:smNativeData xmlns:pr="smNativeData" val="SMDATA_13_fWmYYBMAAAAlAAAAZAAAAA8BAAAAkAAAAEgAAACQAAAASAAAAAAAAAABAAAAAAAAAAEAAABQAAAAAAAAAAAA4D8AAAAAAADgPwAAAAAAAOA/AAAAAAAA4D8AAAAAAADgPwAAAAAAAOA/AAAAAAAA4D8AAAAAAADgPwAAAAAAAOA/AAAAAAAA4D8CAAAAjAAAAAAAAAAAAAAA///3DP//2QgAAAAAAAAAAAAAAAAAAAAAAAAAAAAAAAAAAAAAZAAAAAEAAABAAAAAAAAAAAAAAAAAAAAAAAAAAAAAAAAAAAAAAAAAAAAAAAAAAAAAAAAAAAAAAAAAAAAAAAAAAAAAAAAAAAAAAAAAAAAAAAAAAAAAAAAAAAAAAAAAAAAAFAAAADwAAAAAAAAAAAAAAAAAAAkUAAAAAQAAABQAAAAUAAAAFAAAAAEAAAAAAAAAZAAAAGQAAAAAAAAAZAAAAGQAAAAVAAAAYAAAAAAAAAAAAAAADwAAACADAAAAAAAAAAAAAAEAAACgMgAAVgcAAKr4//8BAAAAf39/AAEAAABkAAAAAAAAABQAAABAHwAAAAAAACYAAAAAAAAAwOD//wAAAAAmAAAAZAAAABYAAABMAAAAAAAAAAAAAAAEAAAAAAAAAAEAAAB3d3cKAAAAACgAAAAoAAAAZAAAAGQAAAAAAAAAzMzMAAAAAABQAAAAUAAAAGQAAABkAAAAAAAAABcAAAAUAAAAAAAAAAAAAAD/fwAA/38AAAAAAAAJAAAABAAAAAAAAAAMAAAAEAAAAAAAAAAAAAAAAAAAAAAAAAAeAAAAaAAAAAAAAAAAAAAAAAAAAAAAAAAAAAAAECcAABAnAAAAAAAAAAAAAAAAAAAAAAAAAAAAAAAAAAAAAAAAAAAAABQAAAAAAAAAwMD/AAAAAABkAAAAMgAAAAAAAABkAAAAAAAAAH9/fwAKAAAAHwAAAFQAAAAAAAAFAAAAAQAAAAAAAAAAAAAAAAAAAAAAAAAAAAAAAAAAAAAAAAAAAAAAAn9/fwAAAAADzMzMAMDA/wB/f38AAAAAAAAAAAAAAAAAAAAAAAAAAAAhAAAAGAAAABQAAABQKAAAGycAAHA1AABZKQAAAAAAACYAAAAIAAAAAAAAAAAAAAA="/>
-              </a:ext>
-            </a:extLst>
           </p:cNvSpPr>
           <p:nvPr>
             <p:ph type="sldNum" sz="quarter" idx="12"/>
@@ -2182,10 +1852,10 @@
           <a:bodyPr/>
           <a:lstStyle/>
           <a:p>
-            <a:pPr/>
             <a:fld id="{121D81F5-BBFF-4877-B1A5-4D22CFEB4718}" type="slidenum">
-              <a:t/>
+              <a:rPr/>
             </a:fld>
+            <a:endParaRPr/>
           </a:p>
         </p:txBody>
       </p:sp>
@@ -2198,7 +1868,7 @@
 </file>
 
 <file path=ppt/slideLayouts/slideLayout8.xml><?xml version="1.0" encoding="utf-8"?>
-<p:sldLayout xmlns:p="http://schemas.openxmlformats.org/presentationml/2006/main" xmlns:p14="http://schemas.microsoft.com/office/powerpoint/2010/main" xmlns:r="http://schemas.openxmlformats.org/officeDocument/2006/relationships" xmlns:a="http://schemas.openxmlformats.org/drawingml/2006/main" type="objTx">
+<p:sldLayout xmlns:a="http://schemas.openxmlformats.org/drawingml/2006/main" xmlns:r="http://schemas.openxmlformats.org/officeDocument/2006/relationships" xmlns:p="http://schemas.openxmlformats.org/presentationml/2006/main" type="objTx">
   <p:cSld name="Contenu avec légende">
     <p:spTree>
       <p:nvGrpSpPr>
@@ -2219,14 +1889,9 @@
           <p:cNvPr id="2" name="TitreDiapositive1"/>
           <p:cNvSpPr>
             <a:spLocks noGrp="1" noChangeArrowheads="1"/>
-            <a:extLst>
-              <a:ext uri="smNativeData">
-                <pr:smNativeData xmlns:pr="smNativeData" val="SMDATA_13_fWmYYBMAAAAlAAAAZAAAAA8BAAAAkAAAAEgAAACQAAAASAAAAAAAAAACAAAAAAAAAAEAAABQAAAAAAAAAAAA4D8AAAAAAADgPwAAAAAAAOA/AAAAAAAA4D8AAAAAAADgPwAAAAAAAOA/AAAAAAAA4D8AAAAAAADgPwAAAAAAAOA/AAAAAAAA4D8CAAAAjAAAAAAAAAAAAAAA///3DP//2QgAAAAAAAAAAAAAAAAAAAAAAAAAAAAAAAAAAAAAZAAAAAEAAABAAAAAAAAAAAAAAAAAAAAAAAAAAAAAAAAAAAAAAAAAAAAAAAAAAAAAAAAAAAAAAAAAAAAAAAAAAAAAAAAAAAAAAAAAAAAAAAAAAAAAAAAAAAAAAAAAAAAAFAAAADwAAAAAAAAAAAAAAAAAAAkUAAAAAQAAABQAAAAUAAAAFAAAAAEAAAAAAAAAZAAAAGQAAAAAAAAAZAAAAGQAAAAVAAAAYAAAAAAAAAAAAAAADwAAACADAAAAAAAAAAAAAAEAAACgMgAAVgcAAKr4//8BAAAAf39/AAEAAABkAAAAAAAAABQAAABAHwAAAAAAACYAAAAAAAAAwOD//wAAAAAmAAAAZAAAABYAAABMAAAAAAAAAAAAAAAEAAAAAAAAAAEAAAB3d3cKAAAAACgAAAAoAAAAZAAAAGQAAAAAAAAAzMzMAAAAAABQAAAAUAAAAGQAAABkAAAAAAAAABcAAAAUAAAAAAAAAAAAAAD/fwAA/38AAAAAAAAJAAAABAAAAAAAAAAMAAAAEAAAAAAAAAAAAAAAAAAAAAAAAAAeAAAAaAAAAAAAAAAAAAAAAAAAAAAAAAAAAAAAECcAABAnAAAAAAAAAAAAAAAAAAAAAAAAAAAAAAAAAAAAAAAAAAAAABQAAAAAAAAAwMD/AAAAAABkAAAAMgAAAAAAAABkAAAAAAAAAH9/fwAKAAAAHwAAAFQAAAAAAAAFAAAAAQAAAAAAAAAAAAAAAAAAAAAAAAAAAAAAAAAAAAAAAAAAAAAAAn9/fwAAAAADzMzMAMDA/wB/f38AAAAAAAAAAAAAAAAAAAAAAAAAAAAhAAAAGAAAABQAAADQAgAArgEAAFIVAADUCAAAAAAAACYAAAAIAAAAgYAAAAAAAAA="/>
-              </a:ext>
-            </a:extLst>
-          </p:cNvSpPr>
-          <p:nvPr>
-            <p:ph type="title"/>
+          </p:cNvSpPr>
+          <p:nvPr>
+            <p:ph type="title" hasCustomPrompt="1"/>
           </p:nvPr>
         </p:nvSpPr>
         <p:spPr>
@@ -2236,18 +1901,13 @@
           </a:xfrm>
         </p:spPr>
         <p:txBody>
-          <a:bodyPr vert="horz" wrap="square" numCol="1" spcCol="215900" anchor="b">
-            <a:prstTxWarp prst="textNoShape">
-              <a:avLst/>
-            </a:prstTxWarp>
-          </a:bodyPr>
+          <a:bodyPr vert="horz" wrap="square" numCol="1" spcCol="215900" anchor="b"/>
           <a:lstStyle>
             <a:lvl1pPr algn="l">
               <a:defRPr sz="2000" b="1"/>
             </a:lvl1pPr>
           </a:lstStyle>
           <a:p>
-            <a:pPr/>
             <a:r>
               <a:t>Cliquez pour modifier le style du masque de titre</a:t>
             </a:r>
@@ -2259,14 +1919,9 @@
           <p:cNvPr id="3" name="TexteDiapositive2"/>
           <p:cNvSpPr>
             <a:spLocks noGrp="1" noChangeArrowheads="1"/>
-            <a:extLst>
-              <a:ext uri="smNativeData">
-                <pr:smNativeData xmlns:pr="smNativeData" val="SMDATA_13_fWmYYBMAAAAlAAAAZAAAAA8BAAAAkAAAAEgAAACQAAAASAAAAAAAAAAAAAAAAAAAAAEAAABQAAAAAAAAAAAA4D8AAAAAAADgPwAAAAAAAOA/AAAAAAAA4D8AAAAAAADgPwAAAAAAAOA/AAAAAAAA4D8AAAAAAADgPwAAAAAAAOA/AAAAAAAA4D8CAAAAjAAAAAAAAAAAAAAA///3DP//2QgAAAAAAAAAAAAAAAAAAAAAAAAAAAAAAAAAAAAAZAAAAAEAAABAAAAAAAAAAAAAAAAAAAAAAAAAAAAAAAAAAAAAAAAAAAAAAAAAAAAAAAAAAAAAAAAAAAAAAAAAAAAAAAAAAAAAAAAAAAAAAAAAAAAAAAAAAAAAAAAAAAAAFAAAADwAAAAAAAAAAAAAAAAAAAkUAAAAAQAAABQAAAAUAAAAFAAAAAEAAAAAAAAAZAAAAGQAAAAAAAAAZAAAAGQAAAAVAAAAYAAAAAAAAAAAAAAADwAAACADAAAAAAAAAAAAAAEAAACgMgAAVgcAAKr4//8BAAAAf39/AAEAAABkAAAAAAAAABQAAABAHwAAAAAAACYAAAAAAAAAwOD//wAAAAAmAAAAZAAAABYAAABMAAAAAAAAAAAAAAAEAAAAAAAAAAEAAAB3d3cKAAAAACgAAAAoAAAAZAAAAGQAAAAAAAAAzMzMAAAAAABQAAAAUAAAAGQAAABkAAAAAAAAABcAAAAUAAAAAAAAAAAAAAD/fwAA/38AAAAAAAAJAAAABAAAAODHBAAMAAAAEAAAAAAAAAAAAAAAAAAAAAAAAAAeAAAAaAAAAAAAAAAAAAAAAAAAAAAAAAAAAAAAECcAABAnAAAAAAAAAAAAAAAAAAAAAAAAAAAAAAAAAAAAAAAAAAAAABQAAAAAAAAAwMD/AAAAAABkAAAAMgAAAAAAAABkAAAAAAAAAH9/fwAKAAAAHwAAAFQAAAAAAAAFAAAAAQAAAAAAAAAAAAAAAAAAAAAAAAAAAAAAAAAAAAAAAAAAAAAAAn9/fwAAAAADzMzMAMDA/wB/f38AAAAAAAAAAAAAAAAAAAAAAAAAAAAhAAAAGAAAABQAAAD+FQAArgEAAHA1AACwJQAAAAAAACYAAAAIAAAAAYAAAAAAAAA="/>
-              </a:ext>
-            </a:extLst>
-          </p:cNvSpPr>
-          <p:nvPr>
-            <p:ph idx="1"/>
+          </p:cNvSpPr>
+          <p:nvPr>
+            <p:ph idx="1" hasCustomPrompt="1"/>
           </p:nvPr>
         </p:nvSpPr>
         <p:spPr>
@@ -2307,7 +1962,6 @@
             </a:lvl9pPr>
           </a:lstStyle>
           <a:p>
-            <a:pPr/>
             <a:r>
               <a:t>Cliquez pour modifier les styles du masque de texte</a:t>
             </a:r>
@@ -2343,14 +1997,9 @@
           <p:cNvPr id="4" name="TexteDiapositive1"/>
           <p:cNvSpPr>
             <a:spLocks noGrp="1" noChangeArrowheads="1"/>
-            <a:extLst>
-              <a:ext uri="smNativeData">
-                <pr:smNativeData xmlns:pr="smNativeData" val="SMDATA_13_fWmYYBMAAAAlAAAAZAAAAA8BAAAAkAAAAEgAAACQAAAASAAAAAAAAAAAAAAAAAAAAAEAAABQAAAAAAAAAAAA4D8AAAAAAADgPwAAAAAAAOA/AAAAAAAA4D8AAAAAAADgPwAAAAAAAOA/AAAAAAAA4D8AAAAAAADgPwAAAAAAAOA/AAAAAAAA4D8CAAAAjAAAAAAAAAAAAAAA///3DP//2QgAAAAAAAAAAAAAAAAAAAAAAAAAAAAAAAAAAAAAZAAAAAEAAABAAAAAAAAAAAAAAAAAAAAAAAAAAAAAAAAAAAAAAAAAAAAAAAAAAAAAAAAAAAAAAAAAAAAAAAAAAAAAAAAAAAAAAAAAAAAAAAAAAAAAAAAAAAAAAAAAAAAAFAAAADwAAAAAAAAAAAAAAAAAAAkUAAAAAQAAABQAAAAUAAAAFAAAAAEAAAAAAAAAZAAAAGQAAAAAAAAAZAAAAGQAAAAVAAAAYAAAAAAAAAAAAAAADwAAACADAAAAAAAAAAAAAAEAAACgMgAAVgcAAKr4//8BAAAAf39/AAEAAABkAAAAAAAAABQAAABAHwAAAAAAACYAAAAAAAAAwOD//wAAAAAmAAAAZAAAABYAAABMAAAAAAAAAAAAAAAEAAAAAAAAAAEAAAB3d3cKAAAAACgAAAAoAAAAZAAAAGQAAAAAAAAAzMzMAAAAAABQAAAAUAAAAGQAAABkAAAAAAAAABcAAAAUAAAAAAAAAAAAAAD/fwAA/38AAAAAAAAJAAAABAAAABfaBAAMAAAAEAAAAAAAAAAAAAAAAAAAAAAAAAAeAAAAaAAAAAAAAAAAAAAAAAAAAAAAAAAAAAAAECcAABAnAAAAAAAAAAAAAAAAAAAAAAAAAAAAAAAAAAAAAAAAAAAAABQAAAAAAAAAwMD/AAAAAABkAAAAMgAAAAAAAABkAAAAAAAAAH9/fwAKAAAAHwAAAFQAAAAAAAAFAAAAAQAAAAAAAAAAAAAAAAAAAAAAAAAAAAAAAAAAAAAAAAAAAAAAAn9/fwAAAAADzMzMAMDA/wB/f38AAAAAAAAAAAAAAAAAAAAAAAAAAAAhAAAAGAAAABQAAADQAgAA1AgAAFIVAACwJQAAAAAAACYAAAAIAAAAAYAAAAAAAAA="/>
-              </a:ext>
-            </a:extLst>
-          </p:cNvSpPr>
-          <p:nvPr>
-            <p:ph sz="half" idx="2"/>
+          </p:cNvSpPr>
+          <p:nvPr>
+            <p:ph sz="half" idx="2" hasCustomPrompt="1"/>
           </p:nvPr>
         </p:nvSpPr>
         <p:spPr>
@@ -2400,7 +2049,6 @@
             </a:lvl9pPr>
           </a:lstStyle>
           <a:p>
-            <a:pPr/>
             <a:r>
               <a:t>Cliquez pour modifier les styles du masque de texte</a:t>
             </a:r>
@@ -2412,11 +2060,6 @@
           <p:cNvPr id="5" name="ZoneEstampille1"/>
           <p:cNvSpPr>
             <a:spLocks noGrp="1" noChangeArrowheads="1"/>
-            <a:extLst>
-              <a:ext uri="smNativeData">
-                <pr:smNativeData xmlns:pr="smNativeData" val="SMDATA_13_fWmYYBMAAAAlAAAAZAAAAA8BAAAAkAAAAEgAAACQAAAASAAAAAAAAAABAAAAAAAAAAEAAABQAAAAAAAAAAAA4D8AAAAAAADgPwAAAAAAAOA/AAAAAAAA4D8AAAAAAADgPwAAAAAAAOA/AAAAAAAA4D8AAAAAAADgPwAAAAAAAOA/AAAAAAAA4D8CAAAAjAAAAAAAAAAAAAAA///3DP//2QgAAAAAAAAAAAAAAAAAAAAAAAAAAAAAAAAAAAAAZAAAAAEAAABAAAAAAAAAAAAAAAAAAAAAAAAAAAAAAAAAAAAAAAAAAAAAAAAAAAAAAAAAAAAAAAAAAAAAAAAAAAAAAAAAAAAAAAAAAAAAAAAAAAAAAAAAAAAAAAAAAAAAFAAAADwAAAAAAAAAAAAAAAAAAAkUAAAAAQAAABQAAAAUAAAAFAAAAAEAAAAAAAAAZAAAAGQAAAAAAAAAZAAAAGQAAAAVAAAAYAAAAAAAAAAAAAAADwAAACADAAAAAAAAAAAAAAEAAACgMgAAVgcAAKr4//8BAAAAf39/AAEAAABkAAAAAAAAABQAAABAHwAAAAAAACYAAAAAAAAAwOD//wAAAAAmAAAAZAAAABYAAABMAAAAAAAAAAAAAAAEAAAAAAAAAAEAAAB3d3cKAAAAACgAAAAoAAAAZAAAAGQAAAAAAAAAzMzMAAAAAABQAAAAUAAAAGQAAABkAAAAAAAAABcAAAAUAAAAAAAAAAAAAAD/fwAA/38AAAAAAAAJAAAABAAAAMvmBAAMAAAAEAAAAAAAAAAAAAAAAAAAAAAAAAAeAAAAaAAAAAAAAAAAAAAAAAAAAAAAAAAAAAAAECcAABAnAAAAAAAAAAAAAAAAAAAAAAAAAAAAAAAAAAAAAAAAAAAAABQAAAAAAAAAwMD/AAAAAABkAAAAMgAAAAAAAABkAAAAAAAAAH9/fwAKAAAAHwAAAFQAAAAAAAAFAAAAAQAAAAAAAAAAAAAAAAAAAAAAAAAAAAAAAAAAAAAAAAAAAAAAAn9/fwAAAAADzMzMAMDA/wB/f38AAAAAAAAAAAAAAAAAAAAAAAAAAAAhAAAAGAAAABQAAADQAgAAGycAAPAPAABZKQAAAAAAACYAAAAIAAAAAAAAAAAAAAA="/>
-              </a:ext>
-            </a:extLst>
           </p:cNvSpPr>
           <p:nvPr>
             <p:ph type="dt" sz="quarter" idx="10"/>
@@ -2427,10 +2070,10 @@
           <a:bodyPr/>
           <a:lstStyle/>
           <a:p>
-            <a:pPr/>
             <a:fld id="{4CAFBF7C-32A1-FA49-EF17-C41CF1591991}" type="datetime1">
-              <a:t/>
+              <a:rPr/>
             </a:fld>
+            <a:endParaRPr/>
           </a:p>
         </p:txBody>
       </p:sp>
@@ -2439,11 +2082,6 @@
           <p:cNvPr id="6" name="ZonePiedDePage1"/>
           <p:cNvSpPr>
             <a:spLocks noGrp="1" noChangeArrowheads="1"/>
-            <a:extLst>
-              <a:ext uri="smNativeData">
-                <pr:smNativeData xmlns:pr="smNativeData" val="SMDATA_13_fWmYYBMAAAAlAAAAZAAAAA8BAAAAkAAAAEgAAACQAAAASAAAAAAAAAABAAAAAAAAAAEAAABQAAAAAAAAAAAA4D8AAAAAAADgPwAAAAAAAOA/AAAAAAAA4D8AAAAAAADgPwAAAAAAAOA/AAAAAAAA4D8AAAAAAADgPwAAAAAAAOA/AAAAAAAA4D8CAAAAjAAAAAAAAAAAAAAA///3DP//2QgAAAAAAAAAAAAAAAAAAAAAAAAAAAAAAAAAAAAAZAAAAAEAAABAAAAAAAAAAAAAAAAAAAAAAAAAAAAAAAAAAAAAAAAAAAAAAAAAAAAAAAAAAAAAAAAAAAAAAAAAAAAAAAAAAAAAAAAAAAAAAAAAAAAAAAAAAAAAAAAAAAAAFAAAADwAAAAAAAAAAAAAAAAAAAkUAAAAAQAAABQAAAAUAAAAFAAAAAEAAAAAAAAAZAAAAGQAAAAAAAAAZAAAAGQAAAAVAAAAYAAAAAAAAAAAAAAADwAAACADAAAAAAAAAAAAAAEAAACgMgAAVgcAAKr4//8BAAAAf39/AAEAAABkAAAAAAAAABQAAABAHwAAAAAAACYAAAAAAAAAwOD//wAAAAAmAAAAZAAAABYAAABMAAAAAAAAAAAAAAAEAAAAAAAAAAEAAAB3d3cKAAAAACgAAAAoAAAAZAAAAGQAAAAAAAAAzMzMAAAAAABQAAAAUAAAAGQAAABkAAAAAAAAABcAAAAUAAAAAAAAAAAAAAD/fwAA/38AAAAAAAAJAAAABAAAAAAAAAAMAAAAEAAAAAAAAAAAAAAAAAAAAAAAAAAeAAAAaAAAAAAAAAAAAAAAAAAAAAAAAAAAAAAAECcAABAnAAAAAAAAAAAAAAAAAAAAAAAAAAAAAAAAAAAAAAAAAAAAABQAAAAAAAAAwMD/AAAAAABkAAAAMgAAAAAAAABkAAAAAAAAAH9/fwAKAAAAHwAAAFQAAAAAAAAFAAAAAQAAAAAAAAAAAAAAAAAAAAAAAAAAAAAAAAAAAAAAAAAAAAAAAn9/fwAAAAADzMzMAMDA/wB/f38AAAAAAAAAAAAAAAAAAAAAAAAAAAAhAAAAGAAAABQAAAA4EwAAGycAAAglAABZKQAAAAAAACYAAAAIAAAAAAAAAAAAAAA="/>
-              </a:ext>
-            </a:extLst>
           </p:cNvSpPr>
           <p:nvPr>
             <p:ph type="ftr" sz="quarter" idx="11"/>
@@ -2453,12 +2091,7 @@
         <p:txBody>
           <a:bodyPr/>
           <a:lstStyle/>
-          <a:p>
-            <a:pPr/>
-            <a:r>
-              <a:t/>
-            </a:r>
-          </a:p>
+          <a:p/>
         </p:txBody>
       </p:sp>
       <p:sp>
@@ -2466,11 +2099,6 @@
           <p:cNvPr id="7" name="ZoneNuméroDiapositive1"/>
           <p:cNvSpPr>
             <a:spLocks noGrp="1" noChangeArrowheads="1"/>
-            <a:extLst>
-              <a:ext uri="smNativeData">
-                <pr:smNativeData xmlns:pr="smNativeData" val="SMDATA_13_fWmYYBMAAAAlAAAAZAAAAA8BAAAAkAAAAEgAAACQAAAASAAAAAAAAAABAAAAAAAAAAEAAABQAAAAAAAAAAAA4D8AAAAAAADgPwAAAAAAAOA/AAAAAAAA4D8AAAAAAADgPwAAAAAAAOA/AAAAAAAA4D8AAAAAAADgPwAAAAAAAOA/AAAAAAAA4D8CAAAAjAAAAAAAAAAAAAAA///3DP//2QgAAAAAAAAAAAAAAAAAAAAAAAAAAAAAAAAAAAAAZAAAAAEAAABAAAAAAAAAAAAAAAAAAAAAAAAAAAAAAAAAAAAAAAAAAAAAAAAAAAAAAAAAAAAAAAAAAAAAAAAAAAAAAAAAAAAAAAAAAAAAAAAAAAAAAAAAAAAAAAAAAAAAFAAAADwAAAAAAAAAAAAAAAAAAAkUAAAAAQAAABQAAAAUAAAAFAAAAAEAAAAAAAAAZAAAAGQAAAAAAAAAZAAAAGQAAAAVAAAAYAAAAAAAAAAAAAAADwAAACADAAAAAAAAAAAAAAEAAACgMgAAVgcAAKr4//8BAAAAf39/AAEAAABkAAAAAAAAABQAAABAHwAAAAAAACYAAAAAAAAAwOD//wAAAAAmAAAAZAAAABYAAABMAAAAAAAAAAAAAAAEAAAAAAAAAAEAAAB3d3cKAAAAACgAAAAoAAAAZAAAAGQAAAAAAAAAzMzMAAAAAABQAAAAUAAAAGQAAABkAAAAAAAAABcAAAAUAAAAAAAAAAAAAAD/fwAA/38AAAAAAAAJAAAABAAAAAAAAAAMAAAAEAAAAAAAAAAAAAAAAAAAAAAAAAAeAAAAaAAAAAAAAAAAAAAAAAAAAAAAAAAAAAAAECcAABAnAAAAAAAAAAAAAAAAAAAAAAAAAAAAAAAAAAAAAAAAAAAAABQAAAAAAAAAwMD/AAAAAABkAAAAMgAAAAAAAABkAAAAAAAAAH9/fwAKAAAAHwAAAFQAAAAAAAAFAAAAAQAAAAAAAAAAAAAAAAAAAAAAAAAAAAAAAAAAAAAAAAAAAAAAAn9/fwAAAAADzMzMAMDA/wB/f38AAAAAAAAAAAAAAAAAAAAAAAAAAAAhAAAAGAAAABQAAABQKAAAGycAAHA1AABZKQAAAAAAACYAAAAIAAAAAAAAAAAAAAA="/>
-              </a:ext>
-            </a:extLst>
           </p:cNvSpPr>
           <p:nvPr>
             <p:ph type="sldNum" sz="quarter" idx="12"/>
@@ -2481,10 +2109,10 @@
           <a:bodyPr/>
           <a:lstStyle/>
           <a:p>
-            <a:pPr/>
             <a:fld id="{54177084-CAB9-4286-F7AF-3CD33EE10169}" type="slidenum">
-              <a:t/>
+              <a:rPr/>
             </a:fld>
+            <a:endParaRPr/>
           </a:p>
         </p:txBody>
       </p:sp>
@@ -2497,7 +2125,7 @@
 </file>
 
 <file path=ppt/slideLayouts/slideLayout9.xml><?xml version="1.0" encoding="utf-8"?>
-<p:sldLayout xmlns:p="http://schemas.openxmlformats.org/presentationml/2006/main" xmlns:p14="http://schemas.microsoft.com/office/powerpoint/2010/main" xmlns:r="http://schemas.openxmlformats.org/officeDocument/2006/relationships" xmlns:a="http://schemas.openxmlformats.org/drawingml/2006/main" type="picTx">
+<p:sldLayout xmlns:a="http://schemas.openxmlformats.org/drawingml/2006/main" xmlns:r="http://schemas.openxmlformats.org/officeDocument/2006/relationships" xmlns:p="http://schemas.openxmlformats.org/presentationml/2006/main" type="picTx">
   <p:cSld name="Image avec légende">
     <p:spTree>
       <p:nvGrpSpPr>
@@ -2518,14 +2146,9 @@
           <p:cNvPr id="2" name="TitreDiapositive1"/>
           <p:cNvSpPr>
             <a:spLocks noGrp="1" noChangeArrowheads="1"/>
-            <a:extLst>
-              <a:ext uri="smNativeData">
-                <pr:smNativeData xmlns:pr="smNativeData" val="SMDATA_13_fWmYYBMAAAAlAAAAZAAAAA8BAAAAkAAAAEgAAACQAAAASAAAAAAAAAACAAAAAAAAAAEAAABQAAAAAAAAAAAA4D8AAAAAAADgPwAAAAAAAOA/AAAAAAAA4D8AAAAAAADgPwAAAAAAAOA/AAAAAAAA4D8AAAAAAADgPwAAAAAAAOA/AAAAAAAA4D8CAAAAjAAAAAAAAAAAAAAA///3DP//2QgAAAAAAAAAAAAAAAAAAAAAAAAAAAAAAAAAAAAAZAAAAAEAAABAAAAAAAAAAAAAAAAAAAAAAAAAAAAAAAAAAAAAAAAAAAAAAAAAAAAAAAAAAAAAAAAAAAAAAAAAAAAAAAAAAAAAAAAAAAAAAAAAAAAAAAAAAAAAAAAAAAAAFAAAADwAAAAAAAAAAAAAAAAAAAkUAAAAAQAAABQAAAAUAAAAFAAAAAEAAAAAAAAAZAAAAGQAAAAAAAAAZAAAAGQAAAAVAAAAYAAAAAAAAAAAAAAADwAAACADAAAAAAAAAAAAAAEAAACgMgAAVgcAAKr4//8BAAAAf39/AAEAAABkAAAAAAAAABQAAABAHwAAAAAAACYAAAAAAAAAwOD//wAAAAAmAAAAZAAAABYAAABMAAAAAAAAAAAAAAAEAAAAAAAAAAEAAAB3d3cKAAAAACgAAAAoAAAAZAAAAGQAAAAAAAAAzMzMAAAAAABQAAAAUAAAAGQAAABkAAAAAAAAABcAAAAUAAAAAAAAAAAAAAD/fwAA/38AAAAAAAAJAAAABAAAAGEyVTAMAAAAEAAAAAAAAAAAAAAAAAAAAAAAAAAeAAAAaAAAAAAAAAAAAAAAAAAAAAAAAAAAAAAAECcAABAnAAAAAAAAAAAAAAAAAAAAAAAAAAAAAAAAAAAAAAAAAAAAABQAAAAAAAAAwMD/AAAAAABkAAAAMgAAAAAAAABkAAAAAAAAAH9/fwAKAAAAHwAAAFQAAAAAAAAFAAAAAQAAAAAAAAAAAAAAAAAAAAAAAAAAAAAAAAAAAAAAAAAAAAAAAn9/fwAAAAADzMzMAMDA/wB/f38AAAAAAAAAAAAAAAAAAAAAAAAAAAAhAAAAGAAAABQAAAAGCwAAiB0AAMYsAAAEIQAAAAAAACYAAAAIAAAAgYAAAAAAAAA="/>
-              </a:ext>
-            </a:extLst>
-          </p:cNvSpPr>
-          <p:nvPr>
-            <p:ph type="title"/>
+          </p:cNvSpPr>
+          <p:nvPr>
+            <p:ph type="title" hasCustomPrompt="1"/>
           </p:nvPr>
         </p:nvSpPr>
         <p:spPr>
@@ -2535,18 +2158,13 @@
           </a:xfrm>
         </p:spPr>
         <p:txBody>
-          <a:bodyPr vert="horz" wrap="square" numCol="1" spcCol="215900" anchor="b">
-            <a:prstTxWarp prst="textNoShape">
-              <a:avLst/>
-            </a:prstTxWarp>
-          </a:bodyPr>
+          <a:bodyPr vert="horz" wrap="square" numCol="1" spcCol="215900" anchor="b"/>
           <a:lstStyle>
             <a:lvl1pPr algn="l">
               <a:defRPr sz="2000" b="1"/>
             </a:lvl1pPr>
           </a:lstStyle>
           <a:p>
-            <a:pPr/>
             <a:r>
               <a:t>Cliquez pour modifier le style du masque de titre</a:t>
             </a:r>
@@ -2558,14 +2176,9 @@
           <p:cNvPr id="3" name="TexteDiapositive2"/>
           <p:cNvSpPr>
             <a:spLocks noGrp="1" noChangeArrowheads="1"/>
-            <a:extLst>
-              <a:ext uri="smNativeData">
-                <pr:smNativeData xmlns:pr="smNativeData" val="SMDATA_13_fWmYYBMAAAAlAAAAZAAAAA8BAAAAkAAAAEgAAACQAAAASAAAAAAAAAAAAAAAAAAAAAEAAABQAAAAAAAAAAAA4D8AAAAAAADgPwAAAAAAAOA/AAAAAAAA4D8AAAAAAADgPwAAAAAAAOA/AAAAAAAA4D8AAAAAAADgPwAAAAAAAOA/AAAAAAAA4D8CAAAAjAAAAAAAAAAAAAAA///3DP//2QgAAAAAAAAAAAAAAAAAAAAAAAAAAAAAAAAAAAAAZAAAAAEAAABAAAAAAAAAAAAAAAAAAAAAAAAAAAAAAAAAAAAAAAAAAAAAAAAAAAAAAAAAAAAAAAAAAAAAAAAAAAAAAAAAAAAAAAAAAAAAAAAAAAAAAAAAAAAAAAAAAAAAFAAAADwAAAAAAAAAAAAAAAAAAAkUAAAAAQAAABQAAAAUAAAAFAAAAAEAAAAAAAAAZAAAAGQAAAAAAAAAZAAAAGQAAAAVAAAAYAAAAAAAAAAAAAAADwAAACADAAAAAAAAAAAAAAEAAACgMgAAVgcAAKr4//8BAAAAf39/AAEAAABkAAAAAAAAABQAAABAHwAAAAAAACYAAAAAAAAAwOD//wAAAAAmAAAAZAAAABYAAABMAAAAAAAAAAAAAAAEAAAAAAAAAAEAAAB3d3cKAAAAACgAAAAoAAAAZAAAAGQAAAAAAAAAzMzMAAAAAABQAAAAUAAAAGQAAABkAAAAAAAAABcAAAAUAAAAAAAAAAAAAAD/fwAA/38AAAAAAAAJAAAABAAAAAAAAAAMAAAAEAAAAAAAAAAAAAAAAAAAAAAAAAAeAAAAaAAAAAAAAAAAAAAAAAAAAAAAAAAAAAAAECcAABAnAAAAAAAAAAAAAAAAAAAAAAAAAAAAAAAAAAAAAAAAAAAAABQAAAAAAAAAwMD/AAAAAABkAAAAMgAAAAAAAABkAAAAAAAAAH9/fwAKAAAAHwAAAFQAAAAAAAAFAAAAAQAAAAAAAAAAAAAAAAAAAAAAAAAAAAAAAAAAAAAAAAAAAAAAAn9/fwAAAAADzMzMAMDA/wB/f38AAAAAAAAAAAAAAAAAAAAAAAAAAAAhAAAAGAAAABQAAAAGCwAAxgMAAMYsAAAWHQAAAAAAACYAAAAIAAAAAYAAAAAAAAA="/>
-              </a:ext>
-            </a:extLst>
-          </p:cNvSpPr>
-          <p:nvPr>
-            <p:ph idx="1"/>
+          </p:cNvSpPr>
+          <p:nvPr>
+            <p:ph idx="1" hasCustomPrompt="1"/>
           </p:nvPr>
         </p:nvSpPr>
         <p:spPr>
@@ -2615,7 +2228,6 @@
             </a:lvl9pPr>
           </a:lstStyle>
           <a:p>
-            <a:pPr/>
             <a:r>
               <a:t>Cliquez pour modifier les styles du masque de texte</a:t>
             </a:r>
@@ -2627,14 +2239,9 @@
           <p:cNvPr id="4" name="TexteDiapositive1"/>
           <p:cNvSpPr>
             <a:spLocks noGrp="1" noChangeArrowheads="1"/>
-            <a:extLst>
-              <a:ext uri="smNativeData">
-                <pr:smNativeData xmlns:pr="smNativeData" val="SMDATA_13_fWmYYBMAAAAlAAAAZAAAAA8BAAAAkAAAAEgAAACQAAAASAAAAAAAAAAAAAAAAAAAAAEAAABQAAAAAAAAAAAA4D8AAAAAAADgPwAAAAAAAOA/AAAAAAAA4D8AAAAAAADgPwAAAAAAAOA/AAAAAAAA4D8AAAAAAADgPwAAAAAAAOA/AAAAAAAA4D8CAAAAjAAAAAAAAAAAAAAA///3DP//2QgAAAAAAAAAAAAAAAAAAAAAAAAAAAAAAAAAAAAAZAAAAAEAAABAAAAAAAAAAAAAAAAAAAAAAAAAAAAAAAAAAAAAAAAAAAAAAAAAAAAAAAAAAAAAAAAAAAAAAAAAAAAAAAAAAAAAAAAAAAAAAAAAAAAAAAAAAAAAAAAAAAAAFAAAADwAAAAAAAAAAAAAAAAAAAkUAAAAAQAAABQAAAAUAAAAFAAAAAEAAAAAAAAAZAAAAGQAAAAAAAAAZAAAAGQAAAAVAAAAYAAAAAAAAAAAAAAADwAAACADAAAAAAAAAAAAAAEAAACgMgAAVgcAAKr4//8BAAAAf39/AAEAAABkAAAAAAAAABQAAABAHwAAAAAAACYAAAAAAAAAwOD//wAAAAAmAAAAZAAAABYAAABMAAAAAAAAAAAAAAAEAAAAAAAAAAEAAAB3d3cKAAAAACgAAAAoAAAAZAAAAGQAAAAAAAAAzMzMAAAAAABQAAAAUAAAAGQAAABkAAAAAAAAABcAAAAUAAAAAAAAAAAAAAD/fwAA/38AAAAAAAAJAAAABAAAAAAAAAAMAAAAEAAAAAAAAAAAAAAAAAAAAAAAAAAeAAAAaAAAAAAAAAAAAAAAAAAAAAAAAAAAAAAAECcAABAnAAAAAAAAAAAAAAAAAAAAAAAAAAAAAAAAAAAAAAAAAAAAABQAAAAAAAAAwMD/AAAAAABkAAAAMgAAAAAAAABkAAAAAAAAAH9/fwAKAAAAHwAAAFQAAAAAAAAFAAAAAQAAAAAAAAAAAAAAAAAAAAAAAAAAAAAAAAAAAAAAAAAAAAAAAn9/fwAAAAADzMzMAMDA/wB/f38AAAAAAAAAAAAAAAAAAAAAAAAAAAAhAAAAGAAAABQAAAAGCwAABCEAAMYsAAD4JQAAAAAAACYAAAAIAAAAAYAAAAAAAAA="/>
-              </a:ext>
-            </a:extLst>
-          </p:cNvSpPr>
-          <p:nvPr>
-            <p:ph sz="half" idx="2"/>
+          </p:cNvSpPr>
+          <p:nvPr>
+            <p:ph sz="half" idx="2" hasCustomPrompt="1"/>
           </p:nvPr>
         </p:nvSpPr>
         <p:spPr>
@@ -2684,7 +2291,6 @@
             </a:lvl9pPr>
           </a:lstStyle>
           <a:p>
-            <a:pPr/>
             <a:r>
               <a:t>Cliquez pour modifier les styles du masque de texte</a:t>
             </a:r>
@@ -2696,11 +2302,6 @@
           <p:cNvPr id="5" name="ZoneEstampille1"/>
           <p:cNvSpPr>
             <a:spLocks noGrp="1" noChangeArrowheads="1"/>
-            <a:extLst>
-              <a:ext uri="smNativeData">
-                <pr:smNativeData xmlns:pr="smNativeData" val="SMDATA_13_fWmYYBMAAAAlAAAAZAAAAA8BAAAAkAAAAEgAAACQAAAASAAAAAAAAAABAAAAAAAAAAEAAABQAAAAAAAAAAAA4D8AAAAAAADgPwAAAAAAAOA/AAAAAAAA4D8AAAAAAADgPwAAAAAAAOA/AAAAAAAA4D8AAAAAAADgPwAAAAAAAOA/AAAAAAAA4D8CAAAAjAAAAAAAAAAAAAAA///3DP//2QgAAAAAAAAAAAAAAAAAAAAAAAAAAAAAAAAAAAAAZAAAAAEAAABAAAAAAAAAAAAAAAAAAAAAAAAAAAAAAAAAAAAAAAAAAAAAAAAAAAAAAAAAAAAAAAAAAAAAAAAAAAAAAAAAAAAAAAAAAAAAAAAAAAAAAAAAAAAAAAAAAAAAFAAAADwAAAAAAAAAAAAAAAAAAAkUAAAAAQAAABQAAAAUAAAAFAAAAAEAAAAAAAAAZAAAAGQAAAAAAAAAZAAAAGQAAAAVAAAAYAAAAAAAAAAAAAAADwAAACADAAAAAAAAAAAAAAEAAACgMgAAVgcAAKr4//8BAAAAf39/AAEAAABkAAAAAAAAABQAAABAHwAAAAAAACYAAAAAAAAAwOD//wAAAAAmAAAAZAAAABYAAABMAAAAAAAAAAAAAAAEAAAAAAAAAAEAAAB3d3cKAAAAACgAAAAoAAAAZAAAAGQAAAAAAAAAzMzMAAAAAABQAAAAUAAAAGQAAABkAAAAAAAAABcAAAAUAAAAAAAAAAAAAAD/fwAA/38AAAAAAAAJAAAABAAAAAAAAAAMAAAAEAAAAAAAAAAAAAAAAAAAAAAAAAAeAAAAaAAAAAAAAAAAAAAAAAAAAAAAAAAAAAAAECcAABAnAAAAAAAAAAAAAAAAAAAAAAAAAAAAAAAAAAAAAAAAAAAAABQAAAAAAAAAwMD/AAAAAABkAAAAMgAAAAAAAABkAAAAAAAAAH9/fwAKAAAAHwAAAFQAAAAAAAAFAAAAAQAAAAAAAAAAAAAAAAAAAAAAAAAAAAAAAAAAAAAAAAAAAAAAAn9/fwAAAAADzMzMAMDA/wB/f38AAAAAAAAAAAAAAAAAAAAAAAAAAAAhAAAAGAAAABQAAADQAgAAGycAAPAPAABZKQAAAAAAACYAAAAIAAAAAAAAAAAAAAA="/>
-              </a:ext>
-            </a:extLst>
           </p:cNvSpPr>
           <p:nvPr>
             <p:ph type="dt" sz="quarter" idx="10"/>
@@ -2711,10 +2312,10 @@
           <a:bodyPr/>
           <a:lstStyle/>
           <a:p>
-            <a:pPr/>
             <a:fld id="{0702B54A-04EA-5743-A4BA-F216FBF452A7}" type="datetime1">
-              <a:t/>
+              <a:rPr/>
             </a:fld>
+            <a:endParaRPr/>
           </a:p>
         </p:txBody>
       </p:sp>
@@ -2723,11 +2324,6 @@
           <p:cNvPr id="6" name="ZonePiedDePage1"/>
           <p:cNvSpPr>
             <a:spLocks noGrp="1" noChangeArrowheads="1"/>
-            <a:extLst>
-              <a:ext uri="smNativeData">
-                <pr:smNativeData xmlns:pr="smNativeData" val="SMDATA_13_fWmYYBMAAAAlAAAAZAAAAA8BAAAAkAAAAEgAAACQAAAASAAAAAAAAAABAAAAAAAAAAEAAABQAAAAAAAAAAAA4D8AAAAAAADgPwAAAAAAAOA/AAAAAAAA4D8AAAAAAADgPwAAAAAAAOA/AAAAAAAA4D8AAAAAAADgPwAAAAAAAOA/AAAAAAAA4D8CAAAAjAAAAAAAAAAAAAAA///3DP//2QgAAAAAAAAAAAAAAAAAAAAAAAAAAAAAAAAAAAAAZAAAAAEAAABAAAAAAAAAAAAAAAAAAAAAAAAAAAAAAAAAAAAAAAAAAAAAAAAAAAAAAAAAAAAAAAAAAAAAAAAAAAAAAAAAAAAAAAAAAAAAAAAAAAAAAAAAAAAAAAAAAAAAFAAAADwAAAAAAAAAAAAAAAAAAAkUAAAAAQAAABQAAAAUAAAAFAAAAAEAAAAAAAAAZAAAAGQAAAAAAAAAZAAAAGQAAAAVAAAAYAAAAAAAAAAAAAAADwAAACADAAAAAAAAAAAAAAEAAACgMgAAVgcAAKr4//8BAAAAf39/AAEAAABkAAAAAAAAABQAAABAHwAAAAAAACYAAAAAAAAAwOD//wAAAAAmAAAAZAAAABYAAABMAAAAAAAAAAAAAAAEAAAAAAAAAAEAAAB3d3cKAAAAACgAAAAoAAAAZAAAAGQAAAAAAAAAzMzMAAAAAABQAAAAUAAAAGQAAABkAAAAAAAAABcAAAAUAAAAAAAAAAAAAAD/fwAA/38AAAAAAAAJAAAABAAAAAAAAAAMAAAAEAAAAAAAAAAAAAAAAAAAAAAAAAAeAAAAaAAAAAAAAAAAAAAAAAAAAAAAAAAAAAAAECcAABAnAAAAAAAAAAAAAAAAAAAAAAAAAAAAAAAAAAAAAAAAAAAAABQAAAAAAAAAwMD/AAAAAABkAAAAMgAAAAAAAABkAAAAAAAAAH9/fwAKAAAAHwAAAFQAAAAAAAAFAAAAAQAAAAAAAAAAAAAAAAAAAAAAAAAAAAAAAAAAAAAAAAAAAAAAAn9/fwAAAAADzMzMAMDA/wB/f38AAAAAAAAAAAAAAAAAAAAAAAAAAAAhAAAAGAAAABQAAAA4EwAAGycAAAglAABZKQAAAAAAACYAAAAIAAAAAAAAAAAAAAA="/>
-              </a:ext>
-            </a:extLst>
           </p:cNvSpPr>
           <p:nvPr>
             <p:ph type="ftr" sz="quarter" idx="11"/>
@@ -2737,12 +2333,7 @@
         <p:txBody>
           <a:bodyPr/>
           <a:lstStyle/>
-          <a:p>
-            <a:pPr/>
-            <a:r>
-              <a:t/>
-            </a:r>
-          </a:p>
+          <a:p/>
         </p:txBody>
       </p:sp>
       <p:sp>
@@ -2750,11 +2341,6 @@
           <p:cNvPr id="7" name="ZoneNuméroDiapositive1"/>
           <p:cNvSpPr>
             <a:spLocks noGrp="1" noChangeArrowheads="1"/>
-            <a:extLst>
-              <a:ext uri="smNativeData">
-                <pr:smNativeData xmlns:pr="smNativeData" val="SMDATA_13_fWmYYBMAAAAlAAAAZAAAAA8BAAAAkAAAAEgAAACQAAAASAAAAAAAAAABAAAAAAAAAAEAAABQAAAAAAAAAAAA4D8AAAAAAADgPwAAAAAAAOA/AAAAAAAA4D8AAAAAAADgPwAAAAAAAOA/AAAAAAAA4D8AAAAAAADgPwAAAAAAAOA/AAAAAAAA4D8CAAAAjAAAAAAAAAAAAAAA///3DP//2QgAAAAAAAAAAAAAAAAAAAAAAAAAAAAAAAAAAAAAZAAAAAEAAABAAAAAAAAAAAAAAAAAAAAAAAAAAAAAAAAAAAAAAAAAAAAAAAAAAAAAAAAAAAAAAAAAAAAAAAAAAAAAAAAAAAAAAAAAAAAAAAAAAAAAAAAAAAAAAAAAAAAAFAAAADwAAAAAAAAAAAAAAAAAAAkUAAAAAQAAABQAAAAUAAAAFAAAAAEAAAAAAAAAZAAAAGQAAAAAAAAAZAAAAGQAAAAVAAAAYAAAAAAAAAAAAAAADwAAACADAAAAAAAAAAAAAAEAAACgMgAAVgcAAKr4//8BAAAAf39/AAEAAABkAAAAAAAAABQAAABAHwAAAAAAACYAAAAAAAAAwOD//wAAAAAmAAAAZAAAABYAAABMAAAAAAAAAAAAAAAEAAAAAAAAAAEAAAB3d3cKAAAAACgAAAAoAAAAZAAAAGQAAAAAAAAAzMzMAAAAAABQAAAAUAAAAGQAAABkAAAAAAAAABcAAAAUAAAAAAAAAAAAAAD/fwAA/38AAAAAAAAJAAAABAAAAAAAAAAMAAAAEAAAAAAAAAAAAAAAAAAAAAAAAAAeAAAAaAAAAAAAAAAAAAAAAAAAAAAAAAAAAAAAECcAABAnAAAAAAAAAAAAAAAAAAAAAAAAAAAAAAAAAAAAAAAAAAAAABQAAAAAAAAAwMD/AAAAAABkAAAAMgAAAAAAAABkAAAAAAAAAH9/fwAKAAAAHwAAAFQAAAAAAAAFAAAAAQAAAAAAAAAAAAAAAAAAAAAAAAAAAAAAAAAAAAAAAAAAAAAAAn9/fwAAAAADzMzMAMDA/wB/f38AAAAAAAAAAAAAAAAAAAAAAAAAAAAhAAAAGAAAABQAAABQKAAAGycAAHA1AABZKQAAAAAAACYAAAAIAAAAAAAAAAAAAAA="/>
-              </a:ext>
-            </a:extLst>
           </p:cNvSpPr>
           <p:nvPr>
             <p:ph type="sldNum" sz="quarter" idx="12"/>
@@ -2765,10 +2351,10 @@
           <a:bodyPr/>
           <a:lstStyle/>
           <a:p>
-            <a:pPr/>
             <a:fld id="{03175CAA-E4EE-42AA-A0AF-12FF12E15647}" type="slidenum">
-              <a:t/>
+              <a:rPr/>
             </a:fld>
+            <a:endParaRPr/>
           </a:p>
         </p:txBody>
       </p:sp>
@@ -2781,8 +2367,8 @@
 </file>
 
 <file path=ppt/slideMasters/slideMaster1.xml><?xml version="1.0" encoding="utf-8"?>
-<p:sldMaster xmlns:p="http://schemas.openxmlformats.org/presentationml/2006/main" xmlns:p14="http://schemas.microsoft.com/office/powerpoint/2010/main" xmlns:r="http://schemas.openxmlformats.org/officeDocument/2006/relationships" xmlns:a="http://schemas.openxmlformats.org/drawingml/2006/main">
-  <p:cSld name="Création par défaut">
+<p:sldMaster xmlns:a="http://schemas.openxmlformats.org/drawingml/2006/main" xmlns:r="http://schemas.openxmlformats.org/officeDocument/2006/relationships" xmlns:p="http://schemas.openxmlformats.org/presentationml/2006/main">
+  <p:cSld>
     <p:bg>
       <p:bgPr>
         <a:solidFill>
@@ -2810,11 +2396,6 @@
           <p:cNvPr id="2" name="TitreDiapositive1"/>
           <p:cNvSpPr>
             <a:spLocks noGrp="1" noChangeArrowheads="1"/>
-            <a:extLst>
-              <a:ext uri="smNativeData">
-                <pr:smNativeData xmlns:pr="smNativeData" val="SMDATA_13_fWmYYBMAAAAlAAAAZAAAAA8BAAAAkAAAAEgAAACQAAAASAAAAAAAAAABAAAAAAAAAAEAAABQAAAAAAAAAAAA4D8AAAAAAADgPwAAAAAAAOA/AAAAAAAA4D8AAAAAAADgPwAAAAAAAOA/AAAAAAAA4D8AAAAAAADgPwAAAAAAAOA/AAAAAAAA4D8CAAAAjAAAAAAAAAAAAAAA///3DP//2QgAAAAAAAAAAAAAAAAAAAAAAAAAAAAAAAAAAAAAZAAAAAEAAABAAAAAAAAAAAAAAAAAAAAAAAAAAAAAAAAAAAAAAAAAAAAAAAAAAAAAAAAAAAAAAAAAAAAAAAAAAAAAAAAAAAAAAAAAAAAAAAAAAAAAAAAAAAAAAAAAAAAAFAAAADwAAAAAAAAAAAAAAAAAAAkUAAAAAQAAABQAAAAUAAAAFAAAAAEAAAAAAAAAZAAAAGQAAAAAAAAAZAAAAGQAAAAVAAAAYAAAAAAAAAAAAAAADwAAACADAAAAAAAAAAAAAAEAAACgMgAAVgcAAKr4//8BAAAAf39/AAEAAABkAAAAAAAAABQAAABAHwAAAAAAACYAAAAAAAAAwOD//wAAAAAmAAAAZAAAABYAAABMAAAAAAAAAAAAAAAEAAAAAAAAAAEAAAB3d3cKAAAAACgAAAAoAAAAZAAAAGQAAAAAAAAAzMzMAAAAAABQAAAAUAAAAGQAAABkAAAAAAAAABcAAAAUAAAAAAAAAAAAAAD/fwAA/38AAAAAAAAJAAAABAAAAAAAAAAMAAAAEAAAAAAAAAAAAAAAAAAAAAAAAAAeAAAAaAAAAAAAAAAAAAAAAAAAAAAAAAAAAAAAECcAABAnAAAAAAAAAAAAAAAAAAAAAAAAAAAAAAAAAAAAAAAAAAAAABQAAAAAAAAAwMD/AAAAAABkAAAAMgAAAAAAAABkAAAAAAAAAH9/fwAKAAAAHwAAAFQAAAAAAAAFAAAAAQAAAAAAAAAAAAAAAAAAAAAAAAAAAAAAAAAAAAAAAAAAAAAAAn9/fwAAAAADzMzMAMDA/wB/f38AAAAAAAAAAAAAAAAAAAAAAAAAAAAhAAAAGAAAABQAAADQAgAAsAEAAHA1AAC4CAAAAAAAACYAAAAIAAAA//////////8="/>
-              </a:ext>
-            </a:extLst>
           </p:cNvSpPr>
           <p:nvPr>
             <p:ph type="title"/>
@@ -2835,14 +2416,9 @@
           <a:effectLst/>
         </p:spPr>
         <p:txBody>
-          <a:bodyPr vert="horz" wrap="square" numCol="1" spcCol="215900" anchor="ctr">
-            <a:prstTxWarp prst="textNoShape">
-              <a:avLst/>
-            </a:prstTxWarp>
-          </a:bodyPr>
-          <a:lstStyle/>
-          <a:p>
-            <a:pPr/>
+          <a:bodyPr vert="horz" wrap="square" numCol="1" spcCol="215900" anchor="ctr"/>
+          <a:lstStyle/>
+          <a:p>
             <a:r>
               <a:t>Cliquez pour modifier le style du masque de titre</a:t>
             </a:r>
@@ -2854,11 +2430,6 @@
           <p:cNvPr id="3" name="TexteDiapositive1"/>
           <p:cNvSpPr>
             <a:spLocks noGrp="1" noChangeArrowheads="1"/>
-            <a:extLst>
-              <a:ext uri="smNativeData">
-                <pr:smNativeData xmlns:pr="smNativeData" val="SMDATA_13_fWmYYBMAAAAlAAAAZAAAAA8BAAAAkAAAAEgAAACQAAAASAAAAAAAAAAAAAAAAAAAAAEAAABQAAAAAAAAAAAA4D8AAAAAAADgPwAAAAAAAOA/AAAAAAAA4D8AAAAAAADgPwAAAAAAAOA/AAAAAAAA4D8AAAAAAADgPwAAAAAAAOA/AAAAAAAA4D8CAAAAjAAAAAAAAAAAAAAA///3DP//2QgAAAAAAAAAAAAAAAAAAAAAAAAAAAAAAAAAAAAAZAAAAAEAAABAAAAAAAAAAAAAAAAAAAAAAAAAAAAAAAAAAAAAAAAAAAAAAAAAAAAAAAAAAAAAAAAAAAAAAAAAAAAAAAAAAAAAAAAAAAAAAAAAAAAAAAAAAAAAAAAAAAAAFAAAADwAAAAAAAAAAAAAAAAAAAkUAAAAAQAAABQAAAAUAAAAFAAAAAEAAAAAAAAAZAAAAGQAAAAAAAAAZAAAAGQAAAAVAAAAYAAAAAAAAAAAAAAADwAAACADAAAAAAAAAAAAAAEAAACgMgAAVgcAAKr4//8BAAAAf39/AAEAAABkAAAAAAAAABQAAABAHwAAAAAAACYAAAAAAAAAwOD//wAAAAAmAAAAZAAAABYAAABMAAAAAAAAAAAAAAAEAAAAAAAAAAEAAAB3d3cKAAAAACgAAAAoAAAAZAAAAGQAAAAAAAAAzMzMAAAAAABQAAAAUAAAAGQAAABkAAAAAAAAABcAAAAUAAAAAAAAAAAAAAD/fwAA/38AAAAAAAAJAAAABAAAAAAAAAAMAAAAEAAAAAAAAAAAAAAAAAAAAAAAAAAeAAAAaAAAAAAAAAAAAAAAAAAAAAAAAAAAAAAAECcAABAnAAAAAAAAAAAAAAAAAAAAAAAAAAAAAAAAAAAAAAAAAAAAABQAAAAAAAAAwMD/AAAAAABkAAAAMgAAAAAAAABkAAAAAAAAAH9/fwAKAAAAHwAAAFQAAAAAAAAFAAAAAQAAAAAAAAAAAAAAAAAAAAAAAAAAAAAAAAAAAAAAAAAAAAAAAn9/fwAAAAADzMzMAMDA/wB/f38AAAAAAAAAAAAAAAAAAAAAAAAAAAAhAAAAGAAAABQAAADQAgAA2AkAAHA1AACwJQAAAAAAACYAAAAIAAAA//////////8="/>
-              </a:ext>
-            </a:extLst>
           </p:cNvSpPr>
           <p:nvPr>
             <p:ph type="body" idx="1"/>
@@ -2879,14 +2450,9 @@
           <a:effectLst/>
         </p:spPr>
         <p:txBody>
-          <a:bodyPr vert="horz" wrap="square" numCol="1" spcCol="215900" anchor="t">
-            <a:prstTxWarp prst="textNoShape">
-              <a:avLst/>
-            </a:prstTxWarp>
-          </a:bodyPr>
-          <a:lstStyle/>
-          <a:p>
-            <a:pPr/>
+          <a:bodyPr vert="horz" wrap="square" numCol="1" spcCol="215900" anchor="t"/>
+          <a:lstStyle/>
+          <a:p>
             <a:r>
               <a:t>Cliquez pour modifier les styles du masque de texte</a:t>
             </a:r>
@@ -2922,11 +2488,6 @@
           <p:cNvPr id="4" name="ZoneEstampille1"/>
           <p:cNvSpPr>
             <a:spLocks noGrp="1" noChangeArrowheads="1"/>
-            <a:extLst>
-              <a:ext uri="smNativeData">
-                <pr:smNativeData xmlns:pr="smNativeData" val="SMDATA_13_fWmYYBMAAAAlAAAAZAAAAA8BAAAAkAAAAEgAAACQAAAASAAAAAAAAAABAAAAAAAAAAEAAABQAAAAAAAAAAAA4D8AAAAAAADgPwAAAAAAAOA/AAAAAAAA4D8AAAAAAADgPwAAAAAAAOA/AAAAAAAA4D8AAAAAAADgPwAAAAAAAOA/AAAAAAAA4D8CAAAAjAAAAAAAAAAAAAAA///3DP//2QgAAAAAAAAAAAAAAAAAAAAAAAAAAAAAAAAAAAAAZAAAAAEAAABAAAAAAAAAAAAAAAAAAAAAAAAAAAAAAAAAAAAAAAAAAAAAAAAAAAAAAAAAAAAAAAAAAAAAAAAAAAAAAAAAAAAAAAAAAAAAAAAAAAAAAAAAAAAAAAAAAAAAFAAAADwAAAAAAAAAAAAAAAAAAAkUAAAAAQAAABQAAAAUAAAAFAAAAAEAAAAAAAAAZAAAAGQAAAAAAAAAZAAAAGQAAAAVAAAAYAAAAAAAAAAAAAAADwAAACADAAAAAAAAAAAAAAEAAACgMgAAVgcAAKr4//8BAAAAf39/AAEAAABkAAAAAAAAABQAAABAHwAAAAAAACYAAAAAAAAAwOD//wAAAAAmAAAAZAAAABYAAABMAAAAAAAAAAAAAAAEAAAAAAAAAAEAAAB3d3cKAAAAACgAAAAoAAAAZAAAAGQAAAAAAAAAzMzMAAAAAABQAAAAUAAAAGQAAABkAAAAAAAAABcAAAAUAAAAAAAAAAAAAAD/fwAA/38AAAAAAAAJAAAABAAAAEQ9MTAMAAAAEAAAAAAAAAAAAAAAAAAAAAAAAAAeAAAAaAAAAAAAAAAAAAAAAAAAAAAAAAAAAAAAECcAABAnAAAAAAAAAAAAAAAAAAAAAAAAAAAAAAAAAAAAAAAAAAAAABQAAAAAAAAAwMD/AAAAAABkAAAAMgAAAAAAAABkAAAAAAAAAH9/fwAKAAAAHwAAAFQAAAAAAAAFAAAAAQAAAAAAAAAAAAAAAAAAAAAAAAAAAAAAAAAAAAAAAAAAAAAAAn9/fwAAAAADzMzMAMDA/wB/f38AAAAAAAAAAAAAAAAAAAAAAAAAAAAhAAAAGAAAABQAAADQAgAAGycAAPAPAABZKQAAAAAAACYAAAAIAAAA//////////8="/>
-              </a:ext>
-            </a:extLst>
           </p:cNvSpPr>
           <p:nvPr>
             <p:ph type="dt" sz="quarter" idx="2"/>
@@ -2947,21 +2508,17 @@
           <a:effectLst/>
         </p:spPr>
         <p:txBody>
-          <a:bodyPr vert="horz" wrap="square" numCol="1" spcCol="215900" anchor="ctr">
-            <a:prstTxWarp prst="textNoShape">
-              <a:avLst/>
-            </a:prstTxWarp>
-          </a:bodyPr>
+          <a:bodyPr vert="horz" wrap="square" numCol="1" spcCol="215900" anchor="ctr"/>
           <a:lstStyle>
             <a:lvl1pPr algn="l">
               <a:defRPr sz="1200"/>
             </a:lvl1pPr>
           </a:lstStyle>
           <a:p>
-            <a:pPr/>
             <a:fld id="{210F0F75-3BCC-5AF9-82B7-CDAC41F97498}" type="datetime1">
-              <a:t/>
+              <a:rPr/>
             </a:fld>
+            <a:endParaRPr/>
           </a:p>
         </p:txBody>
       </p:sp>
@@ -2970,11 +2527,6 @@
           <p:cNvPr id="5" name="ZonePiedDePage1"/>
           <p:cNvSpPr>
             <a:spLocks noGrp="1" noChangeArrowheads="1"/>
-            <a:extLst>
-              <a:ext uri="smNativeData">
-                <pr:smNativeData xmlns:pr="smNativeData" val="SMDATA_13_fWmYYBMAAAAlAAAAZAAAAA8BAAAAkAAAAEgAAACQAAAASAAAAAAAAAABAAAAAAAAAAEAAABQAAAAAAAAAAAA4D8AAAAAAADgPwAAAAAAAOA/AAAAAAAA4D8AAAAAAADgPwAAAAAAAOA/AAAAAAAA4D8AAAAAAADgPwAAAAAAAOA/AAAAAAAA4D8CAAAAjAAAAAAAAAAAAAAA///3DP//2QgAAAAAAAAAAAAAAAAAAAAAAAAAAAAAAAAAAAAAZAAAAAEAAABAAAAAAAAAAAAAAAAAAAAAAAAAAAAAAAAAAAAAAAAAAAAAAAAAAAAAAAAAAAAAAAAAAAAAAAAAAAAAAAAAAAAAAAAAAAAAAAAAAAAAAAAAAAAAAAAAAAAAFAAAADwAAAAAAAAAAAAAAAAAAAkUAAAAAQAAABQAAAAUAAAAFAAAAAEAAAAAAAAAZAAAAGQAAAAAAAAAZAAAAGQAAAAVAAAAYAAAAAAAAAAAAAAADwAAACADAAAAAAAAAAAAAAEAAACgMgAAVgcAAKr4//8BAAAAf39/AAEAAABkAAAAAAAAABQAAABAHwAAAAAAACYAAAAAAAAAwOD//wAAAAAmAAAAZAAAABYAAABMAAAAAAAAAAAAAAAEAAAAAAAAAAEAAAB3d3cKAAAAACgAAAAoAAAAZAAAAGQAAAAAAAAAzMzMAAAAAABQAAAAUAAAAGQAAABkAAAAAAAAABcAAAAUAAAAAAAAAAAAAAD/fwAA/38AAAAAAAAJAAAABAAAAAAAAAAMAAAAEAAAAAAAAAAAAAAAAAAAAAAAAAAeAAAAaAAAAAAAAAAAAAAAAAAAAAAAAAAAAAAAECcAABAnAAAAAAAAAAAAAAAAAAAAAAAAAAAAAAAAAAAAAAAAAAAAABQAAAAAAAAAwMD/AAAAAABkAAAAMgAAAAAAAABkAAAAAAAAAH9/fwAKAAAAHwAAAFQAAAAAAAAFAAAAAQAAAAAAAAAAAAAAAAAAAAAAAAAAAAAAAAAAAAAAAAAAAAAAAn9/fwAAAAADzMzMAMDA/wB/f38AAAAAAAAAAAAAAAAAAAAAAAAAAAAhAAAAGAAAABQAAAA4EwAAGycAAAglAABZKQAAAAAAACYAAAAIAAAA//////////8="/>
-              </a:ext>
-            </a:extLst>
           </p:cNvSpPr>
           <p:nvPr>
             <p:ph type="ftr" sz="quarter" idx="3"/>
@@ -2995,22 +2547,13 @@
           <a:effectLst/>
         </p:spPr>
         <p:txBody>
-          <a:bodyPr vert="horz" wrap="square" numCol="1" spcCol="215900" anchor="ctr">
-            <a:prstTxWarp prst="textNoShape">
-              <a:avLst/>
-            </a:prstTxWarp>
-          </a:bodyPr>
+          <a:bodyPr vert="horz" wrap="square" numCol="1" spcCol="215900" anchor="ctr"/>
           <a:lstStyle>
             <a:lvl1pPr algn="ctr">
               <a:defRPr sz="1200"/>
             </a:lvl1pPr>
           </a:lstStyle>
-          <a:p>
-            <a:pPr/>
-            <a:r>
-              <a:t/>
-            </a:r>
-          </a:p>
+          <a:p/>
         </p:txBody>
       </p:sp>
       <p:sp>
@@ -3018,11 +2561,6 @@
           <p:cNvPr id="6" name="ZoneNuméroDiapositive1"/>
           <p:cNvSpPr>
             <a:spLocks noGrp="1" noChangeArrowheads="1"/>
-            <a:extLst>
-              <a:ext uri="smNativeData">
-                <pr:smNativeData xmlns:pr="smNativeData" val="SMDATA_13_fWmYYBMAAAAlAAAAZAAAAA8BAAAAkAAAAEgAAACQAAAASAAAAAAAAAABAAAAAAAAAAEAAABQAAAAAAAAAAAA4D8AAAAAAADgPwAAAAAAAOA/AAAAAAAA4D8AAAAAAADgPwAAAAAAAOA/AAAAAAAA4D8AAAAAAADgPwAAAAAAAOA/AAAAAAAA4D8CAAAAjAAAAAAAAAAAAAAA///3DP//2QgAAAAAAAAAAAAAAAAAAAAAAAAAAAAAAAAAAAAAZAAAAAEAAABAAAAAAAAAAAAAAAAAAAAAAAAAAAAAAAAAAAAAAAAAAAAAAAAAAAAAAAAAAAAAAAAAAAAAAAAAAAAAAAAAAAAAAAAAAAAAAAAAAAAAAAAAAAAAAAAAAAAAFAAAADwAAAAAAAAAAAAAAAAAAAkUAAAAAQAAABQAAAAUAAAAFAAAAAEAAAAAAAAAZAAAAGQAAAAAAAAAZAAAAGQAAAAVAAAAYAAAAAAAAAAAAAAADwAAACADAAAAAAAAAAAAAAEAAACgMgAAVgcAAKr4//8BAAAAf39/AAEAAABkAAAAAAAAABQAAABAHwAAAAAAACYAAAAAAAAAwOD//wAAAAAmAAAAZAAAABYAAABMAAAAAAAAAAAAAAAEAAAAAAAAAAEAAAB3d3cKAAAAACgAAAAoAAAAZAAAAGQAAAAAAAAAzMzMAAAAAABQAAAAUAAAAGQAAABkAAAAAAAAABcAAAAUAAAAAAAAAAAAAAD/fwAA/38AAAAAAAAJAAAABAAAAAAAAAAMAAAAEAAAAAAAAAAAAAAAAAAAAAAAAAAeAAAAaAAAAAAAAAAAAAAAAAAAAAAAAAAAAAAAECcAABAnAAAAAAAAAAAAAAAAAAAAAAAAAAAAAAAAAAAAAAAAAAAAABQAAAAAAAAAwMD/AAAAAABkAAAAMgAAAAAAAABkAAAAAAAAAH9/fwAKAAAAHwAAAFQAAAAAAAAFAAAAAQAAAAAAAAAAAAAAAAAAAAAAAAAAAAAAAAAAAAAAAAAAAAAAAn9/fwAAAAADzMzMAMDA/wB/f38AAAAAAAAAAAAAAAAAAAAAAAAAAAAhAAAAGAAAABQAAABQKAAAGycAAHA1AABZKQAAAAAAACYAAAAIAAAA//////////8="/>
-              </a:ext>
-            </a:extLst>
           </p:cNvSpPr>
           <p:nvPr>
             <p:ph type="sldNum" sz="quarter" idx="4"/>
@@ -3043,21 +2581,17 @@
           <a:effectLst/>
         </p:spPr>
         <p:txBody>
-          <a:bodyPr vert="horz" wrap="square" numCol="1" spcCol="215900" anchor="ctr">
-            <a:prstTxWarp prst="textNoShape">
-              <a:avLst/>
-            </a:prstTxWarp>
-          </a:bodyPr>
+          <a:bodyPr vert="horz" wrap="square" numCol="1" spcCol="215900" anchor="ctr"/>
           <a:lstStyle>
             <a:lvl1pPr algn="r">
               <a:defRPr sz="1200"/>
             </a:lvl1pPr>
           </a:lstStyle>
           <a:p>
-            <a:pPr/>
             <a:fld id="{7B642694-DA96-31D0-D8DC-2C8568922E79}" type="slidenum">
-              <a:t/>
+              <a:rPr/>
             </a:fld>
+            <a:endParaRPr/>
           </a:p>
         </p:txBody>
       </p:sp>
@@ -3091,7 +2625,6 @@
           <a:spcPts val="0"/>
         </a:spcAft>
         <a:buNone/>
-        <a:tabLst/>
         <a:defRPr sz="4400" b="0" i="0" u="none" strike="noStrike" kern="1" spc="0" baseline="0">
           <a:solidFill>
             <a:schemeClr val="tx2"/>
@@ -3118,7 +2651,6 @@
         <a:buSzTx/>
         <a:buFontTx/>
         <a:buChar char="•"/>
-        <a:tabLst/>
         <a:defRPr sz="3200" b="0" i="0" u="none" strike="noStrike" kern="1" spc="0" baseline="0">
           <a:solidFill>
             <a:schemeClr val="tx1"/>
@@ -3143,7 +2675,6 @@
         <a:buSzTx/>
         <a:buFontTx/>
         <a:buChar char="–"/>
-        <a:tabLst/>
         <a:defRPr sz="2800" b="0" i="0" u="none" strike="noStrike" kern="1" spc="0" baseline="0">
           <a:solidFill>
             <a:schemeClr val="tx1"/>
@@ -3168,7 +2699,6 @@
         <a:buSzTx/>
         <a:buFontTx/>
         <a:buChar char="•"/>
-        <a:tabLst/>
         <a:defRPr sz="2400" b="0" i="0" u="none" strike="noStrike" kern="1" spc="0" baseline="0">
           <a:solidFill>
             <a:schemeClr val="tx1"/>
@@ -3193,7 +2723,6 @@
         <a:buSzTx/>
         <a:buFontTx/>
         <a:buChar char="–"/>
-        <a:tabLst/>
         <a:defRPr sz="2000" b="0" i="0" u="none" strike="noStrike" kern="1" spc="0" baseline="0">
           <a:solidFill>
             <a:schemeClr val="tx1"/>
@@ -3218,7 +2747,6 @@
         <a:buSzTx/>
         <a:buFontTx/>
         <a:buChar char="»"/>
-        <a:tabLst/>
         <a:defRPr sz="2000" b="0" i="0" u="none" strike="noStrike" kern="1" spc="0" baseline="0">
           <a:solidFill>
             <a:schemeClr val="tx1"/>
@@ -3243,7 +2771,6 @@
         <a:buSzTx/>
         <a:buFontTx/>
         <a:buChar char="•"/>
-        <a:tabLst/>
         <a:defRPr sz="2000" b="0" i="0" u="none" strike="noStrike" kern="1" spc="0" baseline="0">
           <a:solidFill>
             <a:schemeClr val="tx1"/>
@@ -3268,7 +2795,6 @@
         <a:buSzTx/>
         <a:buFontTx/>
         <a:buChar char="•"/>
-        <a:tabLst/>
         <a:defRPr sz="2000" b="0" i="0" u="none" strike="noStrike" kern="1" spc="0" baseline="0">
           <a:solidFill>
             <a:schemeClr val="tx1"/>
@@ -3293,7 +2819,6 @@
         <a:buSzTx/>
         <a:buFontTx/>
         <a:buChar char="•"/>
-        <a:tabLst/>
         <a:defRPr sz="2000" b="0" i="0" u="none" strike="noStrike" kern="1" spc="0" baseline="0">
           <a:solidFill>
             <a:schemeClr val="tx1"/>
@@ -3318,7 +2843,6 @@
         <a:buSzTx/>
         <a:buFontTx/>
         <a:buChar char="•"/>
-        <a:tabLst/>
         <a:defRPr sz="2000" b="0" i="0" u="none" strike="noStrike" kern="1" spc="0" baseline="0">
           <a:solidFill>
             <a:schemeClr val="tx1"/>
@@ -3342,7 +2866,6 @@
           <a:spcPts val="0"/>
         </a:spcAft>
         <a:buNone/>
-        <a:tabLst/>
         <a:defRPr sz="1800" b="0" i="0" u="none" strike="noStrike" kern="1" spc="0" baseline="0">
           <a:solidFill>
             <a:schemeClr val="tx1"/>
@@ -3364,7 +2887,6 @@
           <a:spcPts val="0"/>
         </a:spcAft>
         <a:buNone/>
-        <a:tabLst/>
         <a:defRPr sz="1800" b="0" i="0" u="none" strike="noStrike" kern="1" spc="0" baseline="0">
           <a:solidFill>
             <a:schemeClr val="tx1"/>
@@ -3386,7 +2908,6 @@
           <a:spcPts val="0"/>
         </a:spcAft>
         <a:buNone/>
-        <a:tabLst/>
         <a:defRPr sz="1800" b="0" i="0" u="none" strike="noStrike" kern="1" spc="0" baseline="0">
           <a:solidFill>
             <a:schemeClr val="tx1"/>
@@ -3408,7 +2929,6 @@
           <a:spcPts val="0"/>
         </a:spcAft>
         <a:buNone/>
-        <a:tabLst/>
         <a:defRPr sz="1800" b="0" i="0" u="none" strike="noStrike" kern="1" spc="0" baseline="0">
           <a:solidFill>
             <a:schemeClr val="tx1"/>
@@ -3430,7 +2950,6 @@
           <a:spcPts val="0"/>
         </a:spcAft>
         <a:buNone/>
-        <a:tabLst/>
         <a:defRPr sz="1800" b="0" i="0" u="none" strike="noStrike" kern="1" spc="0" baseline="0">
           <a:solidFill>
             <a:schemeClr val="tx1"/>
@@ -3452,7 +2971,6 @@
           <a:spcPts val="0"/>
         </a:spcAft>
         <a:buNone/>
-        <a:tabLst/>
         <a:defRPr sz="1800" b="0" i="0" u="none" strike="noStrike" kern="1" spc="0" baseline="0">
           <a:solidFill>
             <a:schemeClr val="tx1"/>
@@ -3474,7 +2992,6 @@
           <a:spcPts val="0"/>
         </a:spcAft>
         <a:buNone/>
-        <a:tabLst/>
         <a:defRPr sz="1800" b="0" i="0" u="none" strike="noStrike" kern="1" spc="0" baseline="0">
           <a:solidFill>
             <a:schemeClr val="tx1"/>
@@ -3496,7 +3013,6 @@
           <a:spcPts val="0"/>
         </a:spcAft>
         <a:buNone/>
-        <a:tabLst/>
         <a:defRPr sz="1800" b="0" i="0" u="none" strike="noStrike" kern="1" spc="0" baseline="0">
           <a:solidFill>
             <a:schemeClr val="tx1"/>
@@ -3518,7 +3034,6 @@
           <a:spcPts val="0"/>
         </a:spcAft>
         <a:buNone/>
-        <a:tabLst/>
         <a:defRPr sz="1800" b="0" i="0" u="none" strike="noStrike" kern="1" spc="0" baseline="0">
           <a:solidFill>
             <a:schemeClr val="tx1"/>
@@ -3535,7 +3050,7 @@
 </file>
 
 <file path=ppt/slides/slide1.xml><?xml version="1.0" encoding="utf-8"?>
-<p:sld xmlns:p="http://schemas.openxmlformats.org/presentationml/2006/main" xmlns:p14="http://schemas.microsoft.com/office/powerpoint/2010/main" xmlns:r="http://schemas.openxmlformats.org/officeDocument/2006/relationships" xmlns:a="http://schemas.openxmlformats.org/drawingml/2006/main">
+<p:sld xmlns:a="http://schemas.openxmlformats.org/drawingml/2006/main" xmlns:r="http://schemas.openxmlformats.org/officeDocument/2006/relationships" xmlns:p="http://schemas.openxmlformats.org/presentationml/2006/main">
   <p:cSld>
     <p:spTree>
       <p:nvGrpSpPr>
@@ -3556,11 +3071,6 @@
           <p:cNvPr id="2" name="SousTitreDiapositive1"/>
           <p:cNvSpPr>
             <a:spLocks noGrp="1" noChangeArrowheads="1"/>
-            <a:extLst>
-              <a:ext uri="smNativeData">
-                <pr:smNativeData xmlns:pr="smNativeData" val="SMDATA_13_fWmYYBMAAAAlAAAAZAAAAA8BAAAAkAAAAEgAAACQAAAASAAAAAAAAAAAAAAAAAAAAAEAAABQAAAAAAAAAAAA4D8AAAAAAADgPwAAAAAAAOA/AAAAAAAA4D8AAAAAAADgPwAAAAAAAOA/AAAAAAAA4D8AAAAAAADgPwAAAAAAAOA/AAAAAAAA4D8CAAAAjAAAAAAAAAAAAAAA///3DP//2QgAAAAAAAAAAAAAAAAAAAAAAAAAAAAAAAAAAAAAZAAAAAEAAABAAAAAAAAAAAAAAAAAAAAAAAAAAAAAAAAAAAAAAAAAAAAAAAAAAAAAAAAAAAAAAAAAAAAAAAAAAAAAAAAAAAAAAAAAAAAAAAAAAAAAAAAAAAAAAAAAAAAAFAAAADwAAAAAAAAAAAAAAAAAAAkUAAAAAQAAABQAAAAUAAAAFAAAAAEAAAAAAAAAZAAAAGQAAAAAAAAAZAAAAGQAAAAVAAAAYAAAAAAAAAAAAAAADwAAACADAAAAAAAAAAAAAAEAAACgMgAAVgcAAKr4//8BAAAAf39/AAEAAABkAAAAAAAAABQAAABAHwAAAAAAACYAAAAAAAAAwOD//wAAAAAmAAAAZAAAABYAAABMAAAAAAAAAAAAAAAEAAAAAAAAAAEAAAB3d3cKAAAAACgAAAAoAAAAZAAAAGQAAAAAAAAAzMzMAAAAAABQAAAAUAAAAGQAAABkAAAAAAAAABcAAAAUAAAAAAAAAAAAAAD/fwAA/38AAAAAAAAJAAAABAAAAAAAAAAMAAAAEAAAAAAAAAAAAAAAAAAAAAAAAAAeAAAAaAAAAAAAAAAAAAAAAAAAAAAAAAAAAAAAECcAABAnAAAAAAAAAAAAAAAAAAAAAAAAAAAAAAAAAAAAAAAAAAAAABQAAAAAAAAAwMD/AAAAAABkAAAAMgAAAAAAAABkAAAAAAAAAH9/fwAKAAAAHwAAAFQAAAD///cF///ZAQAAAAAAAAAAAAAAAAAAAAAAAAAAAAAAAAAAAAAAAAAAAAAAAn9/fwB3d3cDzMzMAMDA/wB/f38AAAAAAAAAAAAAAAAAAAAAAAAAAAAhAAAAGAAAABQAAAB8BgAAbBsAAEAxAADbIgAAAAAAACYAAAAIAAAAAQAAAAAAAAA="/>
-              </a:ext>
-            </a:extLst>
           </p:cNvSpPr>
           <p:nvPr>
             <p:ph type="subTitle" idx="1"/>
@@ -3606,16 +3116,11 @@
           <p:cNvPr id="3" name="Image1"/>
           <p:cNvPicPr>
             <a:picLocks noChangeAspect="1"/>
-            <a:extLst>
-              <a:ext uri="smNativeData">
-                <pr:smNativeData xmlns:pr="smNativeData" val="SMDATA_15_fWmYYBMAAAAlAAAAEQAAAC8BAAAAkAAAAEgAAACQAAAASAAAAAAAAAAAAAAAAAAAAAEAAABQAAAAAAAAAAAA4D8AAAAAAADgPwAAAAAAAOA/AAAAAAAA4D8AAAAAAADgPwAAAAAAAOA/AAAAAAAA4D8AAAAAAADgPwAAAAAAAOA/AAAAAAAA4D8CAAAAjAAAAAAAAAAAAAAA///3DP//2QgAAAAAAAAAAAAAAAAAAAAAAAAAAAAAAAAAAAAAZAAAAAEAAABAAAAAAAAAAAAAAAAAAAAAAAAAAAAAAAAAAAAAAAAAAAAAAAAAAAAAAAAAAAAAAAAAAAAAAAAAAAAAAAAAAAAAAAAAAAAAAAAAAAAAAAAAAAAAAAAAAAAAFAAAADwAAAAAAAAAAAAAAAAAAAkUAAAAAQAAABQAAAAUAAAAFAAAAAEAAAAAAAAAZAAAAGQAAAAAAAAAZAAAAGQAAAAVAAAAYAAAAAAAAAAAAAAADwAAACADAAAAAAAAAAAAAAEAAACgMgAAVgcAAKr4//8BAAAAf39/AAEAAABkAAAAAAAAABQAAABAHwAAAAAAACYAAAAAAAAAwOD//wAAAAAmAAAAZAAAABYAAABMAAAAAAAAAAAAAAAEAAAAAAAAAAEAAAB3d3cKAAAAACgAAAAoAAAAZAAAAGQAAAAAAAAAzMzMAAAAAABQAAAAUAAAAGQAAABkAAAAAAAAAAcAAAA4AAAAAAAAAAAAAAAAAAAA////AAAAAAAAAAAAAAAAAAAAAAAAAAAAAAAAAAAAAABkAAAAZAAAAAAAAAAjAAAABAAAAGQAAAAXAAAAFAAAAAAAAAAAAAAA/38AAP9/AAAAAAAACQAAAAQAAAAAAAAADAAAABAAAAAAAAAAAAAAAAAAAAAAAAAAHgAAAGgAAAAAAAAAAAAAAAAAAAAAAAAAAAAAABAnAAAQJwAAAAAAAAAAAAAAAAAAAAAAAAAAAAAAAAAAAAAAAAAAAAAUAAAAAAAAAMDA/wAAAAAAZAAAADIAAAAAAAAAZAAAAAAAAAB/f38ACgAAAB8AAABUAAAA///3Bf//2QEAAAAAAAAAAAAAAAAAAAAAAAAAAAAAAAAAAAAAAAAAAAAAAAJ/f38Ad3d3A8zMzADAwP8Af39/AAAAAAAAAAAAAAAAAP///wAAAAAAIQAAABgAAAAUAAAAbQYAAAEAAACwMQAAZRcAAAAAAAAmAAAACAAAAP//////////"/>
-              </a:ext>
-            </a:extLst>
           </p:cNvPicPr>
           <p:nvPr/>
         </p:nvPicPr>
         <p:blipFill>
-          <a:blip r:embed="rId2"/>
+          <a:blip r:embed="rId1"/>
           <a:stretch>
             <a:fillRect/>
           </a:stretch>
@@ -3651,7 +3156,7 @@
 </file>
 
 <file path=ppt/slides/slide2.xml><?xml version="1.0" encoding="utf-8"?>
-<p:sld xmlns:p="http://schemas.openxmlformats.org/presentationml/2006/main" xmlns:p14="http://schemas.microsoft.com/office/powerpoint/2010/main" xmlns:r="http://schemas.openxmlformats.org/officeDocument/2006/relationships" xmlns:a="http://schemas.openxmlformats.org/drawingml/2006/main">
+<p:sld xmlns:a="http://schemas.openxmlformats.org/drawingml/2006/main" xmlns:r="http://schemas.openxmlformats.org/officeDocument/2006/relationships" xmlns:p="http://schemas.openxmlformats.org/presentationml/2006/main">
   <p:cSld>
     <p:spTree>
       <p:nvGrpSpPr>
@@ -3672,16 +3177,11 @@
           <p:cNvPr id="2" name="Image1"/>
           <p:cNvPicPr>
             <a:picLocks noChangeAspect="1"/>
-            <a:extLst>
-              <a:ext uri="smNativeData">
-                <pr:smNativeData xmlns:pr="smNativeData" val="SMDATA_15_fWmYYBMAAAAlAAAAEQAAAC8BAAAAkAAAAEgAAACQAAAASAAAAAAAAAAAAAAAAAAAAAEAAABQAAAAAAAAAAAA4D8AAAAAAADgPwAAAAAAAOA/AAAAAAAA4D8AAAAAAADgPwAAAAAAAOA/AAAAAAAA4D8AAAAAAADgPwAAAAAAAOA/AAAAAAAA4D8CAAAAjAAAAAAAAAAAAAAA///3DP//2QgAAAAAAAAAAAAAAAAAAAAAAAAAAAAAAAAAAAAAZAAAAAEAAABAAAAAAAAAAAAAAAAAAAAAAAAAAAAAAAAAAAAAAAAAAAAAAAAAAAAAAAAAAAAAAAAAAAAAAAAAAAAAAAAAAAAAAAAAAAAAAAAAAAAAAAAAAAAAAAAAAAAAFAAAADwAAAAAAAAAAAAAAAAAAAkUAAAAAQAAABQAAAAUAAAAFAAAAAEAAAAAAAAAZAAAAGQAAAAAAAAAZAAAAGQAAAAVAAAAYAAAAAAAAAAAAAAADwAAACADAAAAAAAAAAAAAAEAAACgMgAAVgcAAKr4//8BAAAAf39/AAEAAABkAAAAAAAAABQAAABAHwAAAAAAACYAAAAAAAAAwOD//wAAAAAmAAAAZAAAABYAAABMAAAAAAAAAAAAAAAEAAAAAAAAAAEAAAB3d3cKAAAAACgAAAAoAAAAZAAAAGQAAAAAAAAAzMzMAAAAAABQAAAAUAAAAGQAAABkAAAAAAAAAAcAAAA4AAAAAAAAAAAAAAAAAAAA////AAAAAAAAAAAAAAAAAAAAAAAAAAAAAAAAAAAAAABkAAAAZAAAAAAAAAAjAAAABAAAAGQAAAAXAAAAFAAAAAAAAAAAAAAA/38AAP9/AAAAAAAACQAAAAQAAAAAAAAADAAAABAAAAAAAAAAAAAAAAAAAAAAAAAAHgAAAGgAAAAAAAAAAAAAAAAAAAAAAAAAAAAAABAnAAAQJwAAAAAAAAAAAAAAAAAAAAAAAAAAAAAAAAAAAAAAAAAAAAAUAAAAAAAAAMDA/wAAAAAAZAAAADIAAAAAAAAAZAAAAAAAAAB/f38ACgAAAB8AAABUAAAA///3Bf//2QEAAAAAAAAAAAAAAAAAAAAAAAAAAAAAAAAAAAAAAAAAAAAAAAJ/f38Ad3d3A8zMzADAwP8Af39/AAAAAAAAAAAAAAAAAP///wAAAAAAIQAAABgAAAAUAAAAAAAAAO4CAAA/OAAAPScAAAAAAAAmAAAACAAAAP//////////"/>
-              </a:ext>
-            </a:extLst>
           </p:cNvPicPr>
           <p:nvPr/>
         </p:nvPicPr>
         <p:blipFill>
-          <a:blip r:embed="rId2"/>
+          <a:blip r:embed="rId1"/>
           <a:stretch>
             <a:fillRect/>
           </a:stretch>
@@ -3717,7 +3217,7 @@
 </file>
 
 <file path=ppt/slides/slide3.xml><?xml version="1.0" encoding="utf-8"?>
-<p:sld xmlns:p="http://schemas.openxmlformats.org/presentationml/2006/main" xmlns:p14="http://schemas.microsoft.com/office/powerpoint/2010/main" xmlns:r="http://schemas.openxmlformats.org/officeDocument/2006/relationships" xmlns:a="http://schemas.openxmlformats.org/drawingml/2006/main">
+<p:sld xmlns:a="http://schemas.openxmlformats.org/drawingml/2006/main" xmlns:r="http://schemas.openxmlformats.org/officeDocument/2006/relationships" xmlns:p="http://schemas.openxmlformats.org/presentationml/2006/main">
   <p:cSld>
     <p:spTree>
       <p:nvGrpSpPr>
@@ -3738,16 +3238,11 @@
           <p:cNvPr id="2" name="Image1"/>
           <p:cNvPicPr>
             <a:picLocks noChangeAspect="1"/>
-            <a:extLst>
-              <a:ext uri="smNativeData">
-                <pr:smNativeData xmlns:pr="smNativeData" val="SMDATA_15_fWmYYBMAAAAlAAAAEQAAAC8BAAAAkAAAAEgAAACQAAAASAAAAAAAAAAAAAAAAAAAAAEAAABQAAAAAAAAAAAA4D8AAAAAAADgPwAAAAAAAOA/AAAAAAAA4D8AAAAAAADgPwAAAAAAAOA/AAAAAAAA4D8AAAAAAADgPwAAAAAAAOA/AAAAAAAA4D8CAAAAjAAAAAAAAAAAAAAA///3DP//2QgAAAAAAAAAAAAAAAAAAAAAAAAAAAAAAAAAAAAAZAAAAAEAAABAAAAAAAAAAAAAAAAAAAAAAAAAAAAAAAAAAAAAAAAAAAAAAAAAAAAAAAAAAAAAAAAAAAAAAAAAAAAAAAAAAAAAAAAAAAAAAAAAAAAAAAAAAAAAAAAAAAAAFAAAADwAAAAAAAAAAAAAAAAAAAkUAAAAAQAAABQAAAAUAAAAFAAAAAEAAAAAAAAAZAAAAGQAAAAAAAAAZAAAAGQAAAAVAAAAYAAAAAAAAAAAAAAADwAAACADAAAAAAAAAAAAAAEAAACgMgAAVgcAAKr4//8BAAAAf39/AAEAAABkAAAAAAAAABQAAABAHwAAAAAAACYAAAAAAAAAwOD//wAAAAAmAAAAZAAAABYAAABMAAAAAAAAAAAAAAAEAAAAAAAAAAEAAAB3d3cKAAAAACgAAAAoAAAAZAAAAGQAAAAAAAAAzMzMAAAAAABQAAAAUAAAAGQAAABkAAAAAAAAAAcAAAA4AAAAAAAAAAAAAAAAAAAA////AAAAAAAAAAAAAAAAAAAAAAAAAAAAAAAAAAAAAABkAAAAZAAAAAAAAAAjAAAABAAAAGQAAAAXAAAAFAAAAAAAAAAAAAAA/38AAP9/AAAAAAAACQAAAAQAAAAAAAAADAAAABAAAAAAAAAAAAAAAAAAAAAAAAAAHgAAAGgAAAAAAAAAAAAAAAAAAAAAAAAAAAAAABAnAAAQJwAAAAAAAAAAAAAAAAAAAAAAAAAAAAAAAAAAAAAAAAAAAAAUAAAAAAAAAMDA/wAAAAAAZAAAADIAAAAAAAAAZAAAAAAAAAB/f38ACgAAAB8AAABUAAAA///3Bf//2QEAAAAAAAAAAAAAAAAAAAAAAAAAAAAAAAAAAAAAAAAAAAAAAAJ/f38Ad3d3A8zMzADAwP8Af39/AAAAAAAAAAAAAAAAAP///wAAAAAAIQAAABgAAAAUAAAAAAAAAAAAAADQGgAALyoAAAAAAAAmAAAACAAAAP//////////"/>
-              </a:ext>
-            </a:extLst>
           </p:cNvPicPr>
           <p:nvPr/>
         </p:nvPicPr>
         <p:blipFill>
-          <a:blip r:embed="rId2"/>
+          <a:blip r:embed="rId1"/>
           <a:stretch>
             <a:fillRect/>
           </a:stretch>
@@ -3770,13 +3265,7 @@
       <p:grpSp>
         <p:nvGrpSpPr>
           <p:cNvPr id="3" name="Grouper1"/>
-          <p:cNvGrpSpPr>
-            <a:extLst>
-              <a:ext uri="smNativeData">
-                <pr:smNativeData xmlns:pr="smNativeData" val="SMDATA_7_fWmYYBMAAAAlAAAAAQAAAC8BAAAAkAAAAEgAAACQAAAASAAAAAAAAAAAAAAAAAAAABcAAAAUAAAAAAAAAAAAAAD/fwAA/38AAAAAAAAJAAAABAAAADMDAAAMAAAAEAAAAAAAAAAAAAAAAAAAAAAAAAAfAAAAVAAAAAAAAAAAAAAAAAAAAAAAAAAAAAAAAAAAAAAAAAAAAAAAAAAAAAAAAAAAAAAAAAAAAAAAAAAAAAAAAAAAAAAAAAAAAAAAAAAAAAAAAAAAAAAAAAAAACEAAAAYAAAAFAAAADAlAACiDAAARTgAABspAAAAAAAAJgAAAAgAAAD/////AAAAAA=="/>
-              </a:ext>
-            </a:extLst>
-          </p:cNvGrpSpPr>
+          <p:cNvGrpSpPr/>
           <p:nvPr/>
         </p:nvGrpSpPr>
         <p:grpSpPr>
@@ -3792,17 +3281,12 @@
             <p:cNvPr id="5" name="Image2"/>
             <p:cNvPicPr>
               <a:picLocks noChangeAspect="1"/>
-              <a:extLst>
-                <a:ext uri="smNativeData">
-                  <pr:smNativeData xmlns:pr="smNativeData" val="SMDATA_15_fWmYYBMAAAAlAAAAEQAAAC8BAAAAkAAAAEgAAACQAAAASAAAAAAAAAAAAAAAAAAAAAEAAABQAAAAAAAAAAAA4D8AAAAAAADgPwAAAAAAAOA/AAAAAAAA4D8AAAAAAADgPwAAAAAAAOA/AAAAAAAA4D8AAAAAAADgPwAAAAAAAOA/AAAAAAAA4D8CAAAAjAAAAAAAAAAAAAAA///3DP//2QgAAAAAAAAAAAAAAAAAAAAAAAAAAAAAAAAAAAAAZAAAAAEAAABAAAAAAAAAAAAAAAAAAAAAAAAAAAAAAAAAAAAAAAAAAAAAAAAAAAAAAAAAAAAAAAAAAAAAAAAAAAAAAAAAAAAAAAAAAAAAAAAAAAAAAAAAAAAAAAAAAAAAFAAAADwAAAAAAAAAAAAAAAAAAAkUAAAAAQAAABQAAAAUAAAAFAAAAAEAAAAAAAAAZAAAAGQAAAAAAAAAZAAAAGQAAAAVAAAAYAAAAAAAAAAAAAAADwAAACADAAAAAAAAAAAAAAEAAACgMgAAVgcAAKr4//8BAAAAf39/AAEAAABkAAAAAAAAABQAAABAHwAAAAAAACYAAAAAAAAAwOD//wAAAAAmAAAAZAAAABYAAABMAAAAAAAAAAAAAAAEAAAAAAAAAAEAAAB3d3cKAAAAACgAAAAoAAAAZAAAAGQAAAAAAAAAzMzMAAAAAABQAAAAUAAAAGQAAABkAAAAAAAAAAcAAAA4AAAAAAAAAAAAAAAAAAAA////AAAAAAAAAAAAAAAAAAAAAAAAAAAAKQAAAAAAAABkAAAAZAAAAAAAAAAjAAAABAAAAGQAAAAXAAAAFAAAAAAAAAAAAAAA/38AAP9/AAAAAAAACQAAAAQAAABBQUFrDAAAABAAAAAAAAAAAAAAAAAAAAAAAAAAHgAAAGgAAAAAAAAAAAAAAAAAAAAAAAAAAAAAABAnAAAQJwAAAAAAAAAAAAAAAAAAAAAAAAAAAAAAAAAAAAAAAAAAAAAUAAAAAAAAAMDA/wAAAAAAZAAAADIAAAAAAAAAZAAAAAAAAAB/f38ACgAAAB8AAABUAAAA///3Bf//2QEAAAAAAAAAAAAAAAAAAAAAAAAAAAAAAAAAAAAAAAAAAAAAAAJ/f38Ad3d3A8zMzADAwP8Af39/AAAAAAAAAAAAAAAAAP///wAAAAAAIQAAABgAAAAUAAAAMCUAAKIMAABAOAAAGykAAAAAAAAmAAAACAAAAP//////////"/>
-                </a:ext>
-              </a:extLst>
             </p:cNvPicPr>
             <p:nvPr/>
           </p:nvPicPr>
           <p:blipFill>
-            <a:blip r:embed="rId3"/>
-            <a:srcRect l="0" t="0" r="0" b="410"/>
+            <a:blip r:embed="rId2"/>
+            <a:srcRect b="410"/>
             <a:stretch>
               <a:fillRect/>
             </a:stretch>
@@ -3825,13 +3309,7 @@
         <p:sp>
           <p:nvSpPr>
             <p:cNvPr id="4" name="Forme automatique1"/>
-            <p:cNvSpPr>
-              <a:extLst>
-                <a:ext uri="smNativeData">
-                  <pr:smNativeData xmlns:pr="smNativeData" val="SMDATA_13_fWmYYBMAAAAlAAAALAEAAA8BAAAAkAAAAEgAAACQAAAASAAAAAAAAAAAAAAAAAAAAAEAAABQAAAAAAAAAAAA4D8AAAAAAADgPwAAAAAAAOA/AAAAAAAA4D8AAAAAAADgPwAAAAAAAOA/AAAAAAAA4D8AAAAAAADgPwAAAAAAAOA/AAAAAAAA4D8CAAAAjAAAAAAAAAAAAAAAAAAAAP//2QgAAAAAAAAAAAAAAAAAAAAAAAAAAAAAAAAAAAAAZAAAAAEAAABAAAAAAAAAAAAAAAAAAAAAAAAAAAAAAAAAAAAAAAAAAAAAAAAAAAAAAAAAAAAAAAAAAAAAAAAAAAAAAAAAAAAAAAAAAAAAAAAAAAAAAAAAAAAAAAAAAAAAFAAAADwAAAABAAAAAAAAAP9QUA48AAAAAQAAABQAAAAUAAAAFAAAAAEAAAAAAAAAZAAAAGQAAAAAAAAAZAAAAGQAAAAVAAAAYAAAAAAAAAAAAAAADwAAACADAAAAAAAAAAAAAAEAAACgMgAAAAAAAAAAAAABAAAAf39/AAEAAABkAAAAAAAAABQAAABAHwAAAAAAACYAAAAAAAAAwOD//wAAAAAmAAAAZAAAABYAAABMAAAAAAAAAAAAAAAEAAAAAAAAAAEAAAB3d3cKAAAAACgAAAAoAAAAZAAAAGQAAAAAAAAAzMzMAAAAAABQAAAAUAAAAGQAAABkAAAAAAAAABcAAAAUAAAAAAAAAAAAAAD/fwAA/38AAAAAAAAJAAAABAAAANxuCgAMAAAAEAAAAAAAAAAAAAAAAAAAAAAAAAAeAAAAaAAAAAAAAAAAAAAAAAAAAAAAAAAAAAAAECcAABAnAAAAAAAAAAAAAAAAAAAAAAAAAAAAAAAAAAAAAAAAAAAAABQAAAAAAAAAwMD/AAAAAABkAAAAMgAAAAAAAABkAAAAAAAAAH9/fwAKAAAAHwAAAFQAAAAAAAAA///ZAQAAAAAAAAAAAAAAAAAAAAAAAAAAAAAAAAAAAAAAAAAA/1BQB39/fwB3d3cDzMzMAMDA/wB/f38AAAAAAAAAAAAAAAAAAAAAAAAAAAAhAAAAGAAAABQAAAByJQAAvx0AAEU4AABlIAAAAAAAACYAAAAIAAAA//////////8="/>
-                </a:ext>
-              </a:extLst>
-            </p:cNvSpPr>
+            <p:cNvSpPr/>
             <p:nvPr/>
           </p:nvSpPr>
           <p:spPr>
@@ -3858,13 +3336,7 @@
       <p:sp>
         <p:nvSpPr>
           <p:cNvPr id="6" name="CadreTexte1"/>
-          <p:cNvSpPr txBox="1">
-            <a:extLst>
-              <a:ext uri="smNativeData">
-                <pr:smNativeData xmlns:pr="smNativeData" val="SMDATA_13_fWmYYBMAAAAlAAAAEgAAAE8BAAAAkAAAAEgAAACQAAAASAAAAAAAAAAAAAAAAAAAAAEAAABQAAAAAAAAAAAA4D8AAAAAAADgPwAAAAAAAOA/AAAAAAAA4D8AAAAAAADgPwAAAAAAAOA/AAAAAAAA4D8AAAAAAADgPwAAAAAAAOA/AAAAAAAA4D8CAAAAjAAAAAAAAAAAAAAA///3DP//2QgAAAAAAAAAAAAAAAAAAAAAAAAAAAAAAAAAAAAAZAAAAAEAAABAAAAAAAAAAAAAAAAAAAAAAAAAAAAAAAAAAAAAAAAAAAAAAAAAAAAAAAAAAAAAAAAAAAAAAAAAAAAAAAAAAAAAAAAAAAAAAAAAAAAAAAAAAAAAAAAAAAAAFAAAADwAAAAAAAAAAAAAAAAAAAkUAAAAAQAAABQAAAAUAAAAFAAAAAEAAAAAAAAAZAAAAGQAAAAAAAAAZAAAAGQAAAAVAAAAYAAAAAAAAAAAAAAADwAAACADAAAAAAAAAAAAAAEAAACgMgAAVgcAAKr4//8BAAAAf39/AAEAAABkAAAAAAAAABQAAABAHwAAAAAAACYAAAAAAAAAwOD//wAAAAAmAAAAZAAAABYAAABMAAAAAAAAAAAAAAAEAAAAAAAAAAEAAAB3d3cKAAAAACgAAAAoAAAAZAAAAGQAAAAAAAAAzMzMAAAAAABQAAAAUAAAAGQAAABkAAAAAAAAABcAAAAUAAAAAAAAACcKAAD/fwAA/38AAAAAAAAJAAAABAAAAAAAAAAMAAAAEAAAAAAAAAAAAAAAAAAAAAAAAAAeAAAAaAAAAAAAAAAAAAAAAAAAAAAAAAAAAAAAECcAABAnAAAAAAAAAAAAAAAAAAAAAAAAAAAAAAAAAAAAAAAAAAAAABQAAAAAAAAAwMD/AAAAAABkAAAAMgAAAAAAAABkAAAAAAAAAH9/fwAKAAAAHwAAAFQAAAD///cF///ZAQAAAAAAAAAAAAAAAAAAAAAAAAAAAAAAAAAAAAAAAAAAAAAAAn9/fwB3d3cDzMzMAMDA/wB/f38AAAAAAAAAAAAAAAAAAAAAAAAAAAAhAAAAGAAAABQAAADPGwAAlwIAAJ43AADnCQAAACAAACYAAAAIAAAA//////////8="/>
-              </a:ext>
-            </a:extLst>
-          </p:cNvSpPr>
+          <p:cNvSpPr txBox="1"/>
           <p:nvPr/>
         </p:nvSpPr>
         <p:spPr>
@@ -3914,7 +3386,7 @@
 </file>
 
 <file path=ppt/slides/slide4.xml><?xml version="1.0" encoding="utf-8"?>
-<p:sld xmlns:p="http://schemas.openxmlformats.org/presentationml/2006/main" xmlns:p14="http://schemas.microsoft.com/office/powerpoint/2010/main" xmlns:r="http://schemas.openxmlformats.org/officeDocument/2006/relationships" xmlns:a="http://schemas.openxmlformats.org/drawingml/2006/main">
+<p:sld xmlns:a="http://schemas.openxmlformats.org/drawingml/2006/main" xmlns:r="http://schemas.openxmlformats.org/officeDocument/2006/relationships" xmlns:p="http://schemas.openxmlformats.org/presentationml/2006/main">
   <p:cSld>
     <p:spTree>
       <p:nvGrpSpPr>
@@ -3935,17 +3407,12 @@
           <p:cNvPr id="2" name="Image1"/>
           <p:cNvPicPr>
             <a:picLocks noChangeAspect="1"/>
-            <a:extLst>
-              <a:ext uri="smNativeData">
-                <pr:smNativeData xmlns:pr="smNativeData" val="SMDATA_15_fWmYYBMAAAAlAAAAEQAAAC8BAAAAkAAAAEgAAACQAAAASAAAAAAAAAAAAAAAAAAAAAEAAABQAAAAAAAAAAAA4D8AAAAAAADgPwAAAAAAAOA/AAAAAAAA4D8AAAAAAADgPwAAAAAAAOA/AAAAAAAA4D8AAAAAAADgPwAAAAAAAOA/AAAAAAAA4D8CAAAAjAAAAAAAAAAAAAAA///3DP//2QgAAAAAAAAAAAAAAAAAAAAAAAAAAAAAAAAAAAAAZAAAAAEAAABAAAAAAAAAAAAAAAAAAAAAAAAAAAAAAAAAAAAAAAAAAAAAAAAAAAAAAAAAAAAAAAAAAAAAAAAAAAAAAAAAAAAAAAAAAAAAAAAAAAAAAAAAAAAAAAAAAAAAFAAAADwAAAAAAAAAAAAAAAAAAAkUAAAAAQAAABQAAAAUAAAAFAAAAAEAAAAAAAAAZAAAAGQAAAAAAAAAZAAAAGQAAAAVAAAAYAAAAAAAAAAAAAAADwAAACADAAAAAAAAAAAAAAEAAACgMgAAVgcAAKr4//8BAAAAf39/AAEAAABkAAAAAAAAABQAAABAHwAAAAAAACYAAAAAAAAAwOD//wAAAAAmAAAAZAAAABYAAABMAAAAAAAAAAAAAAAEAAAAAAAAAAEAAAB3d3cKAAAAACgAAAAoAAAAZAAAAGQAAAAAAAAAzMzMAAAAAABQAAAAUAAAAGQAAABkAAAAAAAAAAcAAAA4AAAAAAAAAAAAAAAAAAAA////AAAAAAAAAAAAMwAAAK8AAABOAAAAAAAAAAAAAABkAAAAZAAAAAAAAAAjAAAABAAAAGQAAAAXAAAAFAAAAAAAAAAAAAAA/38AAP9/AAAAAAAACQAAAAQAAAAAAAAADAAAABAAAAAAAAAAAAAAAAAAAAAAAAAAHgAAAGgAAAAAAAAAAAAAAAAAAAAAAAAAAAAAABAnAAAQJwAAAAAAAAAAAAAAAAAAAAAAAAAAAAAAAAAAAAAAAAAAAAAUAAAAAAAAAMDA/wAAAAAAZAAAADIAAAAAAAAAZAAAAAAAAAB/f38ACgAAAB8AAABUAAAA///3Bf//2QEAAAAAAAAAAAAAAAAAAAAAAAAAAAAAAAAAAAAAAAAAAAAAAAJ/f38Ad3d3A8zMzADAwP8Af39/AAAAAAAAAAAAAAAAAP///wAAAAAAIQAAABgAAAAUAAAAARIAAAANAADGJQAATyYAAAAAAAAmAAAACAAAAP//////////"/>
-              </a:ext>
-            </a:extLst>
           </p:cNvPicPr>
           <p:nvPr/>
         </p:nvPicPr>
         <p:blipFill>
-          <a:blip r:embed="rId2"/>
-          <a:srcRect l="510" t="1750" r="780" b="0"/>
+          <a:blip r:embed="rId1"/>
+          <a:srcRect l="510" t="1750" r="780"/>
           <a:stretch>
             <a:fillRect/>
           </a:stretch>
@@ -3968,13 +3435,7 @@
       <p:sp>
         <p:nvSpPr>
           <p:cNvPr id="3" name="CadreTexte1"/>
-          <p:cNvSpPr txBox="1">
-            <a:extLst>
-              <a:ext uri="smNativeData">
-                <pr:smNativeData xmlns:pr="smNativeData" val="SMDATA_13_fWmYYBMAAAAlAAAAEgAAAE8BAAAAkAAAAEgAAACQAAAASAAAAAAAAAAAAAAAAAAAAAEAAABQAAAAAAAAAAAA4D8AAAAAAADgPwAAAAAAAOA/AAAAAAAA4D8AAAAAAADgPwAAAAAAAOA/AAAAAAAA4D8AAAAAAADgPwAAAAAAAOA/AAAAAAAA4D8CAAAAjAAAAAAAAAAAAAAA///3DP//2QgAAAAAAAAAAAAAAAAAAAAAAAAAAAAAAAAAAAAAZAAAAAEAAABAAAAAAAAAAAAAAAAAAAAAAAAAAAAAAAAAAAAAAAAAAAAAAAAAAAAAAAAAAAAAAAAAAAAAAAAAAAAAAAAAAAAAAAAAAAAAAAAAAAAAAAAAAAAAAAAAAAAAFAAAADwAAAAAAAAAAAAAAAAAAAkUAAAAAQAAABQAAAAUAAAAFAAAAAEAAAAAAAAAZAAAAGQAAAAAAAAAZAAAAGQAAAAVAAAAYAAAAAAAAAAAAAAADwAAACADAAAAAAAAAAAAAAEAAACgMgAAVgcAAKr4//8BAAAAf39/AAEAAABkAAAAAAAAABQAAABAHwAAAAAAACYAAAAAAAAAwOD//wAAAAAmAAAAZAAAABYAAABMAAAAAAAAAAAAAAAEAAAAAAAAAAEAAAB3d3cKAAAAACgAAAAoAAAAZAAAAGQAAAAAAAAAzMzMAAAAAABQAAAAUAAAAGQAAABkAAAAAAAAABcAAAAUAAAAAAAAABAHAAD/fwAA/38AAAAAAAAJAAAABAAAAHlsZT4MAAAAEAAAAAAAAAAAAAAAAAAAAAAAAAAeAAAAaAAAAAAAAAAAAAAAAAAAAAAAAAAAAAAAECcAABAnAAAAAAAAAAAAAAAAAAAAAAAAAAAAAAAAAAAAAAAAAAAAABQAAAAAAAAAwMD/AAAAAABkAAAAMgAAAAAAAABkAAAAAAAAAH9/fwAKAAAAHwAAAFQAAAD///cF///ZAQAAAAAAAAAAAAAAAAAAAAAAAAAAAAAAAAAAAAAAAAAAAAAAAn9/fwB3d3cDzMzMAMDA/wB/f38AAAAAAAAAAAAAAAAAAAAAAAAAAAAhAAAAGAAAABQAAACnBQAAXAIAAMsxAACsCQAAACAAACYAAAAIAAAA//////////8="/>
-              </a:ext>
-            </a:extLst>
-          </p:cNvSpPr>
+          <p:cNvSpPr txBox="1"/>
           <p:nvPr/>
         </p:nvSpPr>
         <p:spPr>
@@ -4036,7 +3497,7 @@
 </file>
 
 <file path=ppt/slides/slide5.xml><?xml version="1.0" encoding="utf-8"?>
-<p:sld xmlns:p="http://schemas.openxmlformats.org/presentationml/2006/main" xmlns:p14="http://schemas.microsoft.com/office/powerpoint/2010/main" xmlns:r="http://schemas.openxmlformats.org/officeDocument/2006/relationships" xmlns:a="http://schemas.openxmlformats.org/drawingml/2006/main">
+<p:sld xmlns:a="http://schemas.openxmlformats.org/drawingml/2006/main" xmlns:r="http://schemas.openxmlformats.org/officeDocument/2006/relationships" xmlns:p="http://schemas.openxmlformats.org/presentationml/2006/main">
   <p:cSld>
     <p:spTree>
       <p:nvGrpSpPr>
@@ -4057,17 +3518,12 @@
           <p:cNvPr id="2" name="Image1"/>
           <p:cNvPicPr>
             <a:picLocks noChangeAspect="1"/>
-            <a:extLst>
-              <a:ext uri="smNativeData">
-                <pr:smNativeData xmlns:pr="smNativeData" val="SMDATA_15_fWmYYBMAAAAlAAAAEQAAAC8BAAAAkAAAAEgAAACQAAAASAAAAAAAAAAAAAAAAAAAAAEAAABQAAAAAAAAAAAA4D8AAAAAAADgPwAAAAAAAOA/AAAAAAAA4D8AAAAAAADgPwAAAAAAAOA/AAAAAAAA4D8AAAAAAADgPwAAAAAAAOA/AAAAAAAA4D8CAAAAjAAAAAAAAAAAAAAA///3DP//2QgAAAAAAAAAAAAAAAAAAAAAAAAAAAAAAAAAAAAAZAAAAAEAAABAAAAAAAAAAAAAAAAAAAAAAAAAAAAAAAAAAAAAAAAAAAAAAAAAAAAAAAAAAAAAAAAAAAAAAAAAAAAAAAAAAAAAAAAAAAAAAAAAAAAAAAAAAAAAAAAAAAAAFAAAADwAAAAAAAAAAAAAAAAAAAkUAAAAAQAAABQAAAAUAAAAFAAAAAEAAAAAAAAAZAAAAGQAAAAAAAAAZAAAAGQAAAAVAAAAYAAAAAAAAAAAAAAADwAAACADAAAAAAAAAAAAAAEAAACgMgAAVgcAAKr4//8BAAAAf39/AAEAAABkAAAAAAAAABQAAABAHwAAAAAAACYAAAAAAAAAwOD//wAAAAAmAAAAZAAAABYAAABMAAAAAAAAAAAAAAAEAAAAAAAAAAEAAAB3d3cKAAAAACgAAAAoAAAAZAAAAGQAAAAAAAAAzMzMAAAAAABQAAAAUAAAAGQAAABkAAAAAAAAAAcAAAA4AAAAAAAAAAAAAAAAAAAA////AAAAAAAAAAAAAAAAAFMAAAAAAAAAAAAAAAAAAABkAAAAZAAAAAAAAAAjAAAABAAAAGQAAAAXAAAAFAAAAAAAAAAAAAAA/38AAP9/AAAAAAAACQAAAAQAAAAAAAAADAAAABAAAAAAAAAAAAAAAAAAAAAAAAAAHgAAAGgAAAAAAAAAAAAAAAAAAAAAAAAAAAAAABAnAAAQJwAAAAAAAAAAAAAAAAAAAAAAAAAAAAAAAAAAAAAAAAAAAAAUAAAAAAAAAMDA/wAAAAAAZAAAADIAAAAAAAAAZAAAAAAAAAB/f38ACgAAAB8AAABUAAAA///3Bf//2QEAAAAAAAAAAAAAAAAAAAAAAAAAAAAAAAAAAAAAAAAAAAAAAAJ/f38Ad3d3A8zMzADAwP8Af39/AAAAAAAAAAAAAAAAAP///wAAAAAAIQAAABgAAAAUAAAANg4AAPMJAAAEKgAASikAAAAAAAAmAAAACAAAAP//////////"/>
-              </a:ext>
-            </a:extLst>
           </p:cNvPicPr>
           <p:nvPr/>
         </p:nvPicPr>
         <p:blipFill>
-          <a:blip r:embed="rId2"/>
-          <a:srcRect l="0" t="830" r="0" b="0"/>
+          <a:blip r:embed="rId1"/>
+          <a:srcRect t="830"/>
           <a:stretch>
             <a:fillRect/>
           </a:stretch>
@@ -4090,13 +3546,7 @@
       <p:sp>
         <p:nvSpPr>
           <p:cNvPr id="3" name="CadreTexte1"/>
-          <p:cNvSpPr txBox="1">
-            <a:extLst>
-              <a:ext uri="smNativeData">
-                <pr:smNativeData xmlns:pr="smNativeData" val="SMDATA_13_fWmYYBMAAAAlAAAAEgAAAE8BAAAAkAAAAEgAAACQAAAASAAAAAAAAAAAAAAAAAAAAAEAAABQAAAAAAAAAAAA4D8AAAAAAADgPwAAAAAAAOA/AAAAAAAA4D8AAAAAAADgPwAAAAAAAOA/AAAAAAAA4D8AAAAAAADgPwAAAAAAAOA/AAAAAAAA4D8CAAAAjAAAAAAAAAAAAAAA///3DP//2QgAAAAAAAAAAAAAAAAAAAAAAAAAAAAAAAAAAAAAZAAAAAEAAABAAAAAAAAAAAAAAAAAAAAAAAAAAAAAAAAAAAAAAAAAAAAAAAAAAAAAAAAAAAAAAAAAAAAAAAAAAAAAAAAAAAAAAAAAAAAAAAAAAAAAAAAAAAAAAAAAAAAAFAAAADwAAAAAAAAAAAAAAAAAAAkUAAAAAQAAABQAAAAUAAAAFAAAAAEAAAAAAAAAZAAAAGQAAAAAAAAAZAAAAGQAAAAVAAAAYAAAAAAAAAAAAAAADwAAACADAAAAAAAAAAAAAAEAAACgMgAAVgcAAKr4//8BAAAAf39/AAEAAABkAAAAAAAAABQAAABAHwAAAAAAACYAAAAAAAAAwOD//wAAAAAmAAAAZAAAABYAAABMAAAAAAAAAAAAAAAEAAAAAAAAAAEAAAB3d3cKAAAAACgAAAAoAAAAZAAAAGQAAAAAAAAAzMzMAAAAAABQAAAAUAAAAGQAAABkAAAAAAAAABcAAAAUAAAAAAAAAIEHAAD/fwAA/38AAAAAAAAJAAAABAAAAAAAAAAMAAAAEAAAAAAAAAAAAAAAAAAAAAAAAAAeAAAAaAAAAAAAAAAAAAAAAAAAAAAAAAAAAAAAECcAABAnAAAAAAAAAAAAAAAAAAAAAAAAAAAAAAAAAAAAAAAAAAAAABQAAAAAAAAAwMD/AAAAAABkAAAAMgAAAAAAAABkAAAAAAAAAH9/fwAKAAAAHwAAAFQAAAD///cF///ZAQAAAAAAAAAAAAAAAAAAAAAAAAAAAAAAAAAAAAAAAAAAAAAAAn9/fwB3d3cDzMzMAMDA/wB/f38AAAAAAAAAAAAAAAAAAAAAAAAAAAAhAAAAGAAAABQAAADlAgAARgEAADc1AACWCAAAACAAACYAAAAIAAAA//////////8="/>
-              </a:ext>
-            </a:extLst>
-          </p:cNvSpPr>
+          <p:cNvSpPr txBox="1"/>
           <p:nvPr/>
         </p:nvSpPr>
         <p:spPr>
@@ -4158,7 +3608,7 @@
 </file>
 
 <file path=ppt/slides/slide6.xml><?xml version="1.0" encoding="utf-8"?>
-<p:sld xmlns:p="http://schemas.openxmlformats.org/presentationml/2006/main" xmlns:p14="http://schemas.microsoft.com/office/powerpoint/2010/main" xmlns:r="http://schemas.openxmlformats.org/officeDocument/2006/relationships" xmlns:a="http://schemas.openxmlformats.org/drawingml/2006/main">
+<p:sld xmlns:a="http://schemas.openxmlformats.org/drawingml/2006/main" xmlns:r="http://schemas.openxmlformats.org/officeDocument/2006/relationships" xmlns:p="http://schemas.openxmlformats.org/presentationml/2006/main">
   <p:cSld>
     <p:spTree>
       <p:nvGrpSpPr>
@@ -4177,13 +3627,7 @@
       <p:sp>
         <p:nvSpPr>
           <p:cNvPr id="2" name="CadreTexte1"/>
-          <p:cNvSpPr txBox="1">
-            <a:extLst>
-              <a:ext uri="smNativeData">
-                <pr:smNativeData xmlns:pr="smNativeData" val="SMDATA_13_fWmYYBMAAAAlAAAAEgAAAE8BAAAAkAAAAEgAAACQAAAASAAAAAAAAAAAAAAAAAAAAAEAAABQAAAAAAAAAAAA4D8AAAAAAADgPwAAAAAAAOA/AAAAAAAA4D8AAAAAAADgPwAAAAAAAOA/AAAAAAAA4D8AAAAAAADgPwAAAAAAAOA/AAAAAAAA4D8CAAAAjAAAAAAAAAAAAAAA///3DP//2QgAAAAAAAAAAAAAAAAAAAAAAAAAAAAAAAAAAAAAZAAAAAEAAABAAAAAAAAAAAAAAAAAAAAAAAAAAAAAAAAAAAAAAAAAAAAAAAAAAAAAAAAAAAAAAAAAAAAAAAAAAAAAAAAAAAAAAAAAAAAAAAAAAAAAAAAAAAAAAAAAAAAAFAAAADwAAAAAAAAAAAAAAAAAAAkUAAAAAQAAABQAAAAUAAAAFAAAAAEAAAAAAAAAZAAAAGQAAAAAAAAAZAAAAGQAAAAVAAAAYAAAAAAAAAAAAAAADwAAACADAAAAAAAAAAAAAAEAAACgMgAAVgcAAKr4//8BAAAAf39/AAEAAABkAAAAAAAAABQAAABAHwAAAAAAACYAAAAAAAAAwOD//wAAAAAmAAAAZAAAABYAAABMAAAAAAAAAAAAAAAEAAAAAAAAAAEAAAB3d3cKAAAAACgAAAAoAAAAZAAAAGQAAAAAAAAAzMzMAAAAAABQAAAAUAAAAGQAAABkAAAAAAAAABcAAAAUAAAAAAAAAC4GAAD/fwAA/38AAAAAAAAJAAAABAAAAJDnCQAMAAAAEAAAAAAAAAAAAAAAAAAAAAAAAAAeAAAAaAAAAAAAAAAAAAAAAAAAAAAAAAAAAAAAECcAABAnAAAAAAAAAAAAAAAAAAAAAAAAAAAAAAAAAAAAAAAAAAAAABQAAAAAAAAAwMD/AAAAAABkAAAAMgAAAAAAAABkAAAAAAAAAH9/fwAKAAAAHwAAAFQAAAD///cF///ZAQAAAAAAAAAAAAAAAAAAAAAAAAAAAAAAAAAAAAAAAAAAAAAAAn9/fwB3d3cDzMzMAMDA/wB/f38AAAAAAAAAAAAAAAAAAAAAAAAAAAAhAAAAGAAAABQAAABgAwAA6wEAANE0AAA7CQAAACAAACYAAAAIAAAA//////////8="/>
-              </a:ext>
-            </a:extLst>
-          </p:cNvSpPr>
+          <p:cNvSpPr txBox="1"/>
           <p:nvPr/>
         </p:nvSpPr>
         <p:spPr>
@@ -4220,19 +3664,13 @@
       <p:sp>
         <p:nvSpPr>
           <p:cNvPr id="3" name="CadreTexte2"/>
-          <p:cNvSpPr txBox="1">
-            <a:extLst>
-              <a:ext uri="smNativeData">
-                <pr:smNativeData xmlns:pr="smNativeData" val="SMDATA_13_fWmYYBMAAAAlAAAAEgAAAE8BAAAAkAAAAEgAAACQAAAASAAAAAAAAAAAAAAAAAAAAAEAAABQAAAAAAAAAAAA4D8AAAAAAADgPwAAAAAAAOA/AAAAAAAA4D8AAAAAAADgPwAAAAAAAOA/AAAAAAAA4D8AAAAAAADgPwAAAAAAAOA/AAAAAAAA4D8CAAAAjAAAAAAAAAAAAAAA///3DP//2QgAAAAAAAAAAAAAAAAAAAAAAAAAAAAAAAAAAAAAZAAAAAEAAABAAAAAAAAAAAAAAAAAAAAAAAAAAAAAAAAAAAAAAAAAAAAAAAAAAAAAAAAAAAAAAAAAAAAAAAAAAAAAAAAAAAAAAAAAAAAAAAAAAAAAAAAAAAAAAAAAAAAAFAAAADwAAAAAAAAAAAAAAAAAAAkUAAAAAQAAABQAAAAUAAAAFAAAAAEAAAAAAAAAZAAAAGQAAAAAAAAAZAAAAGQAAAAVAAAAYAAAAAAAAAAAAAAADwAAACADAAAAAAAAAAAAAAEAAACgMgAAVgcAAKr4//8BAAAAf39/AAEAAABkAAAAAAAAABQAAABAHwAAAAAAACYAAAAAAAAAwOD//wAAAAAmAAAAZAAAABYAAABMAAAAAAAAAAAAAAAEAAAAAAAAAAEAAAB3d3cKAAAAACgAAAAoAAAAZAAAAGQAAAAAAAAAzMzMAAAAAABQAAAAUAAAAGQAAABkAAAAAAAAABcAAAAUAAAAAAAAAPsSAAD/fwAA/38AAAAAAAAJAAAABAAAAAAAAAAMAAAAEAAAAAAAAAAAAAAAAAAAAAAAAAAeAAAAaAAAAAAAAAAAAAAAAAAAAAAAAAAAAAAAECcAABAnAAAAAAAAAAAAAAAAAAAAAAAAAAAAAAAAAAAAAAAAAAAAABQAAAAAAAAAwMD/AAAAAABkAAAAMgAAAAAAAABkAAAAAAAAAH9/fwAKAAAAHwAAAFQAAAD///cF///ZAQAAAAAAAAAAAAAAAAAAAAAAAAAAAAAAAAAAAAAAAAAAAAAAAn9/fwB3d3cDzMzMAMDA/wB/f38AAAAAAAAAAAAAAAAAAAAAAAAAAAAhAAAAGAAAABQAAACyBQAAGA4AAEcyAAC4IgAAACAAACYAAAAIAAAA//////////8="/>
-              </a:ext>
-            </a:extLst>
-          </p:cNvSpPr>
+          <p:cNvSpPr txBox="1"/>
           <p:nvPr/>
         </p:nvSpPr>
         <p:spPr>
           <a:xfrm>
-            <a:off x="925830" y="2291080"/>
-            <a:ext cx="7247255" cy="3352800"/>
+            <a:off x="619760" y="2291080"/>
+            <a:ext cx="7864475" cy="3352800"/>
           </a:xfrm>
           <a:prstGeom prst="rect">
             <a:avLst/>
@@ -4576,9 +4014,6 @@
     <a:spDef>
       <a:spPr/>
       <a:bodyPr>
-        <a:prstTxWarp prst="textNoShape">
-          <a:avLst/>
-        </a:prstTxWarp>
         <a:noAutofit/>
       </a:bodyPr>
       <a:lstStyle>
@@ -5096,5 +4531,10 @@
       <a:clrMap bg1="lt1" tx1="dk1" bg2="lt2" tx2="dk2" accent1="accent1" accent2="accent2" accent3="accent3" accent4="accent4" accent5="accent5" accent6="accent6" hlink="hlink" folHlink="folHlink"/>
     </a:extraClrScheme>
   </a:extraClrSchemeLst>
+  <a:extLst>
+    <a:ext uri="{05A4C25C-085E-4340-85A3-A5531E510DB2}">
+      <thm15:themeFamily xmlns:thm15="http://schemas.microsoft.com/office/thememl/2012/main" name="Office Theme" id="{62F939B6-93AF-4DB8-9C6B-D6C7DFDC589F}" vid="{4A3C46E8-61CC-4603-A589-7422A47A8E4A}"/>
+    </a:ext>
+  </a:extLst>
 </a:theme>
 </file>
</xml_diff>